<commit_message>
Use methodology chapter, use pdf instead of png for graphics
</commit_message>
<xml_diff>
--- a/gfx/Thesis figures.pptx
+++ b/gfx/Thesis figures.pptx
@@ -282,7 +282,7 @@
           <a:p>
             <a:fld id="{3971B8E7-E4D3-4F8A-8C05-81E1A0A9E2AB}" type="datetimeFigureOut">
               <a:rPr lang="en-US" smtClean="0"/>
-              <a:t>1/6/2019</a:t>
+              <a:t>1/15/2019</a:t>
             </a:fld>
             <a:endParaRPr lang="en-US"/>
           </a:p>
@@ -452,7 +452,7 @@
           <a:p>
             <a:fld id="{3971B8E7-E4D3-4F8A-8C05-81E1A0A9E2AB}" type="datetimeFigureOut">
               <a:rPr lang="en-US" smtClean="0"/>
-              <a:t>1/6/2019</a:t>
+              <a:t>1/15/2019</a:t>
             </a:fld>
             <a:endParaRPr lang="en-US"/>
           </a:p>
@@ -632,7 +632,7 @@
           <a:p>
             <a:fld id="{3971B8E7-E4D3-4F8A-8C05-81E1A0A9E2AB}" type="datetimeFigureOut">
               <a:rPr lang="en-US" smtClean="0"/>
-              <a:t>1/6/2019</a:t>
+              <a:t>1/15/2019</a:t>
             </a:fld>
             <a:endParaRPr lang="en-US"/>
           </a:p>
@@ -802,7 +802,7 @@
           <a:p>
             <a:fld id="{3971B8E7-E4D3-4F8A-8C05-81E1A0A9E2AB}" type="datetimeFigureOut">
               <a:rPr lang="en-US" smtClean="0"/>
-              <a:t>1/6/2019</a:t>
+              <a:t>1/15/2019</a:t>
             </a:fld>
             <a:endParaRPr lang="en-US"/>
           </a:p>
@@ -1048,7 +1048,7 @@
           <a:p>
             <a:fld id="{3971B8E7-E4D3-4F8A-8C05-81E1A0A9E2AB}" type="datetimeFigureOut">
               <a:rPr lang="en-US" smtClean="0"/>
-              <a:t>1/6/2019</a:t>
+              <a:t>1/15/2019</a:t>
             </a:fld>
             <a:endParaRPr lang="en-US"/>
           </a:p>
@@ -1280,7 +1280,7 @@
           <a:p>
             <a:fld id="{3971B8E7-E4D3-4F8A-8C05-81E1A0A9E2AB}" type="datetimeFigureOut">
               <a:rPr lang="en-US" smtClean="0"/>
-              <a:t>1/6/2019</a:t>
+              <a:t>1/15/2019</a:t>
             </a:fld>
             <a:endParaRPr lang="en-US"/>
           </a:p>
@@ -1647,7 +1647,7 @@
           <a:p>
             <a:fld id="{3971B8E7-E4D3-4F8A-8C05-81E1A0A9E2AB}" type="datetimeFigureOut">
               <a:rPr lang="en-US" smtClean="0"/>
-              <a:t>1/6/2019</a:t>
+              <a:t>1/15/2019</a:t>
             </a:fld>
             <a:endParaRPr lang="en-US"/>
           </a:p>
@@ -1765,7 +1765,7 @@
           <a:p>
             <a:fld id="{3971B8E7-E4D3-4F8A-8C05-81E1A0A9E2AB}" type="datetimeFigureOut">
               <a:rPr lang="en-US" smtClean="0"/>
-              <a:t>1/6/2019</a:t>
+              <a:t>1/15/2019</a:t>
             </a:fld>
             <a:endParaRPr lang="en-US"/>
           </a:p>
@@ -1860,7 +1860,7 @@
           <a:p>
             <a:fld id="{3971B8E7-E4D3-4F8A-8C05-81E1A0A9E2AB}" type="datetimeFigureOut">
               <a:rPr lang="en-US" smtClean="0"/>
-              <a:t>1/6/2019</a:t>
+              <a:t>1/15/2019</a:t>
             </a:fld>
             <a:endParaRPr lang="en-US"/>
           </a:p>
@@ -2137,7 +2137,7 @@
           <a:p>
             <a:fld id="{3971B8E7-E4D3-4F8A-8C05-81E1A0A9E2AB}" type="datetimeFigureOut">
               <a:rPr lang="en-US" smtClean="0"/>
-              <a:t>1/6/2019</a:t>
+              <a:t>1/15/2019</a:t>
             </a:fld>
             <a:endParaRPr lang="en-US"/>
           </a:p>
@@ -2390,7 +2390,7 @@
           <a:p>
             <a:fld id="{3971B8E7-E4D3-4F8A-8C05-81E1A0A9E2AB}" type="datetimeFigureOut">
               <a:rPr lang="en-US" smtClean="0"/>
-              <a:t>1/6/2019</a:t>
+              <a:t>1/15/2019</a:t>
             </a:fld>
             <a:endParaRPr lang="en-US"/>
           </a:p>
@@ -2603,7 +2603,7 @@
           <a:p>
             <a:fld id="{3971B8E7-E4D3-4F8A-8C05-81E1A0A9E2AB}" type="datetimeFigureOut">
               <a:rPr lang="en-US" smtClean="0"/>
-              <a:t>1/6/2019</a:t>
+              <a:t>1/15/2019</a:t>
             </a:fld>
             <a:endParaRPr lang="en-US"/>
           </a:p>
@@ -3025,7 +3025,9 @@
           <a:noFill/>
           <a:ln>
             <a:solidFill>
-              <a:schemeClr val="tx1"/>
+              <a:schemeClr val="accent6">
+                <a:lumMod val="10000"/>
+              </a:schemeClr>
             </a:solidFill>
           </a:ln>
         </p:spPr>
@@ -3053,7 +3055,9 @@
             <a:r>
               <a:rPr lang="en-US" dirty="0" smtClean="0">
                 <a:solidFill>
-                  <a:schemeClr val="tx1"/>
+                  <a:schemeClr val="accent6">
+                    <a:lumMod val="10000"/>
+                  </a:schemeClr>
                 </a:solidFill>
               </a:rPr>
               <a:t>Embedding Layer</a:t>
@@ -3064,7 +3068,9 @@
             <a:r>
               <a:rPr lang="en-US" i="1" dirty="0" smtClean="0">
                 <a:solidFill>
-                  <a:schemeClr val="tx1"/>
+                  <a:schemeClr val="accent6">
+                    <a:lumMod val="10000"/>
+                  </a:schemeClr>
                 </a:solidFill>
               </a:rPr>
               <a:t>500</a:t>
@@ -3072,14 +3078,18 @@
             <a:r>
               <a:rPr lang="en-US" dirty="0" smtClean="0">
                 <a:solidFill>
-                  <a:schemeClr val="tx1"/>
+                  <a:schemeClr val="accent6">
+                    <a:lumMod val="10000"/>
+                  </a:schemeClr>
                 </a:solidFill>
               </a:rPr>
               <a:t> neurons</a:t>
             </a:r>
             <a:endParaRPr lang="en-US" dirty="0">
               <a:solidFill>
-                <a:schemeClr val="tx1"/>
+                <a:schemeClr val="accent6">
+                  <a:lumMod val="10000"/>
+                </a:schemeClr>
               </a:solidFill>
             </a:endParaRPr>
           </a:p>
@@ -3102,7 +3112,9 @@
           <a:noFill/>
           <a:ln>
             <a:solidFill>
-              <a:schemeClr val="tx1"/>
+              <a:schemeClr val="accent6">
+                <a:lumMod val="10000"/>
+              </a:schemeClr>
             </a:solidFill>
           </a:ln>
         </p:spPr>
@@ -3130,7 +3142,9 @@
             <a:r>
               <a:rPr lang="en-US" dirty="0" smtClean="0">
                 <a:solidFill>
-                  <a:schemeClr val="tx1"/>
+                  <a:schemeClr val="accent6">
+                    <a:lumMod val="10000"/>
+                  </a:schemeClr>
                 </a:solidFill>
               </a:rPr>
               <a:t>LSTM Layer</a:t>
@@ -3141,7 +3155,9 @@
             <a:r>
               <a:rPr lang="en-US" i="1" dirty="0" smtClean="0">
                 <a:solidFill>
-                  <a:schemeClr val="tx1"/>
+                  <a:schemeClr val="accent6">
+                    <a:lumMod val="10000"/>
+                  </a:schemeClr>
                 </a:solidFill>
               </a:rPr>
               <a:t>500</a:t>
@@ -3149,7 +3165,9 @@
             <a:r>
               <a:rPr lang="en-US" dirty="0" smtClean="0">
                 <a:solidFill>
-                  <a:schemeClr val="tx1"/>
+                  <a:schemeClr val="accent6">
+                    <a:lumMod val="10000"/>
+                  </a:schemeClr>
                 </a:solidFill>
               </a:rPr>
               <a:t> </a:t>
@@ -3157,14 +3175,18 @@
             <a:r>
               <a:rPr lang="en-US" u="sng" dirty="0" smtClean="0">
                 <a:solidFill>
-                  <a:schemeClr val="tx1"/>
+                  <a:schemeClr val="accent6">
+                    <a:lumMod val="10000"/>
+                  </a:schemeClr>
                 </a:solidFill>
               </a:rPr>
               <a:t>neurons</a:t>
             </a:r>
             <a:endParaRPr lang="en-US" u="sng" dirty="0">
               <a:solidFill>
-                <a:schemeClr val="tx1"/>
+                <a:schemeClr val="accent6">
+                  <a:lumMod val="10000"/>
+                </a:schemeClr>
               </a:solidFill>
             </a:endParaRPr>
           </a:p>
@@ -3187,7 +3209,9 @@
           <a:noFill/>
           <a:ln>
             <a:solidFill>
-              <a:schemeClr val="tx1"/>
+              <a:schemeClr val="accent6">
+                <a:lumMod val="10000"/>
+              </a:schemeClr>
             </a:solidFill>
           </a:ln>
         </p:spPr>
@@ -3215,7 +3239,9 @@
             <a:r>
               <a:rPr lang="en-US" dirty="0" smtClean="0">
                 <a:solidFill>
-                  <a:schemeClr val="tx1"/>
+                  <a:schemeClr val="accent6">
+                    <a:lumMod val="10000"/>
+                  </a:schemeClr>
                 </a:solidFill>
               </a:rPr>
               <a:t>LSTM Layer</a:t>
@@ -3226,7 +3252,9 @@
             <a:r>
               <a:rPr lang="en-US" i="1" dirty="0" smtClean="0">
                 <a:solidFill>
-                  <a:schemeClr val="tx1"/>
+                  <a:schemeClr val="accent6">
+                    <a:lumMod val="10000"/>
+                  </a:schemeClr>
                 </a:solidFill>
               </a:rPr>
               <a:t>500</a:t>
@@ -3234,14 +3262,18 @@
             <a:r>
               <a:rPr lang="en-US" dirty="0" smtClean="0">
                 <a:solidFill>
-                  <a:schemeClr val="tx1"/>
+                  <a:schemeClr val="accent6">
+                    <a:lumMod val="10000"/>
+                  </a:schemeClr>
                 </a:solidFill>
               </a:rPr>
               <a:t> neurons</a:t>
             </a:r>
             <a:endParaRPr lang="en-US" dirty="0">
               <a:solidFill>
-                <a:schemeClr val="tx1"/>
+                <a:schemeClr val="accent6">
+                  <a:lumMod val="10000"/>
+                </a:schemeClr>
               </a:solidFill>
             </a:endParaRPr>
           </a:p>
@@ -3264,7 +3296,9 @@
           <a:noFill/>
           <a:ln>
             <a:solidFill>
-              <a:schemeClr val="tx1"/>
+              <a:schemeClr val="accent6">
+                <a:lumMod val="10000"/>
+              </a:schemeClr>
             </a:solidFill>
           </a:ln>
         </p:spPr>
@@ -3292,7 +3326,9 @@
             <a:r>
               <a:rPr lang="en-US" dirty="0" smtClean="0">
                 <a:solidFill>
-                  <a:schemeClr val="tx1"/>
+                  <a:schemeClr val="accent6">
+                    <a:lumMod val="10000"/>
+                  </a:schemeClr>
                 </a:solidFill>
               </a:rPr>
               <a:t>Output Layer (</a:t>
@@ -3300,7 +3336,9 @@
             <a:r>
               <a:rPr lang="en-US" dirty="0" err="1" smtClean="0">
                 <a:solidFill>
-                  <a:schemeClr val="tx1"/>
+                  <a:schemeClr val="accent6">
+                    <a:lumMod val="10000"/>
+                  </a:schemeClr>
                 </a:solidFill>
               </a:rPr>
               <a:t>softmax</a:t>
@@ -3308,7 +3346,9 @@
             <a:r>
               <a:rPr lang="en-US" dirty="0" smtClean="0">
                 <a:solidFill>
-                  <a:schemeClr val="tx1"/>
+                  <a:schemeClr val="accent6">
+                    <a:lumMod val="10000"/>
+                  </a:schemeClr>
                 </a:solidFill>
               </a:rPr>
               <a:t>)</a:t>
@@ -3319,7 +3359,9 @@
             <a:r>
               <a:rPr lang="en-US" i="1" dirty="0" smtClean="0">
                 <a:solidFill>
-                  <a:schemeClr val="tx1"/>
+                  <a:schemeClr val="accent6">
+                    <a:lumMod val="10000"/>
+                  </a:schemeClr>
                 </a:solidFill>
               </a:rPr>
               <a:t>m</a:t>
@@ -3327,7 +3369,9 @@
             <a:r>
               <a:rPr lang="en-US" dirty="0" smtClean="0">
                 <a:solidFill>
-                  <a:schemeClr val="tx1"/>
+                  <a:schemeClr val="accent6">
+                    <a:lumMod val="10000"/>
+                  </a:schemeClr>
                 </a:solidFill>
               </a:rPr>
               <a:t> neurons</a:t>
@@ -3352,7 +3396,9 @@
           <a:noFill/>
           <a:ln>
             <a:solidFill>
-              <a:schemeClr val="tx1"/>
+              <a:schemeClr val="accent6">
+                <a:lumMod val="10000"/>
+              </a:schemeClr>
             </a:solidFill>
           </a:ln>
         </p:spPr>
@@ -3380,7 +3426,9 @@
             <a:r>
               <a:rPr lang="en-US" dirty="0" smtClean="0">
                 <a:solidFill>
-                  <a:schemeClr val="tx1"/>
+                  <a:schemeClr val="accent6">
+                    <a:lumMod val="10000"/>
+                  </a:schemeClr>
                 </a:solidFill>
               </a:rPr>
               <a:t>Input Layer</a:t>
@@ -3391,7 +3439,9 @@
             <a:r>
               <a:rPr lang="en-US" i="1" dirty="0" smtClean="0">
                 <a:solidFill>
-                  <a:schemeClr val="tx1"/>
+                  <a:schemeClr val="accent6">
+                    <a:lumMod val="10000"/>
+                  </a:schemeClr>
                 </a:solidFill>
               </a:rPr>
               <a:t>1</a:t>
@@ -3399,7 +3449,9 @@
             <a:r>
               <a:rPr lang="en-US" dirty="0" smtClean="0">
                 <a:solidFill>
-                  <a:schemeClr val="tx1"/>
+                  <a:schemeClr val="accent6">
+                    <a:lumMod val="10000"/>
+                  </a:schemeClr>
                 </a:solidFill>
               </a:rPr>
               <a:t> neuron</a:t>
@@ -3423,7 +3475,9 @@
           </a:prstGeom>
           <a:ln w="19050">
             <a:solidFill>
-              <a:schemeClr val="tx1"/>
+              <a:schemeClr val="accent6">
+                <a:lumMod val="10000"/>
+              </a:schemeClr>
             </a:solidFill>
             <a:tailEnd type="triangle"/>
           </a:ln>
@@ -3459,7 +3513,9 @@
           </a:prstGeom>
           <a:ln w="19050">
             <a:solidFill>
-              <a:schemeClr val="tx1"/>
+              <a:schemeClr val="accent6">
+                <a:lumMod val="10000"/>
+              </a:schemeClr>
             </a:solidFill>
             <a:tailEnd type="triangle"/>
           </a:ln>
@@ -3498,7 +3554,9 @@
           </a:prstGeom>
           <a:ln w="19050">
             <a:solidFill>
-              <a:schemeClr val="tx1"/>
+              <a:schemeClr val="accent6">
+                <a:lumMod val="10000"/>
+              </a:schemeClr>
             </a:solidFill>
             <a:tailEnd type="triangle"/>
           </a:ln>
@@ -3537,7 +3595,9 @@
           </a:prstGeom>
           <a:ln w="19050">
             <a:solidFill>
-              <a:schemeClr val="tx1"/>
+              <a:schemeClr val="accent6">
+                <a:lumMod val="10000"/>
+              </a:schemeClr>
             </a:solidFill>
             <a:tailEnd type="triangle"/>
           </a:ln>
@@ -3574,7 +3634,9 @@
           <a:noFill/>
           <a:ln>
             <a:solidFill>
-              <a:schemeClr val="tx1"/>
+              <a:schemeClr val="accent6">
+                <a:lumMod val="10000"/>
+              </a:schemeClr>
             </a:solidFill>
           </a:ln>
         </p:spPr>
@@ -3602,7 +3664,9 @@
             <a:r>
               <a:rPr lang="en-US" dirty="0" smtClean="0">
                 <a:solidFill>
-                  <a:schemeClr val="tx1"/>
+                  <a:schemeClr val="accent6">
+                    <a:lumMod val="10000"/>
+                  </a:schemeClr>
                 </a:solidFill>
               </a:rPr>
               <a:t>Dropout 20%</a:t>
@@ -3627,7 +3691,9 @@
           <a:noFill/>
           <a:ln>
             <a:solidFill>
-              <a:schemeClr val="tx1"/>
+              <a:schemeClr val="accent6">
+                <a:lumMod val="10000"/>
+              </a:schemeClr>
             </a:solidFill>
           </a:ln>
         </p:spPr>
@@ -3655,7 +3721,9 @@
             <a:r>
               <a:rPr lang="en-US" dirty="0" smtClean="0">
                 <a:solidFill>
-                  <a:schemeClr val="tx1"/>
+                  <a:schemeClr val="accent6">
+                    <a:lumMod val="10000"/>
+                  </a:schemeClr>
                 </a:solidFill>
               </a:rPr>
               <a:t>Dropout </a:t>
@@ -3663,7 +3731,9 @@
             <a:r>
               <a:rPr lang="en-US" dirty="0">
                 <a:solidFill>
-                  <a:schemeClr val="tx1"/>
+                  <a:schemeClr val="accent6">
+                    <a:lumMod val="10000"/>
+                  </a:schemeClr>
                 </a:solidFill>
               </a:rPr>
               <a:t>2</a:t>
@@ -3671,7 +3741,9 @@
             <a:r>
               <a:rPr lang="en-US" dirty="0" smtClean="0">
                 <a:solidFill>
-                  <a:schemeClr val="tx1"/>
+                  <a:schemeClr val="accent6">
+                    <a:lumMod val="10000"/>
+                  </a:schemeClr>
                 </a:solidFill>
               </a:rPr>
               <a:t>0%</a:t>
@@ -3695,7 +3767,9 @@
           </a:prstGeom>
           <a:ln w="19050">
             <a:solidFill>
-              <a:schemeClr val="tx1"/>
+              <a:schemeClr val="accent6">
+                <a:lumMod val="10000"/>
+              </a:schemeClr>
             </a:solidFill>
             <a:tailEnd type="triangle"/>
           </a:ln>
@@ -3731,7 +3805,9 @@
           </a:prstGeom>
           <a:ln w="19050">
             <a:solidFill>
-              <a:schemeClr val="tx1"/>
+              <a:schemeClr val="accent6">
+                <a:lumMod val="10000"/>
+              </a:schemeClr>
             </a:solidFill>
             <a:tailEnd type="triangle"/>
           </a:ln>
@@ -3798,7 +3874,9 @@
           <a:noFill/>
           <a:ln>
             <a:solidFill>
-              <a:schemeClr val="tx1"/>
+              <a:schemeClr val="accent6">
+                <a:lumMod val="10000"/>
+              </a:schemeClr>
             </a:solidFill>
           </a:ln>
         </p:spPr>
@@ -3826,7 +3904,9 @@
             <a:r>
               <a:rPr lang="en-US" dirty="0" smtClean="0">
                 <a:solidFill>
-                  <a:schemeClr val="tx1"/>
+                  <a:schemeClr val="accent6">
+                    <a:lumMod val="10000"/>
+                  </a:schemeClr>
                 </a:solidFill>
               </a:rPr>
               <a:t>LSTM Layer</a:t>
@@ -3837,7 +3917,9 @@
             <a:r>
               <a:rPr lang="en-US" i="1" dirty="0" err="1" smtClean="0">
                 <a:solidFill>
-                  <a:schemeClr val="tx1"/>
+                  <a:schemeClr val="accent6">
+                    <a:lumMod val="10000"/>
+                  </a:schemeClr>
                 </a:solidFill>
               </a:rPr>
               <a:t>m+n</a:t>
@@ -3845,7 +3927,9 @@
             <a:r>
               <a:rPr lang="en-US" dirty="0" smtClean="0">
                 <a:solidFill>
-                  <a:schemeClr val="tx1"/>
+                  <a:schemeClr val="accent6">
+                    <a:lumMod val="10000"/>
+                  </a:schemeClr>
                 </a:solidFill>
               </a:rPr>
               <a:t> </a:t>
@@ -3853,7 +3937,9 @@
             <a:r>
               <a:rPr lang="en-US" dirty="0">
                 <a:solidFill>
-                  <a:schemeClr val="tx1"/>
+                  <a:schemeClr val="accent6">
+                    <a:lumMod val="10000"/>
+                  </a:schemeClr>
                 </a:solidFill>
               </a:rPr>
               <a:t>n</a:t>
@@ -3861,14 +3947,18 @@
             <a:r>
               <a:rPr lang="en-US" dirty="0" smtClean="0">
                 <a:solidFill>
-                  <a:schemeClr val="tx1"/>
+                  <a:schemeClr val="accent6">
+                    <a:lumMod val="10000"/>
+                  </a:schemeClr>
                 </a:solidFill>
               </a:rPr>
               <a:t>eurons</a:t>
             </a:r>
             <a:endParaRPr lang="en-US" dirty="0">
               <a:solidFill>
-                <a:schemeClr val="tx1"/>
+                <a:schemeClr val="accent6">
+                  <a:lumMod val="10000"/>
+                </a:schemeClr>
               </a:solidFill>
             </a:endParaRPr>
           </a:p>
@@ -3891,7 +3981,9 @@
           <a:noFill/>
           <a:ln>
             <a:solidFill>
-              <a:schemeClr val="tx1"/>
+              <a:schemeClr val="accent6">
+                <a:lumMod val="10000"/>
+              </a:schemeClr>
             </a:solidFill>
           </a:ln>
         </p:spPr>
@@ -3919,7 +4011,9 @@
             <a:r>
               <a:rPr lang="en-US" dirty="0" smtClean="0">
                 <a:solidFill>
-                  <a:schemeClr val="tx1"/>
+                  <a:schemeClr val="accent6">
+                    <a:lumMod val="10000"/>
+                  </a:schemeClr>
                 </a:solidFill>
               </a:rPr>
               <a:t>LSTM Layer</a:t>
@@ -3930,7 +4024,9 @@
             <a:r>
               <a:rPr lang="en-US" i="1" dirty="0" err="1" smtClean="0">
                 <a:solidFill>
-                  <a:schemeClr val="tx1"/>
+                  <a:schemeClr val="accent6">
+                    <a:lumMod val="10000"/>
+                  </a:schemeClr>
                 </a:solidFill>
               </a:rPr>
               <a:t>m+n</a:t>
@@ -3938,7 +4034,9 @@
             <a:r>
               <a:rPr lang="en-US" dirty="0" smtClean="0">
                 <a:solidFill>
-                  <a:schemeClr val="tx1"/>
+                  <a:schemeClr val="accent6">
+                    <a:lumMod val="10000"/>
+                  </a:schemeClr>
                 </a:solidFill>
               </a:rPr>
               <a:t> </a:t>
@@ -3946,7 +4044,9 @@
             <a:r>
               <a:rPr lang="en-US" dirty="0">
                 <a:solidFill>
-                  <a:schemeClr val="tx1"/>
+                  <a:schemeClr val="accent6">
+                    <a:lumMod val="10000"/>
+                  </a:schemeClr>
                 </a:solidFill>
               </a:rPr>
               <a:t>n</a:t>
@@ -3954,14 +4054,18 @@
             <a:r>
               <a:rPr lang="en-US" dirty="0" smtClean="0">
                 <a:solidFill>
-                  <a:schemeClr val="tx1"/>
+                  <a:schemeClr val="accent6">
+                    <a:lumMod val="10000"/>
+                  </a:schemeClr>
                 </a:solidFill>
               </a:rPr>
               <a:t>eurons</a:t>
             </a:r>
             <a:endParaRPr lang="en-US" dirty="0">
               <a:solidFill>
-                <a:schemeClr val="tx1"/>
+                <a:schemeClr val="accent6">
+                  <a:lumMod val="10000"/>
+                </a:schemeClr>
               </a:solidFill>
             </a:endParaRPr>
           </a:p>
@@ -3984,7 +4088,9 @@
           <a:noFill/>
           <a:ln>
             <a:solidFill>
-              <a:schemeClr val="tx1"/>
+              <a:schemeClr val="accent6">
+                <a:lumMod val="10000"/>
+              </a:schemeClr>
             </a:solidFill>
           </a:ln>
         </p:spPr>
@@ -4012,7 +4118,9 @@
             <a:r>
               <a:rPr lang="en-US" dirty="0" smtClean="0">
                 <a:solidFill>
-                  <a:schemeClr val="tx1"/>
+                  <a:schemeClr val="accent6">
+                    <a:lumMod val="10000"/>
+                  </a:schemeClr>
                 </a:solidFill>
               </a:rPr>
               <a:t>Dropout 30%</a:t>
@@ -4037,7 +4145,9 @@
           <a:noFill/>
           <a:ln>
             <a:solidFill>
-              <a:schemeClr val="tx1"/>
+              <a:schemeClr val="accent6">
+                <a:lumMod val="10000"/>
+              </a:schemeClr>
             </a:solidFill>
           </a:ln>
         </p:spPr>
@@ -4065,7 +4175,9 @@
             <a:r>
               <a:rPr lang="en-US" dirty="0" smtClean="0">
                 <a:solidFill>
-                  <a:schemeClr val="tx1"/>
+                  <a:schemeClr val="accent6">
+                    <a:lumMod val="10000"/>
+                  </a:schemeClr>
                 </a:solidFill>
               </a:rPr>
               <a:t>Input Layer</a:t>
@@ -4076,7 +4188,9 @@
             <a:r>
               <a:rPr lang="en-US" i="1" dirty="0" smtClean="0">
                 <a:solidFill>
-                  <a:schemeClr val="tx1"/>
+                  <a:schemeClr val="accent6">
+                    <a:lumMod val="10000"/>
+                  </a:schemeClr>
                 </a:solidFill>
               </a:rPr>
               <a:t>n</a:t>
@@ -4084,7 +4198,9 @@
             <a:r>
               <a:rPr lang="en-US" dirty="0" smtClean="0">
                 <a:solidFill>
-                  <a:schemeClr val="tx1"/>
+                  <a:schemeClr val="accent6">
+                    <a:lumMod val="10000"/>
+                  </a:schemeClr>
                 </a:solidFill>
               </a:rPr>
               <a:t> neurons</a:t>
@@ -4111,7 +4227,9 @@
           </a:prstGeom>
           <a:ln w="19050">
             <a:solidFill>
-              <a:schemeClr val="tx1"/>
+              <a:schemeClr val="accent6">
+                <a:lumMod val="10000"/>
+              </a:schemeClr>
             </a:solidFill>
             <a:tailEnd type="triangle"/>
           </a:ln>
@@ -4150,7 +4268,9 @@
           </a:prstGeom>
           <a:ln w="19050">
             <a:solidFill>
-              <a:schemeClr val="tx1"/>
+              <a:schemeClr val="accent6">
+                <a:lumMod val="10000"/>
+              </a:schemeClr>
             </a:solidFill>
             <a:tailEnd type="triangle"/>
           </a:ln>
@@ -4189,7 +4309,9 @@
           </a:prstGeom>
           <a:ln w="19050">
             <a:solidFill>
-              <a:schemeClr val="tx1"/>
+              <a:schemeClr val="accent6">
+                <a:lumMod val="10000"/>
+              </a:schemeClr>
             </a:solidFill>
             <a:tailEnd type="triangle"/>
           </a:ln>
@@ -4226,7 +4348,9 @@
           <a:noFill/>
           <a:ln>
             <a:solidFill>
-              <a:schemeClr val="tx1"/>
+              <a:schemeClr val="accent6">
+                <a:lumMod val="10000"/>
+              </a:schemeClr>
             </a:solidFill>
           </a:ln>
         </p:spPr>
@@ -4254,7 +4378,9 @@
             <a:r>
               <a:rPr lang="en-US" dirty="0" smtClean="0">
                 <a:solidFill>
-                  <a:schemeClr val="tx1"/>
+                  <a:schemeClr val="accent6">
+                    <a:lumMod val="10000"/>
+                  </a:schemeClr>
                 </a:solidFill>
               </a:rPr>
               <a:t>Output Layer</a:t>
@@ -4265,7 +4391,9 @@
             <a:r>
               <a:rPr lang="en-US" i="1" dirty="0">
                 <a:solidFill>
-                  <a:schemeClr val="tx1"/>
+                  <a:schemeClr val="accent6">
+                    <a:lumMod val="10000"/>
+                  </a:schemeClr>
                 </a:solidFill>
               </a:rPr>
               <a:t>m</a:t>
@@ -4273,7 +4401,9 @@
             <a:r>
               <a:rPr lang="en-US" dirty="0" smtClean="0">
                 <a:solidFill>
-                  <a:schemeClr val="tx1"/>
+                  <a:schemeClr val="accent6">
+                    <a:lumMod val="10000"/>
+                  </a:schemeClr>
                 </a:solidFill>
               </a:rPr>
               <a:t> neurons</a:t>
@@ -4300,7 +4430,9 @@
           </a:prstGeom>
           <a:ln w="19050">
             <a:solidFill>
-              <a:schemeClr val="tx1"/>
+              <a:schemeClr val="accent6">
+                <a:lumMod val="10000"/>
+              </a:schemeClr>
             </a:solidFill>
             <a:tailEnd type="triangle"/>
           </a:ln>
@@ -4337,7 +4469,9 @@
           <a:noFill/>
           <a:ln>
             <a:solidFill>
-              <a:schemeClr val="tx1"/>
+              <a:schemeClr val="accent6">
+                <a:lumMod val="10000"/>
+              </a:schemeClr>
             </a:solidFill>
           </a:ln>
         </p:spPr>
@@ -4365,7 +4499,9 @@
             <a:r>
               <a:rPr lang="en-US" dirty="0" smtClean="0">
                 <a:solidFill>
-                  <a:schemeClr val="tx1"/>
+                  <a:schemeClr val="accent6">
+                    <a:lumMod val="10000"/>
+                  </a:schemeClr>
                 </a:solidFill>
               </a:rPr>
               <a:t>Dropout 30%</a:t>
@@ -4392,7 +4528,9 @@
           </a:prstGeom>
           <a:ln w="19050">
             <a:solidFill>
-              <a:schemeClr val="tx1"/>
+              <a:schemeClr val="accent6">
+                <a:lumMod val="10000"/>
+              </a:schemeClr>
             </a:solidFill>
             <a:tailEnd type="triangle"/>
           </a:ln>
@@ -4459,7 +4597,9 @@
           <a:noFill/>
           <a:ln>
             <a:solidFill>
-              <a:schemeClr val="tx1"/>
+              <a:schemeClr val="accent6">
+                <a:lumMod val="10000"/>
+              </a:schemeClr>
             </a:solidFill>
           </a:ln>
         </p:spPr>
@@ -4487,7 +4627,9 @@
             <a:r>
               <a:rPr lang="en-US" dirty="0" smtClean="0">
                 <a:solidFill>
-                  <a:schemeClr val="tx1"/>
+                  <a:schemeClr val="accent6">
+                    <a:lumMod val="10000"/>
+                  </a:schemeClr>
                 </a:solidFill>
               </a:rPr>
               <a:t>LSTM Layer</a:t>
@@ -4498,7 +4640,9 @@
             <a:r>
               <a:rPr lang="en-US" i="1" dirty="0" err="1" smtClean="0">
                 <a:solidFill>
-                  <a:schemeClr val="tx1"/>
+                  <a:schemeClr val="accent6">
+                    <a:lumMod val="10000"/>
+                  </a:schemeClr>
                 </a:solidFill>
               </a:rPr>
               <a:t>m+n</a:t>
@@ -4506,7 +4650,9 @@
             <a:r>
               <a:rPr lang="en-US" dirty="0" smtClean="0">
                 <a:solidFill>
-                  <a:schemeClr val="tx1"/>
+                  <a:schemeClr val="accent6">
+                    <a:lumMod val="10000"/>
+                  </a:schemeClr>
                 </a:solidFill>
               </a:rPr>
               <a:t> </a:t>
@@ -4514,7 +4660,9 @@
             <a:r>
               <a:rPr lang="en-US" dirty="0">
                 <a:solidFill>
-                  <a:schemeClr val="tx1"/>
+                  <a:schemeClr val="accent6">
+                    <a:lumMod val="10000"/>
+                  </a:schemeClr>
                 </a:solidFill>
               </a:rPr>
               <a:t>n</a:t>
@@ -4522,14 +4670,18 @@
             <a:r>
               <a:rPr lang="en-US" dirty="0" smtClean="0">
                 <a:solidFill>
-                  <a:schemeClr val="tx1"/>
+                  <a:schemeClr val="accent6">
+                    <a:lumMod val="10000"/>
+                  </a:schemeClr>
                 </a:solidFill>
               </a:rPr>
               <a:t>eurons</a:t>
             </a:r>
             <a:endParaRPr lang="en-US" dirty="0">
               <a:solidFill>
-                <a:schemeClr val="tx1"/>
+                <a:schemeClr val="accent6">
+                  <a:lumMod val="10000"/>
+                </a:schemeClr>
               </a:solidFill>
             </a:endParaRPr>
           </a:p>
@@ -4552,7 +4704,9 @@
           <a:noFill/>
           <a:ln>
             <a:solidFill>
-              <a:schemeClr val="tx1"/>
+              <a:schemeClr val="accent6">
+                <a:lumMod val="10000"/>
+              </a:schemeClr>
             </a:solidFill>
           </a:ln>
         </p:spPr>
@@ -4580,7 +4734,9 @@
             <a:r>
               <a:rPr lang="en-US" dirty="0" smtClean="0">
                 <a:solidFill>
-                  <a:schemeClr val="tx1"/>
+                  <a:schemeClr val="accent6">
+                    <a:lumMod val="10000"/>
+                  </a:schemeClr>
                 </a:solidFill>
               </a:rPr>
               <a:t>LSTM Layer</a:t>
@@ -4591,7 +4747,9 @@
             <a:r>
               <a:rPr lang="en-US" i="1" dirty="0" err="1" smtClean="0">
                 <a:solidFill>
-                  <a:schemeClr val="tx1"/>
+                  <a:schemeClr val="accent6">
+                    <a:lumMod val="10000"/>
+                  </a:schemeClr>
                 </a:solidFill>
               </a:rPr>
               <a:t>m+n</a:t>
@@ -4599,7 +4757,9 @@
             <a:r>
               <a:rPr lang="en-US" dirty="0" smtClean="0">
                 <a:solidFill>
-                  <a:schemeClr val="tx1"/>
+                  <a:schemeClr val="accent6">
+                    <a:lumMod val="10000"/>
+                  </a:schemeClr>
                 </a:solidFill>
               </a:rPr>
               <a:t> </a:t>
@@ -4607,7 +4767,9 @@
             <a:r>
               <a:rPr lang="en-US" dirty="0">
                 <a:solidFill>
-                  <a:schemeClr val="tx1"/>
+                  <a:schemeClr val="accent6">
+                    <a:lumMod val="10000"/>
+                  </a:schemeClr>
                 </a:solidFill>
               </a:rPr>
               <a:t>n</a:t>
@@ -4615,14 +4777,18 @@
             <a:r>
               <a:rPr lang="en-US" dirty="0" smtClean="0">
                 <a:solidFill>
-                  <a:schemeClr val="tx1"/>
+                  <a:schemeClr val="accent6">
+                    <a:lumMod val="10000"/>
+                  </a:schemeClr>
                 </a:solidFill>
               </a:rPr>
               <a:t>eurons</a:t>
             </a:r>
             <a:endParaRPr lang="en-US" dirty="0">
               <a:solidFill>
-                <a:schemeClr val="tx1"/>
+                <a:schemeClr val="accent6">
+                  <a:lumMod val="10000"/>
+                </a:schemeClr>
               </a:solidFill>
             </a:endParaRPr>
           </a:p>
@@ -4636,8 +4802,8 @@
         </p:nvSpPr>
         <p:spPr>
           <a:xfrm>
-            <a:off x="1933865" y="2440622"/>
-            <a:ext cx="3447288" cy="694944"/>
+            <a:off x="1933865" y="2445131"/>
+            <a:ext cx="3447288" cy="731520"/>
           </a:xfrm>
           <a:prstGeom prst="rect">
             <a:avLst/>
@@ -4645,7 +4811,9 @@
           <a:noFill/>
           <a:ln>
             <a:solidFill>
-              <a:schemeClr val="tx1"/>
+              <a:schemeClr val="accent6">
+                <a:lumMod val="10000"/>
+              </a:schemeClr>
             </a:solidFill>
           </a:ln>
         </p:spPr>
@@ -4673,7 +4841,9 @@
             <a:r>
               <a:rPr lang="en-US" dirty="0" smtClean="0">
                 <a:solidFill>
-                  <a:schemeClr val="tx1"/>
+                  <a:schemeClr val="accent6">
+                    <a:lumMod val="10000"/>
+                  </a:schemeClr>
                 </a:solidFill>
               </a:rPr>
               <a:t>Dropout 30%</a:t>
@@ -4698,7 +4868,9 @@
           <a:noFill/>
           <a:ln>
             <a:solidFill>
-              <a:schemeClr val="tx1"/>
+              <a:schemeClr val="accent6">
+                <a:lumMod val="10000"/>
+              </a:schemeClr>
             </a:solidFill>
           </a:ln>
         </p:spPr>
@@ -4726,7 +4898,9 @@
             <a:r>
               <a:rPr lang="en-US" dirty="0" smtClean="0">
                 <a:solidFill>
-                  <a:schemeClr val="tx1"/>
+                  <a:schemeClr val="accent6">
+                    <a:lumMod val="10000"/>
+                  </a:schemeClr>
                 </a:solidFill>
               </a:rPr>
               <a:t>Sequence + Data Input Layer</a:t>
@@ -4737,7 +4911,9 @@
             <a:r>
               <a:rPr lang="en-US" i="1" dirty="0" smtClean="0">
                 <a:solidFill>
-                  <a:schemeClr val="tx1"/>
+                  <a:schemeClr val="accent6">
+                    <a:lumMod val="10000"/>
+                  </a:schemeClr>
                 </a:solidFill>
               </a:rPr>
               <a:t>n</a:t>
@@ -4745,7 +4921,9 @@
             <a:r>
               <a:rPr lang="en-US" dirty="0" smtClean="0">
                 <a:solidFill>
-                  <a:schemeClr val="tx1"/>
+                  <a:schemeClr val="accent6">
+                    <a:lumMod val="10000"/>
+                  </a:schemeClr>
                 </a:solidFill>
               </a:rPr>
               <a:t> neurons</a:t>
@@ -4772,7 +4950,9 @@
           </a:prstGeom>
           <a:ln w="19050">
             <a:solidFill>
-              <a:schemeClr val="tx1"/>
+              <a:schemeClr val="accent6">
+                <a:lumMod val="10000"/>
+              </a:schemeClr>
             </a:solidFill>
             <a:tailEnd type="triangle"/>
           </a:ln>
@@ -4811,7 +4991,9 @@
           </a:prstGeom>
           <a:ln w="19050">
             <a:solidFill>
-              <a:schemeClr val="tx1"/>
+              <a:schemeClr val="accent6">
+                <a:lumMod val="10000"/>
+              </a:schemeClr>
             </a:solidFill>
             <a:tailEnd type="triangle"/>
           </a:ln>
@@ -4850,7 +5032,9 @@
           </a:prstGeom>
           <a:ln w="19050">
             <a:solidFill>
-              <a:schemeClr val="tx1"/>
+              <a:schemeClr val="accent6">
+                <a:lumMod val="10000"/>
+              </a:schemeClr>
             </a:solidFill>
             <a:tailEnd type="triangle"/>
           </a:ln>
@@ -4887,7 +5071,9 @@
           <a:noFill/>
           <a:ln>
             <a:solidFill>
-              <a:schemeClr val="tx1"/>
+              <a:schemeClr val="accent6">
+                <a:lumMod val="10000"/>
+              </a:schemeClr>
             </a:solidFill>
           </a:ln>
         </p:spPr>
@@ -4915,7 +5101,9 @@
             <a:r>
               <a:rPr lang="en-US" dirty="0" smtClean="0">
                 <a:solidFill>
-                  <a:schemeClr val="tx1"/>
+                  <a:schemeClr val="accent6">
+                    <a:lumMod val="10000"/>
+                  </a:schemeClr>
                 </a:solidFill>
               </a:rPr>
               <a:t>Dropout 30%</a:t>
@@ -4934,15 +5122,17 @@
         </p:nvCxnSpPr>
         <p:spPr>
           <a:xfrm flipV="1">
-            <a:off x="3657509" y="3135566"/>
-            <a:ext cx="0" cy="188371"/>
+            <a:off x="3657509" y="3176651"/>
+            <a:ext cx="0" cy="147286"/>
           </a:xfrm>
           <a:prstGeom prst="straightConnector1">
             <a:avLst/>
           </a:prstGeom>
           <a:ln w="19050">
             <a:solidFill>
-              <a:schemeClr val="tx1"/>
+              <a:schemeClr val="accent6">
+                <a:lumMod val="10000"/>
+              </a:schemeClr>
             </a:solidFill>
             <a:tailEnd type="triangle"/>
           </a:ln>
@@ -4970,8 +5160,8 @@
         </p:nvSpPr>
         <p:spPr>
           <a:xfrm>
-            <a:off x="5987197" y="2449640"/>
-            <a:ext cx="3447288" cy="691517"/>
+            <a:off x="5987197" y="2445131"/>
+            <a:ext cx="3447288" cy="731520"/>
           </a:xfrm>
           <a:prstGeom prst="rect">
             <a:avLst/>
@@ -4979,7 +5169,9 @@
           <a:noFill/>
           <a:ln>
             <a:solidFill>
-              <a:schemeClr val="tx1"/>
+              <a:schemeClr val="accent6">
+                <a:lumMod val="10000"/>
+              </a:schemeClr>
             </a:solidFill>
           </a:ln>
         </p:spPr>
@@ -5007,7 +5199,9 @@
             <a:r>
               <a:rPr lang="en-US" dirty="0" smtClean="0">
                 <a:solidFill>
-                  <a:schemeClr val="tx1"/>
+                  <a:schemeClr val="accent6">
+                    <a:lumMod val="10000"/>
+                  </a:schemeClr>
                 </a:solidFill>
               </a:rPr>
               <a:t>Dense Layer</a:t>
@@ -5018,7 +5212,9 @@
             <a:r>
               <a:rPr lang="en-US" i="1" dirty="0" smtClean="0">
                 <a:solidFill>
-                  <a:schemeClr val="tx1"/>
+                  <a:schemeClr val="accent6">
+                    <a:lumMod val="10000"/>
+                  </a:schemeClr>
                 </a:solidFill>
               </a:rPr>
               <a:t>500</a:t>
@@ -5026,14 +5222,18 @@
             <a:r>
               <a:rPr lang="en-US" dirty="0" smtClean="0">
                 <a:solidFill>
-                  <a:schemeClr val="tx1"/>
+                  <a:schemeClr val="accent6">
+                    <a:lumMod val="10000"/>
+                  </a:schemeClr>
                 </a:solidFill>
               </a:rPr>
               <a:t> neurons</a:t>
             </a:r>
             <a:endParaRPr lang="en-US" dirty="0">
               <a:solidFill>
-                <a:schemeClr val="tx1"/>
+                <a:schemeClr val="accent6">
+                  <a:lumMod val="10000"/>
+                </a:schemeClr>
               </a:solidFill>
             </a:endParaRPr>
           </a:p>
@@ -5056,7 +5256,9 @@
           <a:noFill/>
           <a:ln>
             <a:solidFill>
-              <a:schemeClr val="tx1"/>
+              <a:schemeClr val="accent6">
+                <a:lumMod val="10000"/>
+              </a:schemeClr>
             </a:solidFill>
           </a:ln>
         </p:spPr>
@@ -5084,7 +5286,9 @@
             <a:r>
               <a:rPr lang="en-US" dirty="0" smtClean="0">
                 <a:solidFill>
-                  <a:schemeClr val="tx1"/>
+                  <a:schemeClr val="accent6">
+                    <a:lumMod val="10000"/>
+                  </a:schemeClr>
                 </a:solidFill>
               </a:rPr>
               <a:t>Dense Layer (</a:t>
@@ -5092,7 +5296,9 @@
             <a:r>
               <a:rPr lang="en-US" i="1" dirty="0" err="1" smtClean="0">
                 <a:solidFill>
-                  <a:schemeClr val="tx1"/>
+                  <a:schemeClr val="accent6">
+                    <a:lumMod val="10000"/>
+                  </a:schemeClr>
                 </a:solidFill>
               </a:rPr>
               <a:t>ReLU</a:t>
@@ -5100,7 +5306,9 @@
             <a:r>
               <a:rPr lang="en-US" dirty="0" smtClean="0">
                 <a:solidFill>
-                  <a:schemeClr val="tx1"/>
+                  <a:schemeClr val="accent6">
+                    <a:lumMod val="10000"/>
+                  </a:schemeClr>
                 </a:solidFill>
               </a:rPr>
               <a:t>)</a:t>
@@ -5111,7 +5319,9 @@
             <a:r>
               <a:rPr lang="en-US" i="1" dirty="0">
                 <a:solidFill>
-                  <a:schemeClr val="tx1"/>
+                  <a:schemeClr val="accent6">
+                    <a:lumMod val="10000"/>
+                  </a:schemeClr>
                 </a:solidFill>
               </a:rPr>
               <a:t>m+n+500</a:t>
@@ -5119,7 +5329,9 @@
             <a:r>
               <a:rPr lang="en-US" dirty="0">
                 <a:solidFill>
-                  <a:schemeClr val="tx1"/>
+                  <a:schemeClr val="accent6">
+                    <a:lumMod val="10000"/>
+                  </a:schemeClr>
                 </a:solidFill>
               </a:rPr>
               <a:t> neurons</a:t>
@@ -5144,7 +5356,9 @@
           <a:noFill/>
           <a:ln>
             <a:solidFill>
-              <a:schemeClr val="tx1"/>
+              <a:schemeClr val="accent6">
+                <a:lumMod val="10000"/>
+              </a:schemeClr>
             </a:solidFill>
           </a:ln>
         </p:spPr>
@@ -5172,7 +5386,9 @@
             <a:r>
               <a:rPr lang="en-US" dirty="0" smtClean="0">
                 <a:solidFill>
-                  <a:schemeClr val="tx1"/>
+                  <a:schemeClr val="accent6">
+                    <a:lumMod val="10000"/>
+                  </a:schemeClr>
                 </a:solidFill>
               </a:rPr>
               <a:t>Dense Layer (</a:t>
@@ -5180,7 +5396,9 @@
             <a:r>
               <a:rPr lang="en-US" i="1" dirty="0" err="1" smtClean="0">
                 <a:solidFill>
-                  <a:schemeClr val="tx1"/>
+                  <a:schemeClr val="accent6">
+                    <a:lumMod val="10000"/>
+                  </a:schemeClr>
                 </a:solidFill>
               </a:rPr>
               <a:t>Softmax</a:t>
@@ -5188,7 +5406,9 @@
             <a:r>
               <a:rPr lang="en-US" dirty="0" smtClean="0">
                 <a:solidFill>
-                  <a:schemeClr val="tx1"/>
+                  <a:schemeClr val="accent6">
+                    <a:lumMod val="10000"/>
+                  </a:schemeClr>
                 </a:solidFill>
               </a:rPr>
               <a:t>)</a:t>
@@ -5196,21 +5416,27 @@
             <a:br>
               <a:rPr lang="en-US" dirty="0" smtClean="0">
                 <a:solidFill>
-                  <a:schemeClr val="tx1"/>
+                  <a:schemeClr val="accent6">
+                    <a:lumMod val="10000"/>
+                  </a:schemeClr>
                 </a:solidFill>
               </a:rPr>
             </a:br>
             <a:r>
               <a:rPr lang="en-US" i="1" dirty="0" smtClean="0">
                 <a:solidFill>
-                  <a:schemeClr val="tx1"/>
+                  <a:schemeClr val="accent6">
+                    <a:lumMod val="10000"/>
+                  </a:schemeClr>
                 </a:solidFill>
               </a:rPr>
               <a:t>m neurons</a:t>
             </a:r>
             <a:endParaRPr lang="en-US" dirty="0">
               <a:solidFill>
-                <a:schemeClr val="tx1"/>
+                <a:schemeClr val="accent6">
+                  <a:lumMod val="10000"/>
+                </a:schemeClr>
               </a:solidFill>
             </a:endParaRPr>
           </a:p>
@@ -5233,7 +5459,9 @@
           <a:noFill/>
           <a:ln>
             <a:solidFill>
-              <a:schemeClr val="tx1"/>
+              <a:schemeClr val="accent6">
+                <a:lumMod val="10000"/>
+              </a:schemeClr>
             </a:solidFill>
           </a:ln>
         </p:spPr>
@@ -5261,7 +5489,9 @@
             <a:r>
               <a:rPr lang="en-US" dirty="0" smtClean="0">
                 <a:solidFill>
-                  <a:schemeClr val="tx1"/>
+                  <a:schemeClr val="accent6">
+                    <a:lumMod val="10000"/>
+                  </a:schemeClr>
                 </a:solidFill>
               </a:rPr>
               <a:t>SP-2 Input Layer</a:t>
@@ -5272,7 +5502,9 @@
             <a:r>
               <a:rPr lang="en-US" i="1" dirty="0">
                 <a:solidFill>
-                  <a:schemeClr val="tx1"/>
+                  <a:schemeClr val="accent6">
+                    <a:lumMod val="10000"/>
+                  </a:schemeClr>
                 </a:solidFill>
               </a:rPr>
               <a:t>m</a:t>
@@ -5280,7 +5512,9 @@
             <a:r>
               <a:rPr lang="en-US" i="1" dirty="0" smtClean="0">
                 <a:solidFill>
-                  <a:schemeClr val="tx1"/>
+                  <a:schemeClr val="accent6">
+                    <a:lumMod val="10000"/>
+                  </a:schemeClr>
                 </a:solidFill>
               </a:rPr>
               <a:t>-1</a:t>
@@ -5288,7 +5522,9 @@
             <a:r>
               <a:rPr lang="en-US" dirty="0" smtClean="0">
                 <a:solidFill>
-                  <a:schemeClr val="tx1"/>
+                  <a:schemeClr val="accent6">
+                    <a:lumMod val="10000"/>
+                  </a:schemeClr>
                 </a:solidFill>
               </a:rPr>
               <a:t> neurons</a:t>
@@ -5307,15 +5543,17 @@
         </p:nvCxnSpPr>
         <p:spPr>
           <a:xfrm flipV="1">
-            <a:off x="7710841" y="3141157"/>
-            <a:ext cx="0" cy="178956"/>
+            <a:off x="7710841" y="3176651"/>
+            <a:ext cx="0" cy="143462"/>
           </a:xfrm>
           <a:prstGeom prst="straightConnector1">
             <a:avLst/>
           </a:prstGeom>
-          <a:ln>
+          <a:ln w="19050">
             <a:solidFill>
-              <a:schemeClr val="tx1"/>
+              <a:schemeClr val="accent6">
+                <a:lumMod val="10000"/>
+              </a:schemeClr>
             </a:solidFill>
             <a:tailEnd type="triangle"/>
           </a:ln>
@@ -5338,20 +5576,24 @@
       <p:cxnSp>
         <p:nvCxnSpPr>
           <p:cNvPr id="60" name="Elbow Connector 59"/>
-          <p:cNvCxnSpPr/>
+          <p:cNvCxnSpPr>
+            <a:stCxn id="55" idx="1"/>
+          </p:cNvCxnSpPr>
           <p:nvPr/>
         </p:nvCxnSpPr>
         <p:spPr>
           <a:xfrm rot="10800000">
             <a:off x="5698393" y="2239551"/>
-            <a:ext cx="288804" cy="543148"/>
+            <a:ext cx="288804" cy="571340"/>
           </a:xfrm>
           <a:prstGeom prst="bentConnector2">
             <a:avLst/>
           </a:prstGeom>
-          <a:ln>
+          <a:ln w="19050">
             <a:solidFill>
-              <a:schemeClr val="tx1"/>
+              <a:schemeClr val="accent6">
+                <a:lumMod val="10000"/>
+              </a:schemeClr>
             </a:solidFill>
             <a:tailEnd type="triangle"/>
           </a:ln>
@@ -5383,14 +5625,16 @@
         <p:spPr>
           <a:xfrm flipV="1">
             <a:off x="5381153" y="2252251"/>
-            <a:ext cx="317240" cy="535843"/>
+            <a:ext cx="317240" cy="558640"/>
           </a:xfrm>
           <a:prstGeom prst="bentConnector2">
             <a:avLst/>
           </a:prstGeom>
-          <a:ln>
+          <a:ln w="19050">
             <a:solidFill>
-              <a:schemeClr val="tx1"/>
+              <a:schemeClr val="accent6">
+                <a:lumMod val="10000"/>
+              </a:schemeClr>
             </a:solidFill>
             <a:tailEnd type="triangle"/>
           </a:ln>
@@ -5427,9 +5671,11 @@
           <a:prstGeom prst="straightConnector1">
             <a:avLst/>
           </a:prstGeom>
-          <a:ln>
+          <a:ln w="19050">
             <a:solidFill>
-              <a:schemeClr val="tx1"/>
+              <a:schemeClr val="accent6">
+                <a:lumMod val="10000"/>
+              </a:schemeClr>
             </a:solidFill>
             <a:tailEnd type="triangle"/>
           </a:ln>
@@ -5503,7 +5749,9 @@
           <a:noFill/>
           <a:ln>
             <a:solidFill>
-              <a:schemeClr val="tx1"/>
+              <a:schemeClr val="accent6">
+                <a:lumMod val="10000"/>
+              </a:schemeClr>
             </a:solidFill>
           </a:ln>
         </p:spPr>
@@ -5531,7 +5779,9 @@
             <a:r>
               <a:rPr lang="en-US" dirty="0" smtClean="0">
                 <a:solidFill>
-                  <a:schemeClr val="tx1"/>
+                  <a:schemeClr val="accent6">
+                    <a:lumMod val="10000"/>
+                  </a:schemeClr>
                 </a:solidFill>
               </a:rPr>
               <a:t>LSTM Layer</a:t>
@@ -5542,7 +5792,9 @@
             <a:r>
               <a:rPr lang="en-US" i="1" dirty="0" err="1" smtClean="0">
                 <a:solidFill>
-                  <a:schemeClr val="tx1"/>
+                  <a:schemeClr val="accent6">
+                    <a:lumMod val="10000"/>
+                  </a:schemeClr>
                 </a:solidFill>
               </a:rPr>
               <a:t>m+n</a:t>
@@ -5550,7 +5802,9 @@
             <a:r>
               <a:rPr lang="en-US" dirty="0" smtClean="0">
                 <a:solidFill>
-                  <a:schemeClr val="tx1"/>
+                  <a:schemeClr val="accent6">
+                    <a:lumMod val="10000"/>
+                  </a:schemeClr>
                 </a:solidFill>
               </a:rPr>
               <a:t> </a:t>
@@ -5558,7 +5812,9 @@
             <a:r>
               <a:rPr lang="en-US" dirty="0">
                 <a:solidFill>
-                  <a:schemeClr val="tx1"/>
+                  <a:schemeClr val="accent6">
+                    <a:lumMod val="10000"/>
+                  </a:schemeClr>
                 </a:solidFill>
               </a:rPr>
               <a:t>n</a:t>
@@ -5566,14 +5822,18 @@
             <a:r>
               <a:rPr lang="en-US" dirty="0" smtClean="0">
                 <a:solidFill>
-                  <a:schemeClr val="tx1"/>
+                  <a:schemeClr val="accent6">
+                    <a:lumMod val="10000"/>
+                  </a:schemeClr>
                 </a:solidFill>
               </a:rPr>
               <a:t>eurons</a:t>
             </a:r>
             <a:endParaRPr lang="en-US" dirty="0">
               <a:solidFill>
-                <a:schemeClr val="tx1"/>
+                <a:schemeClr val="accent6">
+                  <a:lumMod val="10000"/>
+                </a:schemeClr>
               </a:solidFill>
             </a:endParaRPr>
           </a:p>
@@ -5596,7 +5856,9 @@
           <a:noFill/>
           <a:ln>
             <a:solidFill>
-              <a:schemeClr val="tx1"/>
+              <a:schemeClr val="accent6">
+                <a:lumMod val="10000"/>
+              </a:schemeClr>
             </a:solidFill>
           </a:ln>
         </p:spPr>
@@ -5624,7 +5886,9 @@
             <a:r>
               <a:rPr lang="en-US" dirty="0" smtClean="0">
                 <a:solidFill>
-                  <a:schemeClr val="tx1"/>
+                  <a:schemeClr val="accent6">
+                    <a:lumMod val="10000"/>
+                  </a:schemeClr>
                 </a:solidFill>
               </a:rPr>
               <a:t>LSTM Layer</a:t>
@@ -5635,7 +5899,9 @@
             <a:r>
               <a:rPr lang="en-US" i="1" dirty="0" err="1" smtClean="0">
                 <a:solidFill>
-                  <a:schemeClr val="tx1"/>
+                  <a:schemeClr val="accent6">
+                    <a:lumMod val="10000"/>
+                  </a:schemeClr>
                 </a:solidFill>
               </a:rPr>
               <a:t>m+n</a:t>
@@ -5643,7 +5909,9 @@
             <a:r>
               <a:rPr lang="en-US" dirty="0" smtClean="0">
                 <a:solidFill>
-                  <a:schemeClr val="tx1"/>
+                  <a:schemeClr val="accent6">
+                    <a:lumMod val="10000"/>
+                  </a:schemeClr>
                 </a:solidFill>
               </a:rPr>
               <a:t> </a:t>
@@ -5651,7 +5919,9 @@
             <a:r>
               <a:rPr lang="en-US" dirty="0">
                 <a:solidFill>
-                  <a:schemeClr val="tx1"/>
+                  <a:schemeClr val="accent6">
+                    <a:lumMod val="10000"/>
+                  </a:schemeClr>
                 </a:solidFill>
               </a:rPr>
               <a:t>n</a:t>
@@ -5659,14 +5929,18 @@
             <a:r>
               <a:rPr lang="en-US" dirty="0" smtClean="0">
                 <a:solidFill>
-                  <a:schemeClr val="tx1"/>
+                  <a:schemeClr val="accent6">
+                    <a:lumMod val="10000"/>
+                  </a:schemeClr>
                 </a:solidFill>
               </a:rPr>
               <a:t>eurons</a:t>
             </a:r>
             <a:endParaRPr lang="en-US" dirty="0">
               <a:solidFill>
-                <a:schemeClr val="tx1"/>
+                <a:schemeClr val="accent6">
+                  <a:lumMod val="10000"/>
+                </a:schemeClr>
               </a:solidFill>
             </a:endParaRPr>
           </a:p>
@@ -5680,8 +5954,8 @@
         </p:nvSpPr>
         <p:spPr>
           <a:xfrm>
-            <a:off x="1933865" y="2440622"/>
-            <a:ext cx="3447288" cy="694944"/>
+            <a:off x="1933865" y="2438551"/>
+            <a:ext cx="3447288" cy="731520"/>
           </a:xfrm>
           <a:prstGeom prst="rect">
             <a:avLst/>
@@ -5689,7 +5963,9 @@
           <a:noFill/>
           <a:ln>
             <a:solidFill>
-              <a:schemeClr val="tx1"/>
+              <a:schemeClr val="accent6">
+                <a:lumMod val="10000"/>
+              </a:schemeClr>
             </a:solidFill>
           </a:ln>
         </p:spPr>
@@ -5717,7 +5993,9 @@
             <a:r>
               <a:rPr lang="en-US" dirty="0" smtClean="0">
                 <a:solidFill>
-                  <a:schemeClr val="tx1"/>
+                  <a:schemeClr val="accent6">
+                    <a:lumMod val="10000"/>
+                  </a:schemeClr>
                 </a:solidFill>
               </a:rPr>
               <a:t>Dropout 30%</a:t>
@@ -5742,7 +6020,9 @@
           <a:noFill/>
           <a:ln>
             <a:solidFill>
-              <a:schemeClr val="tx1"/>
+              <a:schemeClr val="accent6">
+                <a:lumMod val="10000"/>
+              </a:schemeClr>
             </a:solidFill>
           </a:ln>
         </p:spPr>
@@ -5770,7 +6050,9 @@
             <a:r>
               <a:rPr lang="en-US" dirty="0" smtClean="0">
                 <a:solidFill>
-                  <a:schemeClr val="tx1"/>
+                  <a:schemeClr val="accent6">
+                    <a:lumMod val="10000"/>
+                  </a:schemeClr>
                 </a:solidFill>
               </a:rPr>
               <a:t>Sequence + Data Input Layer</a:t>
@@ -5781,7 +6063,9 @@
             <a:r>
               <a:rPr lang="en-US" i="1" dirty="0" smtClean="0">
                 <a:solidFill>
-                  <a:schemeClr val="tx1"/>
+                  <a:schemeClr val="accent6">
+                    <a:lumMod val="10000"/>
+                  </a:schemeClr>
                 </a:solidFill>
               </a:rPr>
               <a:t>n</a:t>
@@ -5789,7 +6073,9 @@
             <a:r>
               <a:rPr lang="en-US" dirty="0" smtClean="0">
                 <a:solidFill>
-                  <a:schemeClr val="tx1"/>
+                  <a:schemeClr val="accent6">
+                    <a:lumMod val="10000"/>
+                  </a:schemeClr>
                 </a:solidFill>
               </a:rPr>
               <a:t> neurons</a:t>
@@ -5816,7 +6102,9 @@
           </a:prstGeom>
           <a:ln w="19050">
             <a:solidFill>
-              <a:schemeClr val="tx1"/>
+              <a:schemeClr val="accent6">
+                <a:lumMod val="10000"/>
+              </a:schemeClr>
             </a:solidFill>
             <a:tailEnd type="triangle"/>
           </a:ln>
@@ -5855,7 +6143,9 @@
           </a:prstGeom>
           <a:ln w="19050">
             <a:solidFill>
-              <a:schemeClr val="tx1"/>
+              <a:schemeClr val="accent6">
+                <a:lumMod val="10000"/>
+              </a:schemeClr>
             </a:solidFill>
             <a:tailEnd type="triangle"/>
           </a:ln>
@@ -5894,7 +6184,9 @@
           </a:prstGeom>
           <a:ln w="19050">
             <a:solidFill>
-              <a:schemeClr val="tx1"/>
+              <a:schemeClr val="accent6">
+                <a:lumMod val="10000"/>
+              </a:schemeClr>
             </a:solidFill>
             <a:tailEnd type="triangle"/>
           </a:ln>
@@ -5931,7 +6223,9 @@
           <a:noFill/>
           <a:ln>
             <a:solidFill>
-              <a:schemeClr val="tx1"/>
+              <a:schemeClr val="accent6">
+                <a:lumMod val="10000"/>
+              </a:schemeClr>
             </a:solidFill>
           </a:ln>
         </p:spPr>
@@ -5959,7 +6253,9 @@
             <a:r>
               <a:rPr lang="en-US" dirty="0" smtClean="0">
                 <a:solidFill>
-                  <a:schemeClr val="tx1"/>
+                  <a:schemeClr val="accent6">
+                    <a:lumMod val="10000"/>
+                  </a:schemeClr>
                 </a:solidFill>
               </a:rPr>
               <a:t>Dropout 30%</a:t>
@@ -5978,15 +6274,17 @@
         </p:nvCxnSpPr>
         <p:spPr>
           <a:xfrm flipV="1">
-            <a:off x="3657509" y="3135566"/>
-            <a:ext cx="0" cy="188371"/>
+            <a:off x="3657509" y="3170071"/>
+            <a:ext cx="0" cy="153866"/>
           </a:xfrm>
           <a:prstGeom prst="straightConnector1">
             <a:avLst/>
           </a:prstGeom>
           <a:ln w="19050">
             <a:solidFill>
-              <a:schemeClr val="tx1"/>
+              <a:schemeClr val="accent6">
+                <a:lumMod val="10000"/>
+              </a:schemeClr>
             </a:solidFill>
             <a:tailEnd type="triangle"/>
           </a:ln>
@@ -6014,8 +6312,8 @@
         </p:nvSpPr>
         <p:spPr>
           <a:xfrm>
-            <a:off x="5987197" y="2449640"/>
-            <a:ext cx="3447288" cy="691517"/>
+            <a:off x="5987197" y="2438551"/>
+            <a:ext cx="3447288" cy="731520"/>
           </a:xfrm>
           <a:prstGeom prst="rect">
             <a:avLst/>
@@ -6023,7 +6321,9 @@
           <a:noFill/>
           <a:ln>
             <a:solidFill>
-              <a:schemeClr val="tx1"/>
+              <a:schemeClr val="accent6">
+                <a:lumMod val="10000"/>
+              </a:schemeClr>
             </a:solidFill>
           </a:ln>
         </p:spPr>
@@ -6051,7 +6351,9 @@
             <a:r>
               <a:rPr lang="en-US" dirty="0" smtClean="0">
                 <a:solidFill>
-                  <a:schemeClr val="tx1"/>
+                  <a:schemeClr val="accent6">
+                    <a:lumMod val="10000"/>
+                  </a:schemeClr>
                 </a:solidFill>
               </a:rPr>
               <a:t>Dense Layer</a:t>
@@ -6062,7 +6364,9 @@
             <a:r>
               <a:rPr lang="en-US" i="1" dirty="0" smtClean="0">
                 <a:solidFill>
-                  <a:schemeClr val="tx1"/>
+                  <a:schemeClr val="accent6">
+                    <a:lumMod val="10000"/>
+                  </a:schemeClr>
                 </a:solidFill>
               </a:rPr>
               <a:t>500</a:t>
@@ -6070,14 +6374,18 @@
             <a:r>
               <a:rPr lang="en-US" dirty="0" smtClean="0">
                 <a:solidFill>
-                  <a:schemeClr val="tx1"/>
+                  <a:schemeClr val="accent6">
+                    <a:lumMod val="10000"/>
+                  </a:schemeClr>
                 </a:solidFill>
               </a:rPr>
               <a:t> neurons</a:t>
             </a:r>
             <a:endParaRPr lang="en-US" dirty="0">
               <a:solidFill>
-                <a:schemeClr val="tx1"/>
+                <a:schemeClr val="accent6">
+                  <a:lumMod val="10000"/>
+                </a:schemeClr>
               </a:solidFill>
             </a:endParaRPr>
           </a:p>
@@ -6100,7 +6408,9 @@
           <a:noFill/>
           <a:ln>
             <a:solidFill>
-              <a:schemeClr val="tx1"/>
+              <a:schemeClr val="accent6">
+                <a:lumMod val="10000"/>
+              </a:schemeClr>
             </a:solidFill>
           </a:ln>
         </p:spPr>
@@ -6128,7 +6438,9 @@
             <a:r>
               <a:rPr lang="en-US" dirty="0" smtClean="0">
                 <a:solidFill>
-                  <a:schemeClr val="tx1"/>
+                  <a:schemeClr val="accent6">
+                    <a:lumMod val="10000"/>
+                  </a:schemeClr>
                 </a:solidFill>
               </a:rPr>
               <a:t>Dense Layer (</a:t>
@@ -6136,7 +6448,9 @@
             <a:r>
               <a:rPr lang="en-US" i="1" dirty="0" err="1" smtClean="0">
                 <a:solidFill>
-                  <a:schemeClr val="tx1"/>
+                  <a:schemeClr val="accent6">
+                    <a:lumMod val="10000"/>
+                  </a:schemeClr>
                 </a:solidFill>
               </a:rPr>
               <a:t>ReLU</a:t>
@@ -6144,7 +6458,9 @@
             <a:r>
               <a:rPr lang="en-US" dirty="0" smtClean="0">
                 <a:solidFill>
-                  <a:schemeClr val="tx1"/>
+                  <a:schemeClr val="accent6">
+                    <a:lumMod val="10000"/>
+                  </a:schemeClr>
                 </a:solidFill>
               </a:rPr>
               <a:t>)</a:t>
@@ -6155,7 +6471,9 @@
             <a:r>
               <a:rPr lang="en-US" i="1" dirty="0">
                 <a:solidFill>
-                  <a:schemeClr val="tx1"/>
+                  <a:schemeClr val="accent6">
+                    <a:lumMod val="10000"/>
+                  </a:schemeClr>
                 </a:solidFill>
               </a:rPr>
               <a:t>m+n+500</a:t>
@@ -6163,7 +6481,9 @@
             <a:r>
               <a:rPr lang="en-US" dirty="0">
                 <a:solidFill>
-                  <a:schemeClr val="tx1"/>
+                  <a:schemeClr val="accent6">
+                    <a:lumMod val="10000"/>
+                  </a:schemeClr>
                 </a:solidFill>
               </a:rPr>
               <a:t> neurons</a:t>
@@ -6188,7 +6508,9 @@
           <a:noFill/>
           <a:ln>
             <a:solidFill>
-              <a:schemeClr val="tx1"/>
+              <a:schemeClr val="accent6">
+                <a:lumMod val="10000"/>
+              </a:schemeClr>
             </a:solidFill>
           </a:ln>
         </p:spPr>
@@ -6216,7 +6538,9 @@
             <a:r>
               <a:rPr lang="en-US" dirty="0" smtClean="0">
                 <a:solidFill>
-                  <a:schemeClr val="tx1"/>
+                  <a:schemeClr val="accent6">
+                    <a:lumMod val="10000"/>
+                  </a:schemeClr>
                 </a:solidFill>
               </a:rPr>
               <a:t>Dense Layer (</a:t>
@@ -6224,7 +6548,9 @@
             <a:r>
               <a:rPr lang="en-US" i="1" dirty="0" err="1" smtClean="0">
                 <a:solidFill>
-                  <a:schemeClr val="tx1"/>
+                  <a:schemeClr val="accent6">
+                    <a:lumMod val="10000"/>
+                  </a:schemeClr>
                 </a:solidFill>
               </a:rPr>
               <a:t>Softmax</a:t>
@@ -6232,7 +6558,9 @@
             <a:r>
               <a:rPr lang="en-US" dirty="0" smtClean="0">
                 <a:solidFill>
-                  <a:schemeClr val="tx1"/>
+                  <a:schemeClr val="accent6">
+                    <a:lumMod val="10000"/>
+                  </a:schemeClr>
                 </a:solidFill>
               </a:rPr>
               <a:t>)</a:t>
@@ -6240,21 +6568,27 @@
             <a:br>
               <a:rPr lang="en-US" dirty="0" smtClean="0">
                 <a:solidFill>
-                  <a:schemeClr val="tx1"/>
+                  <a:schemeClr val="accent6">
+                    <a:lumMod val="10000"/>
+                  </a:schemeClr>
                 </a:solidFill>
               </a:rPr>
             </a:br>
             <a:r>
               <a:rPr lang="en-US" i="1" dirty="0" smtClean="0">
                 <a:solidFill>
-                  <a:schemeClr val="tx1"/>
+                  <a:schemeClr val="accent6">
+                    <a:lumMod val="10000"/>
+                  </a:schemeClr>
                 </a:solidFill>
               </a:rPr>
               <a:t>m neurons</a:t>
             </a:r>
             <a:endParaRPr lang="en-US" dirty="0">
               <a:solidFill>
-                <a:schemeClr val="tx1"/>
+                <a:schemeClr val="accent6">
+                  <a:lumMod val="10000"/>
+                </a:schemeClr>
               </a:solidFill>
             </a:endParaRPr>
           </a:p>
@@ -6277,7 +6611,9 @@
           <a:noFill/>
           <a:ln>
             <a:solidFill>
-              <a:schemeClr val="tx1"/>
+              <a:schemeClr val="accent6">
+                <a:lumMod val="10000"/>
+              </a:schemeClr>
             </a:solidFill>
           </a:ln>
         </p:spPr>
@@ -6305,7 +6641,9 @@
             <a:r>
               <a:rPr lang="en-US" dirty="0" smtClean="0">
                 <a:solidFill>
-                  <a:schemeClr val="tx1"/>
+                  <a:schemeClr val="accent6">
+                    <a:lumMod val="10000"/>
+                  </a:schemeClr>
                 </a:solidFill>
               </a:rPr>
               <a:t>PFS Input Layer</a:t>
@@ -6316,7 +6654,9 @@
             <a:r>
               <a:rPr lang="en-US" i="1" dirty="0">
                 <a:solidFill>
-                  <a:schemeClr val="tx1"/>
+                  <a:schemeClr val="accent6">
+                    <a:lumMod val="10000"/>
+                  </a:schemeClr>
                 </a:solidFill>
               </a:rPr>
               <a:t>l</a:t>
@@ -6324,7 +6664,9 @@
             <a:r>
               <a:rPr lang="en-US" dirty="0" smtClean="0">
                 <a:solidFill>
-                  <a:schemeClr val="tx1"/>
+                  <a:schemeClr val="accent6">
+                    <a:lumMod val="10000"/>
+                  </a:schemeClr>
                 </a:solidFill>
               </a:rPr>
               <a:t> neurons</a:t>
@@ -6343,15 +6685,17 @@
         </p:nvCxnSpPr>
         <p:spPr>
           <a:xfrm flipV="1">
-            <a:off x="7710841" y="3141157"/>
-            <a:ext cx="0" cy="178956"/>
+            <a:off x="7710841" y="3170071"/>
+            <a:ext cx="0" cy="150042"/>
           </a:xfrm>
           <a:prstGeom prst="straightConnector1">
             <a:avLst/>
           </a:prstGeom>
-          <a:ln>
+          <a:ln w="19050">
             <a:solidFill>
-              <a:schemeClr val="tx1"/>
+              <a:schemeClr val="accent6">
+                <a:lumMod val="10000"/>
+              </a:schemeClr>
             </a:solidFill>
             <a:tailEnd type="triangle"/>
           </a:ln>
@@ -6374,20 +6718,24 @@
       <p:cxnSp>
         <p:nvCxnSpPr>
           <p:cNvPr id="60" name="Elbow Connector 59"/>
-          <p:cNvCxnSpPr/>
+          <p:cNvCxnSpPr>
+            <a:stCxn id="55" idx="1"/>
+          </p:cNvCxnSpPr>
           <p:nvPr/>
         </p:nvCxnSpPr>
         <p:spPr>
           <a:xfrm rot="10800000">
-            <a:off x="5698393" y="2239551"/>
-            <a:ext cx="288804" cy="543148"/>
+            <a:off x="5698393" y="2234297"/>
+            <a:ext cx="288804" cy="570014"/>
           </a:xfrm>
           <a:prstGeom prst="bentConnector2">
             <a:avLst/>
           </a:prstGeom>
-          <a:ln>
+          <a:ln w="19050">
             <a:solidFill>
-              <a:schemeClr val="tx1"/>
+              <a:schemeClr val="accent6">
+                <a:lumMod val="10000"/>
+              </a:schemeClr>
             </a:solidFill>
             <a:tailEnd type="triangle"/>
           </a:ln>
@@ -6419,14 +6767,16 @@
         <p:spPr>
           <a:xfrm flipV="1">
             <a:off x="5381153" y="2252251"/>
-            <a:ext cx="317240" cy="535843"/>
+            <a:ext cx="317240" cy="552060"/>
           </a:xfrm>
           <a:prstGeom prst="bentConnector2">
             <a:avLst/>
           </a:prstGeom>
-          <a:ln>
+          <a:ln w="19050">
             <a:solidFill>
-              <a:schemeClr val="tx1"/>
+              <a:schemeClr val="accent6">
+                <a:lumMod val="10000"/>
+              </a:schemeClr>
             </a:solidFill>
             <a:tailEnd type="triangle"/>
           </a:ln>
@@ -6463,9 +6813,11 @@
           <a:prstGeom prst="straightConnector1">
             <a:avLst/>
           </a:prstGeom>
-          <a:ln>
+          <a:ln w="19050">
             <a:solidFill>
-              <a:schemeClr val="tx1"/>
+              <a:schemeClr val="accent6">
+                <a:lumMod val="10000"/>
+              </a:schemeClr>
             </a:solidFill>
             <a:tailEnd type="triangle"/>
           </a:ln>

</xml_diff>

<commit_message>
Yeah methodology and pdf figures
</commit_message>
<xml_diff>
--- a/gfx/Thesis figures.pptx
+++ b/gfx/Thesis figures.pptx
@@ -4,16 +4,19 @@
   <p:sldMasterIdLst>
     <p:sldMasterId id="2147483648" r:id="rId1"/>
   </p:sldMasterIdLst>
+  <p:notesMasterIdLst>
+    <p:notesMasterId r:id="rId8"/>
+  </p:notesMasterIdLst>
   <p:sldIdLst>
     <p:sldId id="256" r:id="rId2"/>
     <p:sldId id="259" r:id="rId3"/>
     <p:sldId id="258" r:id="rId4"/>
-    <p:sldId id="260" r:id="rId5"/>
+    <p:sldId id="266" r:id="rId5"/>
     <p:sldId id="261" r:id="rId6"/>
     <p:sldId id="262" r:id="rId7"/>
   </p:sldIdLst>
   <p:sldSz cx="12192000" cy="6858000"/>
-  <p:notesSz cx="6858000" cy="9144000"/>
+  <p:notesSz cx="7315200" cy="12344400"/>
   <p:defaultTextStyle>
     <a:defPPr>
       <a:defRPr lang="en-US"/>
@@ -129,7 +132,7 @@
         </p14:section>
         <p14:section name="PFS architecture" id="{A91B8DB3-5341-4C8F-97A7-A06CE971D216}">
           <p14:sldIdLst>
-            <p14:sldId id="260"/>
+            <p14:sldId id="266"/>
           </p14:sldIdLst>
         </p14:section>
         <p14:section name="Next-step prediction" id="{179ACF2C-C82F-4269-8895-5271EB602782}">
@@ -149,6 +152,356 @@
     </p:ext>
   </p:extLst>
 </p:presentation>
+</file>
+
+<file path=ppt/notesMasters/notesMaster1.xml><?xml version="1.0" encoding="utf-8"?>
+<p:notesMaster xmlns:a="http://schemas.openxmlformats.org/drawingml/2006/main" xmlns:r="http://schemas.openxmlformats.org/officeDocument/2006/relationships" xmlns:p="http://schemas.openxmlformats.org/presentationml/2006/main">
+  <p:cSld>
+    <p:bg>
+      <p:bgRef idx="1001">
+        <a:schemeClr val="bg1"/>
+      </p:bgRef>
+    </p:bg>
+    <p:spTree>
+      <p:nvGrpSpPr>
+        <p:cNvPr id="1" name=""/>
+        <p:cNvGrpSpPr/>
+        <p:nvPr/>
+      </p:nvGrpSpPr>
+      <p:grpSpPr>
+        <a:xfrm>
+          <a:off x="0" y="0"/>
+          <a:ext cx="0" cy="0"/>
+          <a:chOff x="0" y="0"/>
+          <a:chExt cx="0" cy="0"/>
+        </a:xfrm>
+      </p:grpSpPr>
+      <p:sp>
+        <p:nvSpPr>
+          <p:cNvPr id="2" name="Header Placeholder 1"/>
+          <p:cNvSpPr>
+            <a:spLocks noGrp="1"/>
+          </p:cNvSpPr>
+          <p:nvPr>
+            <p:ph type="hdr" sz="quarter"/>
+          </p:nvPr>
+        </p:nvSpPr>
+        <p:spPr>
+          <a:xfrm>
+            <a:off x="2" y="2"/>
+            <a:ext cx="3170239" cy="618445"/>
+          </a:xfrm>
+          <a:prstGeom prst="rect">
+            <a:avLst/>
+          </a:prstGeom>
+        </p:spPr>
+        <p:txBody>
+          <a:bodyPr vert="horz" lIns="123434" tIns="61716" rIns="123434" bIns="61716" rtlCol="0"/>
+          <a:lstStyle>
+            <a:lvl1pPr algn="l">
+              <a:defRPr sz="1600"/>
+            </a:lvl1pPr>
+          </a:lstStyle>
+          <a:p>
+            <a:endParaRPr lang="en-US"/>
+          </a:p>
+        </p:txBody>
+      </p:sp>
+      <p:sp>
+        <p:nvSpPr>
+          <p:cNvPr id="3" name="Date Placeholder 2"/>
+          <p:cNvSpPr>
+            <a:spLocks noGrp="1"/>
+          </p:cNvSpPr>
+          <p:nvPr>
+            <p:ph type="dt" idx="1"/>
+          </p:nvPr>
+        </p:nvSpPr>
+        <p:spPr>
+          <a:xfrm>
+            <a:off x="4143375" y="2"/>
+            <a:ext cx="3170239" cy="618445"/>
+          </a:xfrm>
+          <a:prstGeom prst="rect">
+            <a:avLst/>
+          </a:prstGeom>
+        </p:spPr>
+        <p:txBody>
+          <a:bodyPr vert="horz" lIns="123434" tIns="61716" rIns="123434" bIns="61716" rtlCol="0"/>
+          <a:lstStyle>
+            <a:lvl1pPr algn="r">
+              <a:defRPr sz="1600"/>
+            </a:lvl1pPr>
+          </a:lstStyle>
+          <a:p>
+            <a:fld id="{0F0D45A1-12FA-4DDB-9899-05481FB1D8F3}" type="datetimeFigureOut">
+              <a:rPr lang="en-US" smtClean="0"/>
+              <a:t>1/16/2019</a:t>
+            </a:fld>
+            <a:endParaRPr lang="en-US"/>
+          </a:p>
+        </p:txBody>
+      </p:sp>
+      <p:sp>
+        <p:nvSpPr>
+          <p:cNvPr id="4" name="Slide Image Placeholder 3"/>
+          <p:cNvSpPr>
+            <a:spLocks noGrp="1" noRot="1" noChangeAspect="1"/>
+          </p:cNvSpPr>
+          <p:nvPr>
+            <p:ph type="sldImg" idx="2"/>
+          </p:nvPr>
+        </p:nvSpPr>
+        <p:spPr>
+          <a:xfrm>
+            <a:off x="-49213" y="1539875"/>
+            <a:ext cx="7413626" cy="4170363"/>
+          </a:xfrm>
+          <a:prstGeom prst="rect">
+            <a:avLst/>
+          </a:prstGeom>
+          <a:noFill/>
+          <a:ln w="12700">
+            <a:solidFill>
+              <a:prstClr val="black"/>
+            </a:solidFill>
+          </a:ln>
+        </p:spPr>
+        <p:txBody>
+          <a:bodyPr vert="horz" lIns="123434" tIns="61716" rIns="123434" bIns="61716" rtlCol="0" anchor="ctr"/>
+          <a:lstStyle/>
+          <a:p>
+            <a:endParaRPr lang="en-US"/>
+          </a:p>
+        </p:txBody>
+      </p:sp>
+      <p:sp>
+        <p:nvSpPr>
+          <p:cNvPr id="5" name="Notes Placeholder 4"/>
+          <p:cNvSpPr>
+            <a:spLocks noGrp="1"/>
+          </p:cNvSpPr>
+          <p:nvPr>
+            <p:ph type="body" sz="quarter" idx="3"/>
+          </p:nvPr>
+        </p:nvSpPr>
+        <p:spPr>
+          <a:xfrm>
+            <a:off x="731845" y="5941563"/>
+            <a:ext cx="5851526" cy="4859791"/>
+          </a:xfrm>
+          <a:prstGeom prst="rect">
+            <a:avLst/>
+          </a:prstGeom>
+        </p:spPr>
+        <p:txBody>
+          <a:bodyPr vert="horz" lIns="123434" tIns="61716" rIns="123434" bIns="61716" rtlCol="0"/>
+          <a:lstStyle/>
+          <a:p>
+            <a:pPr lvl="0"/>
+            <a:r>
+              <a:rPr lang="en-US" smtClean="0"/>
+              <a:t>Edit Master text styles</a:t>
+            </a:r>
+          </a:p>
+          <a:p>
+            <a:pPr lvl="1"/>
+            <a:r>
+              <a:rPr lang="en-US" smtClean="0"/>
+              <a:t>Second level</a:t>
+            </a:r>
+          </a:p>
+          <a:p>
+            <a:pPr lvl="2"/>
+            <a:r>
+              <a:rPr lang="en-US" smtClean="0"/>
+              <a:t>Third level</a:t>
+            </a:r>
+          </a:p>
+          <a:p>
+            <a:pPr lvl="3"/>
+            <a:r>
+              <a:rPr lang="en-US" smtClean="0"/>
+              <a:t>Fourth level</a:t>
+            </a:r>
+          </a:p>
+          <a:p>
+            <a:pPr lvl="4"/>
+            <a:r>
+              <a:rPr lang="en-US" smtClean="0"/>
+              <a:t>Fifth level</a:t>
+            </a:r>
+            <a:endParaRPr lang="en-US"/>
+          </a:p>
+        </p:txBody>
+      </p:sp>
+      <p:sp>
+        <p:nvSpPr>
+          <p:cNvPr id="6" name="Footer Placeholder 5"/>
+          <p:cNvSpPr>
+            <a:spLocks noGrp="1"/>
+          </p:cNvSpPr>
+          <p:nvPr>
+            <p:ph type="ftr" sz="quarter" idx="4"/>
+          </p:nvPr>
+        </p:nvSpPr>
+        <p:spPr>
+          <a:xfrm>
+            <a:off x="2" y="11725957"/>
+            <a:ext cx="3170239" cy="618445"/>
+          </a:xfrm>
+          <a:prstGeom prst="rect">
+            <a:avLst/>
+          </a:prstGeom>
+        </p:spPr>
+        <p:txBody>
+          <a:bodyPr vert="horz" lIns="123434" tIns="61716" rIns="123434" bIns="61716" rtlCol="0" anchor="b"/>
+          <a:lstStyle>
+            <a:lvl1pPr algn="l">
+              <a:defRPr sz="1600"/>
+            </a:lvl1pPr>
+          </a:lstStyle>
+          <a:p>
+            <a:endParaRPr lang="en-US"/>
+          </a:p>
+        </p:txBody>
+      </p:sp>
+      <p:sp>
+        <p:nvSpPr>
+          <p:cNvPr id="7" name="Slide Number Placeholder 6"/>
+          <p:cNvSpPr>
+            <a:spLocks noGrp="1"/>
+          </p:cNvSpPr>
+          <p:nvPr>
+            <p:ph type="sldNum" sz="quarter" idx="5"/>
+          </p:nvPr>
+        </p:nvSpPr>
+        <p:spPr>
+          <a:xfrm>
+            <a:off x="4143375" y="11725957"/>
+            <a:ext cx="3170239" cy="618445"/>
+          </a:xfrm>
+          <a:prstGeom prst="rect">
+            <a:avLst/>
+          </a:prstGeom>
+        </p:spPr>
+        <p:txBody>
+          <a:bodyPr vert="horz" lIns="123434" tIns="61716" rIns="123434" bIns="61716" rtlCol="0" anchor="b"/>
+          <a:lstStyle>
+            <a:lvl1pPr algn="r">
+              <a:defRPr sz="1600"/>
+            </a:lvl1pPr>
+          </a:lstStyle>
+          <a:p>
+            <a:fld id="{2D2444FE-529D-4BE4-8405-8B20CEC612FF}" type="slidenum">
+              <a:rPr lang="en-US" smtClean="0"/>
+              <a:t>‹#›</a:t>
+            </a:fld>
+            <a:endParaRPr lang="en-US"/>
+          </a:p>
+        </p:txBody>
+      </p:sp>
+    </p:spTree>
+    <p:extLst>
+      <p:ext uri="{BB962C8B-B14F-4D97-AF65-F5344CB8AC3E}">
+        <p14:creationId xmlns:p14="http://schemas.microsoft.com/office/powerpoint/2010/main" val="422755185"/>
+      </p:ext>
+    </p:extLst>
+  </p:cSld>
+  <p:clrMap bg1="lt1" tx1="dk1" bg2="lt2" tx2="dk2" accent1="accent1" accent2="accent2" accent3="accent3" accent4="accent4" accent5="accent5" accent6="accent6" hlink="hlink" folHlink="folHlink"/>
+  <p:notesStyle>
+    <a:lvl1pPr marL="0" algn="l" defTabSz="914400" rtl="0" eaLnBrk="1" latinLnBrk="0" hangingPunct="1">
+      <a:defRPr sz="1200" kern="1200">
+        <a:solidFill>
+          <a:schemeClr val="tx1"/>
+        </a:solidFill>
+        <a:latin typeface="+mn-lt"/>
+        <a:ea typeface="+mn-ea"/>
+        <a:cs typeface="+mn-cs"/>
+      </a:defRPr>
+    </a:lvl1pPr>
+    <a:lvl2pPr marL="457200" algn="l" defTabSz="914400" rtl="0" eaLnBrk="1" latinLnBrk="0" hangingPunct="1">
+      <a:defRPr sz="1200" kern="1200">
+        <a:solidFill>
+          <a:schemeClr val="tx1"/>
+        </a:solidFill>
+        <a:latin typeface="+mn-lt"/>
+        <a:ea typeface="+mn-ea"/>
+        <a:cs typeface="+mn-cs"/>
+      </a:defRPr>
+    </a:lvl2pPr>
+    <a:lvl3pPr marL="914400" algn="l" defTabSz="914400" rtl="0" eaLnBrk="1" latinLnBrk="0" hangingPunct="1">
+      <a:defRPr sz="1200" kern="1200">
+        <a:solidFill>
+          <a:schemeClr val="tx1"/>
+        </a:solidFill>
+        <a:latin typeface="+mn-lt"/>
+        <a:ea typeface="+mn-ea"/>
+        <a:cs typeface="+mn-cs"/>
+      </a:defRPr>
+    </a:lvl3pPr>
+    <a:lvl4pPr marL="1371600" algn="l" defTabSz="914400" rtl="0" eaLnBrk="1" latinLnBrk="0" hangingPunct="1">
+      <a:defRPr sz="1200" kern="1200">
+        <a:solidFill>
+          <a:schemeClr val="tx1"/>
+        </a:solidFill>
+        <a:latin typeface="+mn-lt"/>
+        <a:ea typeface="+mn-ea"/>
+        <a:cs typeface="+mn-cs"/>
+      </a:defRPr>
+    </a:lvl4pPr>
+    <a:lvl5pPr marL="1828800" algn="l" defTabSz="914400" rtl="0" eaLnBrk="1" latinLnBrk="0" hangingPunct="1">
+      <a:defRPr sz="1200" kern="1200">
+        <a:solidFill>
+          <a:schemeClr val="tx1"/>
+        </a:solidFill>
+        <a:latin typeface="+mn-lt"/>
+        <a:ea typeface="+mn-ea"/>
+        <a:cs typeface="+mn-cs"/>
+      </a:defRPr>
+    </a:lvl5pPr>
+    <a:lvl6pPr marL="2286000" algn="l" defTabSz="914400" rtl="0" eaLnBrk="1" latinLnBrk="0" hangingPunct="1">
+      <a:defRPr sz="1200" kern="1200">
+        <a:solidFill>
+          <a:schemeClr val="tx1"/>
+        </a:solidFill>
+        <a:latin typeface="+mn-lt"/>
+        <a:ea typeface="+mn-ea"/>
+        <a:cs typeface="+mn-cs"/>
+      </a:defRPr>
+    </a:lvl6pPr>
+    <a:lvl7pPr marL="2743200" algn="l" defTabSz="914400" rtl="0" eaLnBrk="1" latinLnBrk="0" hangingPunct="1">
+      <a:defRPr sz="1200" kern="1200">
+        <a:solidFill>
+          <a:schemeClr val="tx1"/>
+        </a:solidFill>
+        <a:latin typeface="+mn-lt"/>
+        <a:ea typeface="+mn-ea"/>
+        <a:cs typeface="+mn-cs"/>
+      </a:defRPr>
+    </a:lvl7pPr>
+    <a:lvl8pPr marL="3200400" algn="l" defTabSz="914400" rtl="0" eaLnBrk="1" latinLnBrk="0" hangingPunct="1">
+      <a:defRPr sz="1200" kern="1200">
+        <a:solidFill>
+          <a:schemeClr val="tx1"/>
+        </a:solidFill>
+        <a:latin typeface="+mn-lt"/>
+        <a:ea typeface="+mn-ea"/>
+        <a:cs typeface="+mn-cs"/>
+      </a:defRPr>
+    </a:lvl8pPr>
+    <a:lvl9pPr marL="3657600" algn="l" defTabSz="914400" rtl="0" eaLnBrk="1" latinLnBrk="0" hangingPunct="1">
+      <a:defRPr sz="1200" kern="1200">
+        <a:solidFill>
+          <a:schemeClr val="tx1"/>
+        </a:solidFill>
+        <a:latin typeface="+mn-lt"/>
+        <a:ea typeface="+mn-ea"/>
+        <a:cs typeface="+mn-cs"/>
+      </a:defRPr>
+    </a:lvl9pPr>
+  </p:notesStyle>
+</p:notesMaster>
 </file>
 
 <file path=ppt/slideLayouts/slideLayout1.xml><?xml version="1.0" encoding="utf-8"?>
@@ -282,7 +635,7 @@
           <a:p>
             <a:fld id="{3971B8E7-E4D3-4F8A-8C05-81E1A0A9E2AB}" type="datetimeFigureOut">
               <a:rPr lang="en-US" smtClean="0"/>
-              <a:t>1/15/2019</a:t>
+              <a:t>1/16/2019</a:t>
             </a:fld>
             <a:endParaRPr lang="en-US"/>
           </a:p>
@@ -452,7 +805,7 @@
           <a:p>
             <a:fld id="{3971B8E7-E4D3-4F8A-8C05-81E1A0A9E2AB}" type="datetimeFigureOut">
               <a:rPr lang="en-US" smtClean="0"/>
-              <a:t>1/15/2019</a:t>
+              <a:t>1/16/2019</a:t>
             </a:fld>
             <a:endParaRPr lang="en-US"/>
           </a:p>
@@ -632,7 +985,7 @@
           <a:p>
             <a:fld id="{3971B8E7-E4D3-4F8A-8C05-81E1A0A9E2AB}" type="datetimeFigureOut">
               <a:rPr lang="en-US" smtClean="0"/>
-              <a:t>1/15/2019</a:t>
+              <a:t>1/16/2019</a:t>
             </a:fld>
             <a:endParaRPr lang="en-US"/>
           </a:p>
@@ -802,7 +1155,7 @@
           <a:p>
             <a:fld id="{3971B8E7-E4D3-4F8A-8C05-81E1A0A9E2AB}" type="datetimeFigureOut">
               <a:rPr lang="en-US" smtClean="0"/>
-              <a:t>1/15/2019</a:t>
+              <a:t>1/16/2019</a:t>
             </a:fld>
             <a:endParaRPr lang="en-US"/>
           </a:p>
@@ -1048,7 +1401,7 @@
           <a:p>
             <a:fld id="{3971B8E7-E4D3-4F8A-8C05-81E1A0A9E2AB}" type="datetimeFigureOut">
               <a:rPr lang="en-US" smtClean="0"/>
-              <a:t>1/15/2019</a:t>
+              <a:t>1/16/2019</a:t>
             </a:fld>
             <a:endParaRPr lang="en-US"/>
           </a:p>
@@ -1280,7 +1633,7 @@
           <a:p>
             <a:fld id="{3971B8E7-E4D3-4F8A-8C05-81E1A0A9E2AB}" type="datetimeFigureOut">
               <a:rPr lang="en-US" smtClean="0"/>
-              <a:t>1/15/2019</a:t>
+              <a:t>1/16/2019</a:t>
             </a:fld>
             <a:endParaRPr lang="en-US"/>
           </a:p>
@@ -1647,7 +2000,7 @@
           <a:p>
             <a:fld id="{3971B8E7-E4D3-4F8A-8C05-81E1A0A9E2AB}" type="datetimeFigureOut">
               <a:rPr lang="en-US" smtClean="0"/>
-              <a:t>1/15/2019</a:t>
+              <a:t>1/16/2019</a:t>
             </a:fld>
             <a:endParaRPr lang="en-US"/>
           </a:p>
@@ -1765,7 +2118,7 @@
           <a:p>
             <a:fld id="{3971B8E7-E4D3-4F8A-8C05-81E1A0A9E2AB}" type="datetimeFigureOut">
               <a:rPr lang="en-US" smtClean="0"/>
-              <a:t>1/15/2019</a:t>
+              <a:t>1/16/2019</a:t>
             </a:fld>
             <a:endParaRPr lang="en-US"/>
           </a:p>
@@ -1860,7 +2213,7 @@
           <a:p>
             <a:fld id="{3971B8E7-E4D3-4F8A-8C05-81E1A0A9E2AB}" type="datetimeFigureOut">
               <a:rPr lang="en-US" smtClean="0"/>
-              <a:t>1/15/2019</a:t>
+              <a:t>1/16/2019</a:t>
             </a:fld>
             <a:endParaRPr lang="en-US"/>
           </a:p>
@@ -2137,7 +2490,7 @@
           <a:p>
             <a:fld id="{3971B8E7-E4D3-4F8A-8C05-81E1A0A9E2AB}" type="datetimeFigureOut">
               <a:rPr lang="en-US" smtClean="0"/>
-              <a:t>1/15/2019</a:t>
+              <a:t>1/16/2019</a:t>
             </a:fld>
             <a:endParaRPr lang="en-US"/>
           </a:p>
@@ -2390,7 +2743,7 @@
           <a:p>
             <a:fld id="{3971B8E7-E4D3-4F8A-8C05-81E1A0A9E2AB}" type="datetimeFigureOut">
               <a:rPr lang="en-US" smtClean="0"/>
-              <a:t>1/15/2019</a:t>
+              <a:t>1/16/2019</a:t>
             </a:fld>
             <a:endParaRPr lang="en-US"/>
           </a:p>
@@ -2603,7 +2956,7 @@
           <a:p>
             <a:fld id="{3971B8E7-E4D3-4F8A-8C05-81E1A0A9E2AB}" type="datetimeFigureOut">
               <a:rPr lang="en-US" smtClean="0"/>
-              <a:t>1/15/2019</a:t>
+              <a:t>1/16/2019</a:t>
             </a:fld>
             <a:endParaRPr lang="en-US"/>
           </a:p>
@@ -3015,15 +3368,15 @@
           <p:nvPr/>
         </p:nvSpPr>
         <p:spPr>
-          <a:xfrm>
-            <a:off x="4125058" y="5018459"/>
-            <a:ext cx="3446584" cy="844062"/>
+          <a:xfrm rot="16200000">
+            <a:off x="6534735" y="2647664"/>
+            <a:ext cx="6205426" cy="1519698"/>
           </a:xfrm>
           <a:prstGeom prst="rect">
             <a:avLst/>
           </a:prstGeom>
           <a:noFill/>
-          <a:ln>
+          <a:ln w="28575">
             <a:solidFill>
               <a:schemeClr val="accent6">
                 <a:lumMod val="10000"/>
@@ -3053,7 +3406,7 @@
           <a:p>
             <a:pPr algn="ctr"/>
             <a:r>
-              <a:rPr lang="en-US" dirty="0" smtClean="0">
+              <a:rPr lang="en-US" sz="4400" dirty="0" smtClean="0">
                 <a:solidFill>
                   <a:schemeClr val="accent6">
                     <a:lumMod val="10000"/>
@@ -3066,7 +3419,7 @@
           <a:p>
             <a:pPr algn="ctr"/>
             <a:r>
-              <a:rPr lang="en-US" i="1" dirty="0" smtClean="0">
+              <a:rPr lang="en-US" sz="4400" i="1" dirty="0" smtClean="0">
                 <a:solidFill>
                   <a:schemeClr val="accent6">
                     <a:lumMod val="10000"/>
@@ -3076,7 +3429,7 @@
               <a:t>500</a:t>
             </a:r>
             <a:r>
-              <a:rPr lang="en-US" dirty="0" smtClean="0">
+              <a:rPr lang="en-US" sz="4400" dirty="0" smtClean="0">
                 <a:solidFill>
                   <a:schemeClr val="accent6">
                     <a:lumMod val="10000"/>
@@ -3085,7 +3438,7 @@
               </a:rPr>
               <a:t> neurons</a:t>
             </a:r>
-            <a:endParaRPr lang="en-US" dirty="0">
+            <a:endParaRPr lang="en-US" sz="4400" dirty="0">
               <a:solidFill>
                 <a:schemeClr val="accent6">
                   <a:lumMod val="10000"/>
@@ -3102,15 +3455,15 @@
           <p:nvPr/>
         </p:nvSpPr>
         <p:spPr>
-          <a:xfrm>
-            <a:off x="4125058" y="4033720"/>
-            <a:ext cx="3446584" cy="844062"/>
+          <a:xfrm rot="16200000">
+            <a:off x="4761755" y="2647664"/>
+            <a:ext cx="6205426" cy="1519698"/>
           </a:xfrm>
           <a:prstGeom prst="rect">
             <a:avLst/>
           </a:prstGeom>
           <a:noFill/>
-          <a:ln>
+          <a:ln w="28575">
             <a:solidFill>
               <a:schemeClr val="accent6">
                 <a:lumMod val="10000"/>
@@ -3140,7 +3493,7 @@
           <a:p>
             <a:pPr algn="ctr"/>
             <a:r>
-              <a:rPr lang="en-US" dirty="0" smtClean="0">
+              <a:rPr lang="en-US" sz="4400" dirty="0" smtClean="0">
                 <a:solidFill>
                   <a:schemeClr val="accent6">
                     <a:lumMod val="10000"/>
@@ -3153,7 +3506,7 @@
           <a:p>
             <a:pPr algn="ctr"/>
             <a:r>
-              <a:rPr lang="en-US" i="1" dirty="0" smtClean="0">
+              <a:rPr lang="en-US" sz="4400" i="1" dirty="0" smtClean="0">
                 <a:solidFill>
                   <a:schemeClr val="accent6">
                     <a:lumMod val="10000"/>
@@ -3163,26 +3516,16 @@
               <a:t>500</a:t>
             </a:r>
             <a:r>
-              <a:rPr lang="en-US" dirty="0" smtClean="0">
-                <a:solidFill>
-                  <a:schemeClr val="accent6">
-                    <a:lumMod val="10000"/>
-                  </a:schemeClr>
-                </a:solidFill>
-              </a:rPr>
-              <a:t> </a:t>
-            </a:r>
-            <a:r>
-              <a:rPr lang="en-US" u="sng" dirty="0" smtClean="0">
-                <a:solidFill>
-                  <a:schemeClr val="accent6">
-                    <a:lumMod val="10000"/>
-                  </a:schemeClr>
-                </a:solidFill>
-              </a:rPr>
-              <a:t>neurons</a:t>
-            </a:r>
-            <a:endParaRPr lang="en-US" u="sng" dirty="0">
+              <a:rPr lang="en-US" sz="4400" dirty="0" smtClean="0">
+                <a:solidFill>
+                  <a:schemeClr val="accent6">
+                    <a:lumMod val="10000"/>
+                  </a:schemeClr>
+                </a:solidFill>
+              </a:rPr>
+              <a:t> neurons</a:t>
+            </a:r>
+            <a:endParaRPr lang="en-US" sz="4400" dirty="0">
               <a:solidFill>
                 <a:schemeClr val="accent6">
                   <a:lumMod val="10000"/>
@@ -3199,15 +3542,15 @@
           <p:nvPr/>
         </p:nvSpPr>
         <p:spPr>
-          <a:xfrm>
-            <a:off x="4125058" y="2064242"/>
-            <a:ext cx="3446584" cy="844062"/>
+          <a:xfrm rot="16200000">
+            <a:off x="1215793" y="2647664"/>
+            <a:ext cx="6205426" cy="1519698"/>
           </a:xfrm>
           <a:prstGeom prst="rect">
             <a:avLst/>
           </a:prstGeom>
           <a:noFill/>
-          <a:ln>
+          <a:ln w="28575">
             <a:solidFill>
               <a:schemeClr val="accent6">
                 <a:lumMod val="10000"/>
@@ -3237,7 +3580,7 @@
           <a:p>
             <a:pPr algn="ctr"/>
             <a:r>
-              <a:rPr lang="en-US" dirty="0" smtClean="0">
+              <a:rPr lang="en-US" sz="4400" dirty="0" smtClean="0">
                 <a:solidFill>
                   <a:schemeClr val="accent6">
                     <a:lumMod val="10000"/>
@@ -3250,7 +3593,7 @@
           <a:p>
             <a:pPr algn="ctr"/>
             <a:r>
-              <a:rPr lang="en-US" i="1" dirty="0" smtClean="0">
+              <a:rPr lang="en-US" sz="4400" i="1" dirty="0" smtClean="0">
                 <a:solidFill>
                   <a:schemeClr val="accent6">
                     <a:lumMod val="10000"/>
@@ -3260,7 +3603,7 @@
               <a:t>500</a:t>
             </a:r>
             <a:r>
-              <a:rPr lang="en-US" dirty="0" smtClean="0">
+              <a:rPr lang="en-US" sz="4400" dirty="0" smtClean="0">
                 <a:solidFill>
                   <a:schemeClr val="accent6">
                     <a:lumMod val="10000"/>
@@ -3269,7 +3612,7 @@
               </a:rPr>
               <a:t> neurons</a:t>
             </a:r>
-            <a:endParaRPr lang="en-US" dirty="0">
+            <a:endParaRPr lang="en-US" sz="4400" dirty="0">
               <a:solidFill>
                 <a:schemeClr val="accent6">
                   <a:lumMod val="10000"/>
@@ -3286,15 +3629,15 @@
           <p:nvPr/>
         </p:nvSpPr>
         <p:spPr>
-          <a:xfrm>
-            <a:off x="4125058" y="94766"/>
-            <a:ext cx="3446584" cy="844062"/>
+          <a:xfrm rot="16200000">
+            <a:off x="-2330164" y="2647664"/>
+            <a:ext cx="6205426" cy="1519698"/>
           </a:xfrm>
           <a:prstGeom prst="rect">
             <a:avLst/>
           </a:prstGeom>
           <a:noFill/>
-          <a:ln>
+          <a:ln w="28575">
             <a:solidFill>
               <a:schemeClr val="accent6">
                 <a:lumMod val="10000"/>
@@ -3324,7 +3667,7 @@
           <a:p>
             <a:pPr algn="ctr"/>
             <a:r>
-              <a:rPr lang="en-US" dirty="0" smtClean="0">
+              <a:rPr lang="en-US" sz="4400" dirty="0" smtClean="0">
                 <a:solidFill>
                   <a:schemeClr val="accent6">
                     <a:lumMod val="10000"/>
@@ -3334,7 +3677,7 @@
               <a:t>Output Layer (</a:t>
             </a:r>
             <a:r>
-              <a:rPr lang="en-US" dirty="0" err="1" smtClean="0">
+              <a:rPr lang="en-US" sz="4400" dirty="0" err="1" smtClean="0">
                 <a:solidFill>
                   <a:schemeClr val="accent6">
                     <a:lumMod val="10000"/>
@@ -3344,7 +3687,7 @@
               <a:t>softmax</a:t>
             </a:r>
             <a:r>
-              <a:rPr lang="en-US" dirty="0" smtClean="0">
+              <a:rPr lang="en-US" sz="4400" dirty="0" smtClean="0">
                 <a:solidFill>
                   <a:schemeClr val="accent6">
                     <a:lumMod val="10000"/>
@@ -3357,7 +3700,7 @@
           <a:p>
             <a:pPr algn="ctr"/>
             <a:r>
-              <a:rPr lang="en-US" i="1" dirty="0" smtClean="0">
+              <a:rPr lang="en-US" sz="4400" i="1" dirty="0" smtClean="0">
                 <a:solidFill>
                   <a:schemeClr val="accent6">
                     <a:lumMod val="10000"/>
@@ -3367,7 +3710,7 @@
               <a:t>m</a:t>
             </a:r>
             <a:r>
-              <a:rPr lang="en-US" dirty="0" smtClean="0">
+              <a:rPr lang="en-US" sz="4400" dirty="0" smtClean="0">
                 <a:solidFill>
                   <a:schemeClr val="accent6">
                     <a:lumMod val="10000"/>
@@ -3386,15 +3729,15 @@
           <p:nvPr/>
         </p:nvSpPr>
         <p:spPr>
-          <a:xfrm>
-            <a:off x="4125058" y="6003197"/>
-            <a:ext cx="3446584" cy="844062"/>
+          <a:xfrm rot="16200000">
+            <a:off x="8307714" y="2647664"/>
+            <a:ext cx="6205426" cy="1519698"/>
           </a:xfrm>
           <a:prstGeom prst="rect">
             <a:avLst/>
           </a:prstGeom>
           <a:noFill/>
-          <a:ln>
+          <a:ln w="28575">
             <a:solidFill>
               <a:schemeClr val="accent6">
                 <a:lumMod val="10000"/>
@@ -3424,7 +3767,7 @@
           <a:p>
             <a:pPr algn="ctr"/>
             <a:r>
-              <a:rPr lang="en-US" dirty="0" smtClean="0">
+              <a:rPr lang="en-US" sz="4400" dirty="0" smtClean="0">
                 <a:solidFill>
                   <a:schemeClr val="accent6">
                     <a:lumMod val="10000"/>
@@ -3437,7 +3780,7 @@
           <a:p>
             <a:pPr algn="ctr"/>
             <a:r>
-              <a:rPr lang="en-US" i="1" dirty="0" smtClean="0">
+              <a:rPr lang="en-US" sz="4400" i="1" dirty="0" smtClean="0">
                 <a:solidFill>
                   <a:schemeClr val="accent6">
                     <a:lumMod val="10000"/>
@@ -3447,7 +3790,7 @@
               <a:t>1</a:t>
             </a:r>
             <a:r>
-              <a:rPr lang="en-US" dirty="0" smtClean="0">
+              <a:rPr lang="en-US" sz="4400" dirty="0" smtClean="0">
                 <a:solidFill>
                   <a:schemeClr val="accent6">
                     <a:lumMod val="10000"/>
@@ -3466,14 +3809,14 @@
           <p:nvPr/>
         </p:nvCxnSpPr>
         <p:spPr>
-          <a:xfrm flipV="1">
-            <a:off x="5848350" y="5862521"/>
-            <a:ext cx="0" cy="140676"/>
+          <a:xfrm rot="16200000" flipV="1">
+            <a:off x="10523938" y="3280872"/>
+            <a:ext cx="0" cy="253281"/>
           </a:xfrm>
           <a:prstGeom prst="straightConnector1">
             <a:avLst/>
           </a:prstGeom>
-          <a:ln w="19050">
+          <a:ln w="57150">
             <a:solidFill>
               <a:schemeClr val="accent6">
                 <a:lumMod val="10000"/>
@@ -3504,14 +3847,14 @@
           <p:nvPr/>
         </p:nvCxnSpPr>
         <p:spPr>
-          <a:xfrm flipV="1">
-            <a:off x="5848350" y="4877782"/>
-            <a:ext cx="0" cy="140677"/>
+          <a:xfrm rot="16200000" flipV="1">
+            <a:off x="8750958" y="3280872"/>
+            <a:ext cx="0" cy="253283"/>
           </a:xfrm>
           <a:prstGeom prst="straightConnector1">
             <a:avLst/>
           </a:prstGeom>
-          <a:ln w="19050">
+          <a:ln w="57150">
             <a:solidFill>
               <a:schemeClr val="accent6">
                 <a:lumMod val="10000"/>
@@ -3545,14 +3888,14 @@
           <p:nvPr/>
         </p:nvCxnSpPr>
         <p:spPr>
-          <a:xfrm flipV="1">
-            <a:off x="5848350" y="3893043"/>
-            <a:ext cx="0" cy="140677"/>
+          <a:xfrm rot="16200000" flipV="1">
+            <a:off x="6977977" y="3280872"/>
+            <a:ext cx="0" cy="253283"/>
           </a:xfrm>
           <a:prstGeom prst="straightConnector1">
             <a:avLst/>
           </a:prstGeom>
-          <a:ln w="19050">
+          <a:ln w="57150">
             <a:solidFill>
               <a:schemeClr val="accent6">
                 <a:lumMod val="10000"/>
@@ -3586,14 +3929,14 @@
           <p:nvPr/>
         </p:nvCxnSpPr>
         <p:spPr>
-          <a:xfrm flipV="1">
-            <a:off x="5848350" y="1923566"/>
-            <a:ext cx="0" cy="140676"/>
+          <a:xfrm rot="16200000" flipV="1">
+            <a:off x="3432017" y="3280872"/>
+            <a:ext cx="0" cy="253281"/>
           </a:xfrm>
           <a:prstGeom prst="straightConnector1">
             <a:avLst/>
           </a:prstGeom>
-          <a:ln w="19050">
+          <a:ln w="57150">
             <a:solidFill>
               <a:schemeClr val="accent6">
                 <a:lumMod val="10000"/>
@@ -3624,15 +3967,15 @@
           <p:nvPr/>
         </p:nvSpPr>
         <p:spPr>
-          <a:xfrm>
-            <a:off x="4125058" y="1079504"/>
-            <a:ext cx="3446584" cy="844062"/>
+          <a:xfrm rot="16200000">
+            <a:off x="-557185" y="2647664"/>
+            <a:ext cx="6205426" cy="1519698"/>
           </a:xfrm>
           <a:prstGeom prst="rect">
             <a:avLst/>
           </a:prstGeom>
           <a:noFill/>
-          <a:ln>
+          <a:ln w="28575">
             <a:solidFill>
               <a:schemeClr val="accent6">
                 <a:lumMod val="10000"/>
@@ -3662,7 +4005,7 @@
           <a:p>
             <a:pPr algn="ctr"/>
             <a:r>
-              <a:rPr lang="en-US" dirty="0" smtClean="0">
+              <a:rPr lang="en-US" sz="4400" dirty="0" smtClean="0">
                 <a:solidFill>
                   <a:schemeClr val="accent6">
                     <a:lumMod val="10000"/>
@@ -3681,15 +4024,15 @@
           <p:nvPr/>
         </p:nvSpPr>
         <p:spPr>
-          <a:xfrm>
-            <a:off x="4125058" y="3048981"/>
-            <a:ext cx="3446584" cy="844062"/>
+          <a:xfrm rot="16200000">
+            <a:off x="2988774" y="2647664"/>
+            <a:ext cx="6205426" cy="1519698"/>
           </a:xfrm>
           <a:prstGeom prst="rect">
             <a:avLst/>
           </a:prstGeom>
           <a:noFill/>
-          <a:ln>
+          <a:ln w="28575">
             <a:solidFill>
               <a:schemeClr val="accent6">
                 <a:lumMod val="10000"/>
@@ -3719,7 +4062,7 @@
           <a:p>
             <a:pPr algn="ctr"/>
             <a:r>
-              <a:rPr lang="en-US" dirty="0" smtClean="0">
+              <a:rPr lang="en-US" sz="4400" dirty="0" smtClean="0">
                 <a:solidFill>
                   <a:schemeClr val="accent6">
                     <a:lumMod val="10000"/>
@@ -3729,7 +4072,7 @@
               <a:t>Dropout </a:t>
             </a:r>
             <a:r>
-              <a:rPr lang="en-US" dirty="0">
+              <a:rPr lang="en-US" sz="4400" dirty="0">
                 <a:solidFill>
                   <a:schemeClr val="accent6">
                     <a:lumMod val="10000"/>
@@ -3739,7 +4082,7 @@
               <a:t>2</a:t>
             </a:r>
             <a:r>
-              <a:rPr lang="en-US" dirty="0" smtClean="0">
+              <a:rPr lang="en-US" sz="4400" dirty="0" smtClean="0">
                 <a:solidFill>
                   <a:schemeClr val="accent6">
                     <a:lumMod val="10000"/>
@@ -3758,14 +4101,14 @@
           <p:nvPr/>
         </p:nvCxnSpPr>
         <p:spPr>
-          <a:xfrm flipV="1">
-            <a:off x="5848350" y="938828"/>
-            <a:ext cx="0" cy="140676"/>
+          <a:xfrm rot="16200000" flipV="1">
+            <a:off x="1659038" y="3280872"/>
+            <a:ext cx="0" cy="253281"/>
           </a:xfrm>
           <a:prstGeom prst="straightConnector1">
             <a:avLst/>
           </a:prstGeom>
-          <a:ln w="19050">
+          <a:ln w="57150">
             <a:solidFill>
               <a:schemeClr val="accent6">
                 <a:lumMod val="10000"/>
@@ -3796,14 +4139,14 @@
           <p:nvPr/>
         </p:nvCxnSpPr>
         <p:spPr>
-          <a:xfrm flipV="1">
-            <a:off x="5848350" y="2908304"/>
-            <a:ext cx="0" cy="140677"/>
+          <a:xfrm rot="16200000" flipV="1">
+            <a:off x="5204997" y="3280872"/>
+            <a:ext cx="0" cy="253283"/>
           </a:xfrm>
           <a:prstGeom prst="straightConnector1">
             <a:avLst/>
           </a:prstGeom>
-          <a:ln w="19050">
+          <a:ln w="57150">
             <a:solidFill>
               <a:schemeClr val="accent6">
                 <a:lumMod val="10000"/>
@@ -3864,15 +4207,15 @@
           <p:nvPr/>
         </p:nvSpPr>
         <p:spPr>
-          <a:xfrm>
-            <a:off x="3942402" y="4669233"/>
-            <a:ext cx="3446584" cy="844062"/>
+          <a:xfrm rot="16200000">
+            <a:off x="5900876" y="2699145"/>
+            <a:ext cx="6610932" cy="1619005"/>
           </a:xfrm>
           <a:prstGeom prst="rect">
             <a:avLst/>
           </a:prstGeom>
           <a:noFill/>
-          <a:ln>
+          <a:ln w="28575">
             <a:solidFill>
               <a:schemeClr val="accent6">
                 <a:lumMod val="10000"/>
@@ -3902,7 +4245,7 @@
           <a:p>
             <a:pPr algn="ctr"/>
             <a:r>
-              <a:rPr lang="en-US" dirty="0" smtClean="0">
+              <a:rPr lang="en-US" sz="4400" dirty="0" smtClean="0">
                 <a:solidFill>
                   <a:schemeClr val="accent6">
                     <a:lumMod val="10000"/>
@@ -3915,7 +4258,7 @@
           <a:p>
             <a:pPr algn="ctr"/>
             <a:r>
-              <a:rPr lang="en-US" i="1" dirty="0" err="1" smtClean="0">
+              <a:rPr lang="en-US" sz="4400" i="1" dirty="0" err="1" smtClean="0">
                 <a:solidFill>
                   <a:schemeClr val="accent6">
                     <a:lumMod val="10000"/>
@@ -3925,7 +4268,7 @@
               <a:t>m+n</a:t>
             </a:r>
             <a:r>
-              <a:rPr lang="en-US" dirty="0" smtClean="0">
+              <a:rPr lang="en-US" sz="4400" dirty="0" smtClean="0">
                 <a:solidFill>
                   <a:schemeClr val="accent6">
                     <a:lumMod val="10000"/>
@@ -3935,7 +4278,7 @@
               <a:t> </a:t>
             </a:r>
             <a:r>
-              <a:rPr lang="en-US" dirty="0">
+              <a:rPr lang="en-US" sz="4400" dirty="0">
                 <a:solidFill>
                   <a:schemeClr val="accent6">
                     <a:lumMod val="10000"/>
@@ -3945,7 +4288,7 @@
               <a:t>n</a:t>
             </a:r>
             <a:r>
-              <a:rPr lang="en-US" dirty="0" smtClean="0">
+              <a:rPr lang="en-US" sz="4400" dirty="0" smtClean="0">
                 <a:solidFill>
                   <a:schemeClr val="accent6">
                     <a:lumMod val="10000"/>
@@ -3954,7 +4297,7 @@
               </a:rPr>
               <a:t>eurons</a:t>
             </a:r>
-            <a:endParaRPr lang="en-US" dirty="0">
+            <a:endParaRPr lang="en-US" sz="4400" dirty="0">
               <a:solidFill>
                 <a:schemeClr val="accent6">
                   <a:lumMod val="10000"/>
@@ -3971,15 +4314,15 @@
           <p:nvPr/>
         </p:nvSpPr>
         <p:spPr>
-          <a:xfrm>
-            <a:off x="3942402" y="2559079"/>
-            <a:ext cx="3446584" cy="844062"/>
+          <a:xfrm rot="16200000">
+            <a:off x="1853365" y="2699145"/>
+            <a:ext cx="6610932" cy="1619005"/>
           </a:xfrm>
           <a:prstGeom prst="rect">
             <a:avLst/>
           </a:prstGeom>
           <a:noFill/>
-          <a:ln>
+          <a:ln w="28575">
             <a:solidFill>
               <a:schemeClr val="accent6">
                 <a:lumMod val="10000"/>
@@ -4009,7 +4352,7 @@
           <a:p>
             <a:pPr algn="ctr"/>
             <a:r>
-              <a:rPr lang="en-US" dirty="0" smtClean="0">
+              <a:rPr lang="en-US" sz="4400" dirty="0" smtClean="0">
                 <a:solidFill>
                   <a:schemeClr val="accent6">
                     <a:lumMod val="10000"/>
@@ -4022,7 +4365,7 @@
           <a:p>
             <a:pPr algn="ctr"/>
             <a:r>
-              <a:rPr lang="en-US" i="1" dirty="0" err="1" smtClean="0">
+              <a:rPr lang="en-US" sz="4400" i="1" dirty="0" err="1" smtClean="0">
                 <a:solidFill>
                   <a:schemeClr val="accent6">
                     <a:lumMod val="10000"/>
@@ -4032,7 +4375,7 @@
               <a:t>m+n</a:t>
             </a:r>
             <a:r>
-              <a:rPr lang="en-US" dirty="0" smtClean="0">
+              <a:rPr lang="en-US" sz="4400" dirty="0" smtClean="0">
                 <a:solidFill>
                   <a:schemeClr val="accent6">
                     <a:lumMod val="10000"/>
@@ -4042,7 +4385,7 @@
               <a:t> </a:t>
             </a:r>
             <a:r>
-              <a:rPr lang="en-US" dirty="0">
+              <a:rPr lang="en-US" sz="4400" dirty="0">
                 <a:solidFill>
                   <a:schemeClr val="accent6">
                     <a:lumMod val="10000"/>
@@ -4052,7 +4395,7 @@
               <a:t>n</a:t>
             </a:r>
             <a:r>
-              <a:rPr lang="en-US" dirty="0" smtClean="0">
+              <a:rPr lang="en-US" sz="4400" dirty="0" smtClean="0">
                 <a:solidFill>
                   <a:schemeClr val="accent6">
                     <a:lumMod val="10000"/>
@@ -4061,7 +4404,7 @@
               </a:rPr>
               <a:t>eurons</a:t>
             </a:r>
-            <a:endParaRPr lang="en-US" dirty="0">
+            <a:endParaRPr lang="en-US" sz="4400" dirty="0">
               <a:solidFill>
                 <a:schemeClr val="accent6">
                   <a:lumMod val="10000"/>
@@ -4078,15 +4421,15 @@
           <p:nvPr/>
         </p:nvSpPr>
         <p:spPr>
-          <a:xfrm>
-            <a:off x="3942402" y="1504002"/>
-            <a:ext cx="3446584" cy="844062"/>
+          <a:xfrm rot="16200000">
+            <a:off x="-170390" y="2699145"/>
+            <a:ext cx="6610932" cy="1619005"/>
           </a:xfrm>
           <a:prstGeom prst="rect">
             <a:avLst/>
           </a:prstGeom>
           <a:noFill/>
-          <a:ln>
+          <a:ln w="28575">
             <a:solidFill>
               <a:schemeClr val="accent6">
                 <a:lumMod val="10000"/>
@@ -4116,7 +4459,7 @@
           <a:p>
             <a:pPr algn="ctr"/>
             <a:r>
-              <a:rPr lang="en-US" dirty="0" smtClean="0">
+              <a:rPr lang="en-US" sz="4400" dirty="0" smtClean="0">
                 <a:solidFill>
                   <a:schemeClr val="accent6">
                     <a:lumMod val="10000"/>
@@ -4135,15 +4478,15 @@
           <p:nvPr/>
         </p:nvSpPr>
         <p:spPr>
-          <a:xfrm>
-            <a:off x="3942402" y="5724310"/>
-            <a:ext cx="3446584" cy="844062"/>
+          <a:xfrm rot="16200000">
+            <a:off x="7924631" y="2699145"/>
+            <a:ext cx="6610932" cy="1619005"/>
           </a:xfrm>
           <a:prstGeom prst="rect">
             <a:avLst/>
           </a:prstGeom>
           <a:noFill/>
-          <a:ln>
+          <a:ln w="28575">
             <a:solidFill>
               <a:schemeClr val="accent6">
                 <a:lumMod val="10000"/>
@@ -4173,7 +4516,7 @@
           <a:p>
             <a:pPr algn="ctr"/>
             <a:r>
-              <a:rPr lang="en-US" dirty="0" smtClean="0">
+              <a:rPr lang="en-US" sz="4400" dirty="0" smtClean="0">
                 <a:solidFill>
                   <a:schemeClr val="accent6">
                     <a:lumMod val="10000"/>
@@ -4186,7 +4529,7 @@
           <a:p>
             <a:pPr algn="ctr"/>
             <a:r>
-              <a:rPr lang="en-US" i="1" dirty="0" smtClean="0">
+              <a:rPr lang="en-US" sz="4400" i="1" dirty="0" smtClean="0">
                 <a:solidFill>
                   <a:schemeClr val="accent6">
                     <a:lumMod val="10000"/>
@@ -4196,7 +4539,7 @@
               <a:t>n</a:t>
             </a:r>
             <a:r>
-              <a:rPr lang="en-US" dirty="0" smtClean="0">
+              <a:rPr lang="en-US" sz="4400" dirty="0" smtClean="0">
                 <a:solidFill>
                   <a:schemeClr val="accent6">
                     <a:lumMod val="10000"/>
@@ -4218,14 +4561,14 @@
           <p:nvPr/>
         </p:nvCxnSpPr>
         <p:spPr>
-          <a:xfrm flipV="1">
-            <a:off x="5665694" y="5513295"/>
-            <a:ext cx="0" cy="211015"/>
+          <a:xfrm rot="16200000" flipV="1">
+            <a:off x="10218220" y="3306273"/>
+            <a:ext cx="0" cy="404750"/>
           </a:xfrm>
           <a:prstGeom prst="straightConnector1">
             <a:avLst/>
           </a:prstGeom>
-          <a:ln w="19050">
+          <a:ln w="57150">
             <a:solidFill>
               <a:schemeClr val="accent6">
                 <a:lumMod val="10000"/>
@@ -4259,14 +4602,14 @@
           <p:nvPr/>
         </p:nvCxnSpPr>
         <p:spPr>
-          <a:xfrm flipV="1">
-            <a:off x="5665694" y="4458218"/>
-            <a:ext cx="0" cy="211015"/>
+          <a:xfrm rot="16200000" flipV="1">
+            <a:off x="8194464" y="3306273"/>
+            <a:ext cx="0" cy="404750"/>
           </a:xfrm>
           <a:prstGeom prst="straightConnector1">
             <a:avLst/>
           </a:prstGeom>
-          <a:ln w="19050">
+          <a:ln w="57150">
             <a:solidFill>
               <a:schemeClr val="accent6">
                 <a:lumMod val="10000"/>
@@ -4300,14 +4643,14 @@
           <p:nvPr/>
         </p:nvCxnSpPr>
         <p:spPr>
-          <a:xfrm flipV="1">
-            <a:off x="5665694" y="3403141"/>
-            <a:ext cx="0" cy="211015"/>
+          <a:xfrm rot="16200000" flipV="1">
+            <a:off x="6170709" y="3306273"/>
+            <a:ext cx="0" cy="404750"/>
           </a:xfrm>
           <a:prstGeom prst="straightConnector1">
             <a:avLst/>
           </a:prstGeom>
-          <a:ln w="19050">
+          <a:ln w="57150">
             <a:solidFill>
               <a:schemeClr val="accent6">
                 <a:lumMod val="10000"/>
@@ -4338,15 +4681,15 @@
           <p:nvPr/>
         </p:nvSpPr>
         <p:spPr>
-          <a:xfrm>
-            <a:off x="3942402" y="448925"/>
-            <a:ext cx="3446584" cy="844062"/>
+          <a:xfrm rot="16200000">
+            <a:off x="-2194145" y="2699145"/>
+            <a:ext cx="6610932" cy="1619005"/>
           </a:xfrm>
           <a:prstGeom prst="rect">
             <a:avLst/>
           </a:prstGeom>
           <a:noFill/>
-          <a:ln>
+          <a:ln w="28575">
             <a:solidFill>
               <a:schemeClr val="accent6">
                 <a:lumMod val="10000"/>
@@ -4376,7 +4719,7 @@
           <a:p>
             <a:pPr algn="ctr"/>
             <a:r>
-              <a:rPr lang="en-US" dirty="0" smtClean="0">
+              <a:rPr lang="en-US" sz="4400" dirty="0" smtClean="0">
                 <a:solidFill>
                   <a:schemeClr val="accent6">
                     <a:lumMod val="10000"/>
@@ -4389,7 +4732,7 @@
           <a:p>
             <a:pPr algn="ctr"/>
             <a:r>
-              <a:rPr lang="en-US" i="1" dirty="0">
+              <a:rPr lang="en-US" sz="4400" i="1" dirty="0">
                 <a:solidFill>
                   <a:schemeClr val="accent6">
                     <a:lumMod val="10000"/>
@@ -4399,7 +4742,7 @@
               <a:t>m</a:t>
             </a:r>
             <a:r>
-              <a:rPr lang="en-US" dirty="0" smtClean="0">
+              <a:rPr lang="en-US" sz="4400" dirty="0" smtClean="0">
                 <a:solidFill>
                   <a:schemeClr val="accent6">
                     <a:lumMod val="10000"/>
@@ -4421,14 +4764,14 @@
           <p:nvPr/>
         </p:nvCxnSpPr>
         <p:spPr>
-          <a:xfrm flipV="1">
-            <a:off x="5665694" y="1292987"/>
-            <a:ext cx="0" cy="211015"/>
+          <a:xfrm rot="16200000" flipV="1">
+            <a:off x="2123198" y="3306273"/>
+            <a:ext cx="0" cy="404750"/>
           </a:xfrm>
           <a:prstGeom prst="straightConnector1">
             <a:avLst/>
           </a:prstGeom>
-          <a:ln w="19050">
+          <a:ln w="57150">
             <a:solidFill>
               <a:schemeClr val="accent6">
                 <a:lumMod val="10000"/>
@@ -4459,15 +4802,15 @@
           <p:nvPr/>
         </p:nvSpPr>
         <p:spPr>
-          <a:xfrm>
-            <a:off x="3942402" y="3614156"/>
-            <a:ext cx="3446584" cy="844062"/>
+          <a:xfrm rot="16200000">
+            <a:off x="3877121" y="2699145"/>
+            <a:ext cx="6610932" cy="1619005"/>
           </a:xfrm>
           <a:prstGeom prst="rect">
             <a:avLst/>
           </a:prstGeom>
           <a:noFill/>
-          <a:ln>
+          <a:ln w="28575">
             <a:solidFill>
               <a:schemeClr val="accent6">
                 <a:lumMod val="10000"/>
@@ -4497,7 +4840,7 @@
           <a:p>
             <a:pPr algn="ctr"/>
             <a:r>
-              <a:rPr lang="en-US" dirty="0" smtClean="0">
+              <a:rPr lang="en-US" sz="4400" dirty="0" smtClean="0">
                 <a:solidFill>
                   <a:schemeClr val="accent6">
                     <a:lumMod val="10000"/>
@@ -4519,14 +4862,14 @@
           <p:nvPr/>
         </p:nvCxnSpPr>
         <p:spPr>
-          <a:xfrm flipV="1">
-            <a:off x="5665694" y="2348064"/>
-            <a:ext cx="0" cy="211015"/>
+          <a:xfrm rot="16200000" flipV="1">
+            <a:off x="4146954" y="3306273"/>
+            <a:ext cx="0" cy="404750"/>
           </a:xfrm>
           <a:prstGeom prst="straightConnector1">
             <a:avLst/>
           </a:prstGeom>
-          <a:ln w="19050">
+          <a:ln w="57150">
             <a:solidFill>
               <a:schemeClr val="accent6">
                 <a:lumMod val="10000"/>
@@ -4587,15 +4930,15 @@
           <p:nvPr/>
         </p:nvSpPr>
         <p:spPr>
-          <a:xfrm>
-            <a:off x="1933865" y="5101215"/>
-            <a:ext cx="3447288" cy="694944"/>
+          <a:xfrm rot="16200000">
+            <a:off x="8048559" y="4663438"/>
+            <a:ext cx="3291840" cy="1097280"/>
           </a:xfrm>
           <a:prstGeom prst="rect">
             <a:avLst/>
           </a:prstGeom>
           <a:noFill/>
-          <a:ln>
+          <a:ln w="28575">
             <a:solidFill>
               <a:schemeClr val="accent6">
                 <a:lumMod val="10000"/>
@@ -4625,7 +4968,7 @@
           <a:p>
             <a:pPr algn="ctr"/>
             <a:r>
-              <a:rPr lang="en-US" dirty="0" smtClean="0">
+              <a:rPr lang="en-US" sz="2800" dirty="0" smtClean="0">
                 <a:solidFill>
                   <a:schemeClr val="accent6">
                     <a:lumMod val="10000"/>
@@ -4638,7 +4981,7 @@
           <a:p>
             <a:pPr algn="ctr"/>
             <a:r>
-              <a:rPr lang="en-US" i="1" dirty="0" err="1" smtClean="0">
+              <a:rPr lang="en-US" sz="2800" i="1" dirty="0" err="1" smtClean="0">
                 <a:solidFill>
                   <a:schemeClr val="accent6">
                     <a:lumMod val="10000"/>
@@ -4648,7 +4991,7 @@
               <a:t>m+n</a:t>
             </a:r>
             <a:r>
-              <a:rPr lang="en-US" dirty="0" smtClean="0">
+              <a:rPr lang="en-US" sz="2800" dirty="0" smtClean="0">
                 <a:solidFill>
                   <a:schemeClr val="accent6">
                     <a:lumMod val="10000"/>
@@ -4658,7 +5001,7 @@
               <a:t> </a:t>
             </a:r>
             <a:r>
-              <a:rPr lang="en-US" dirty="0">
+              <a:rPr lang="en-US" sz="2800" dirty="0">
                 <a:solidFill>
                   <a:schemeClr val="accent6">
                     <a:lumMod val="10000"/>
@@ -4668,7 +5011,7 @@
               <a:t>n</a:t>
             </a:r>
             <a:r>
-              <a:rPr lang="en-US" dirty="0" smtClean="0">
+              <a:rPr lang="en-US" sz="2800" dirty="0" smtClean="0">
                 <a:solidFill>
                   <a:schemeClr val="accent6">
                     <a:lumMod val="10000"/>
@@ -4677,7 +5020,7 @@
               </a:rPr>
               <a:t>eurons</a:t>
             </a:r>
-            <a:endParaRPr lang="en-US" dirty="0">
+            <a:endParaRPr lang="en-US" sz="2800" dirty="0">
               <a:solidFill>
                 <a:schemeClr val="accent6">
                   <a:lumMod val="10000"/>
@@ -4694,15 +5037,15 @@
           <p:nvPr/>
         </p:nvSpPr>
         <p:spPr>
-          <a:xfrm>
-            <a:off x="1933865" y="3323937"/>
-            <a:ext cx="3447288" cy="694944"/>
+          <a:xfrm rot="16200000">
+            <a:off x="4995129" y="4663438"/>
+            <a:ext cx="3291840" cy="1097280"/>
           </a:xfrm>
           <a:prstGeom prst="rect">
             <a:avLst/>
           </a:prstGeom>
           <a:noFill/>
-          <a:ln>
+          <a:ln w="28575">
             <a:solidFill>
               <a:schemeClr val="accent6">
                 <a:lumMod val="10000"/>
@@ -4732,7 +5075,7 @@
           <a:p>
             <a:pPr algn="ctr"/>
             <a:r>
-              <a:rPr lang="en-US" dirty="0" smtClean="0">
+              <a:rPr lang="en-US" sz="2800" dirty="0" smtClean="0">
                 <a:solidFill>
                   <a:schemeClr val="accent6">
                     <a:lumMod val="10000"/>
@@ -4745,7 +5088,7 @@
           <a:p>
             <a:pPr algn="ctr"/>
             <a:r>
-              <a:rPr lang="en-US" i="1" dirty="0" err="1" smtClean="0">
+              <a:rPr lang="en-US" sz="2800" i="1" dirty="0" err="1" smtClean="0">
                 <a:solidFill>
                   <a:schemeClr val="accent6">
                     <a:lumMod val="10000"/>
@@ -4755,7 +5098,7 @@
               <a:t>m+n</a:t>
             </a:r>
             <a:r>
-              <a:rPr lang="en-US" dirty="0" smtClean="0">
+              <a:rPr lang="en-US" sz="2800" dirty="0" smtClean="0">
                 <a:solidFill>
                   <a:schemeClr val="accent6">
                     <a:lumMod val="10000"/>
@@ -4765,7 +5108,7 @@
               <a:t> </a:t>
             </a:r>
             <a:r>
-              <a:rPr lang="en-US" dirty="0">
+              <a:rPr lang="en-US" sz="2800" dirty="0">
                 <a:solidFill>
                   <a:schemeClr val="accent6">
                     <a:lumMod val="10000"/>
@@ -4775,7 +5118,7 @@
               <a:t>n</a:t>
             </a:r>
             <a:r>
-              <a:rPr lang="en-US" dirty="0" smtClean="0">
+              <a:rPr lang="en-US" sz="2800" dirty="0" smtClean="0">
                 <a:solidFill>
                   <a:schemeClr val="accent6">
                     <a:lumMod val="10000"/>
@@ -4784,7 +5127,7 @@
               </a:rPr>
               <a:t>eurons</a:t>
             </a:r>
-            <a:endParaRPr lang="en-US" dirty="0">
+            <a:endParaRPr lang="en-US" sz="2800" dirty="0">
               <a:solidFill>
                 <a:schemeClr val="accent6">
                   <a:lumMod val="10000"/>
@@ -4801,15 +5144,15 @@
           <p:nvPr/>
         </p:nvSpPr>
         <p:spPr>
-          <a:xfrm>
-            <a:off x="1933865" y="2445131"/>
-            <a:ext cx="3447288" cy="731520"/>
+          <a:xfrm rot="16200000">
+            <a:off x="3468413" y="4663436"/>
+            <a:ext cx="3291840" cy="1097280"/>
           </a:xfrm>
           <a:prstGeom prst="rect">
             <a:avLst/>
           </a:prstGeom>
           <a:noFill/>
-          <a:ln>
+          <a:ln w="28575">
             <a:solidFill>
               <a:schemeClr val="accent6">
                 <a:lumMod val="10000"/>
@@ -4839,7 +5182,7 @@
           <a:p>
             <a:pPr algn="ctr"/>
             <a:r>
-              <a:rPr lang="en-US" dirty="0" smtClean="0">
+              <a:rPr lang="en-US" sz="2800" dirty="0" smtClean="0">
                 <a:solidFill>
                   <a:schemeClr val="accent6">
                     <a:lumMod val="10000"/>
@@ -4858,15 +5201,15 @@
           <p:nvPr/>
         </p:nvSpPr>
         <p:spPr>
-          <a:xfrm>
-            <a:off x="1933865" y="5989854"/>
-            <a:ext cx="3447288" cy="694944"/>
+          <a:xfrm rot="16200000">
+            <a:off x="9575274" y="4663435"/>
+            <a:ext cx="3291840" cy="1097280"/>
           </a:xfrm>
           <a:prstGeom prst="rect">
             <a:avLst/>
           </a:prstGeom>
           <a:noFill/>
-          <a:ln>
+          <a:ln w="28575">
             <a:solidFill>
               <a:schemeClr val="accent6">
                 <a:lumMod val="10000"/>
@@ -4896,20 +5239,20 @@
           <a:p>
             <a:pPr algn="ctr"/>
             <a:r>
-              <a:rPr lang="en-US" dirty="0" smtClean="0">
-                <a:solidFill>
-                  <a:schemeClr val="accent6">
-                    <a:lumMod val="10000"/>
-                  </a:schemeClr>
-                </a:solidFill>
-              </a:rPr>
-              <a:t>Sequence + Data Input Layer</a:t>
+              <a:rPr lang="en-US" sz="2800" dirty="0" smtClean="0">
+                <a:solidFill>
+                  <a:schemeClr val="accent6">
+                    <a:lumMod val="10000"/>
+                  </a:schemeClr>
+                </a:solidFill>
+              </a:rPr>
+              <a:t>Sequence Input Layer</a:t>
             </a:r>
           </a:p>
           <a:p>
             <a:pPr algn="ctr"/>
             <a:r>
-              <a:rPr lang="en-US" i="1" dirty="0" smtClean="0">
+              <a:rPr lang="en-US" sz="2800" i="1" dirty="0" smtClean="0">
                 <a:solidFill>
                   <a:schemeClr val="accent6">
                     <a:lumMod val="10000"/>
@@ -4919,7 +5262,7 @@
               <a:t>n</a:t>
             </a:r>
             <a:r>
-              <a:rPr lang="en-US" dirty="0" smtClean="0">
+              <a:rPr lang="en-US" sz="2800" dirty="0" smtClean="0">
                 <a:solidFill>
                   <a:schemeClr val="accent6">
                     <a:lumMod val="10000"/>
@@ -4941,14 +5284,14 @@
           <p:nvPr/>
         </p:nvCxnSpPr>
         <p:spPr>
-          <a:xfrm flipV="1">
-            <a:off x="3657509" y="5796159"/>
-            <a:ext cx="0" cy="193695"/>
+          <a:xfrm flipH="1">
+            <a:off x="10243119" y="5212075"/>
+            <a:ext cx="429435" cy="3"/>
           </a:xfrm>
           <a:prstGeom prst="straightConnector1">
             <a:avLst/>
           </a:prstGeom>
-          <a:ln w="19050">
+          <a:ln w="57150">
             <a:solidFill>
               <a:schemeClr val="accent6">
                 <a:lumMod val="10000"/>
@@ -4982,14 +5325,14 @@
           <p:nvPr/>
         </p:nvCxnSpPr>
         <p:spPr>
-          <a:xfrm flipV="1">
-            <a:off x="3657509" y="4907520"/>
-            <a:ext cx="0" cy="193695"/>
+          <a:xfrm flipH="1">
+            <a:off x="8716404" y="5212078"/>
+            <a:ext cx="429435" cy="0"/>
           </a:xfrm>
           <a:prstGeom prst="straightConnector1">
             <a:avLst/>
           </a:prstGeom>
-          <a:ln w="19050">
+          <a:ln w="57150">
             <a:solidFill>
               <a:schemeClr val="accent6">
                 <a:lumMod val="10000"/>
@@ -5023,14 +5366,14 @@
           <p:nvPr/>
         </p:nvCxnSpPr>
         <p:spPr>
-          <a:xfrm flipV="1">
-            <a:off x="3657509" y="4018881"/>
-            <a:ext cx="0" cy="193695"/>
+          <a:xfrm flipH="1">
+            <a:off x="7189689" y="5212078"/>
+            <a:ext cx="429435" cy="0"/>
           </a:xfrm>
           <a:prstGeom prst="straightConnector1">
             <a:avLst/>
           </a:prstGeom>
-          <a:ln w="19050">
+          <a:ln w="57150">
             <a:solidFill>
               <a:schemeClr val="accent6">
                 <a:lumMod val="10000"/>
@@ -5061,15 +5404,15 @@
           <p:nvPr/>
         </p:nvSpPr>
         <p:spPr>
-          <a:xfrm>
-            <a:off x="1933865" y="4212576"/>
-            <a:ext cx="3447288" cy="694944"/>
+          <a:xfrm rot="16200000">
+            <a:off x="6521844" y="4663438"/>
+            <a:ext cx="3291840" cy="1097280"/>
           </a:xfrm>
           <a:prstGeom prst="rect">
             <a:avLst/>
           </a:prstGeom>
           <a:noFill/>
-          <a:ln>
+          <a:ln w="28575">
             <a:solidFill>
               <a:schemeClr val="accent6">
                 <a:lumMod val="10000"/>
@@ -5099,7 +5442,7 @@
           <a:p>
             <a:pPr algn="ctr"/>
             <a:r>
-              <a:rPr lang="en-US" dirty="0" smtClean="0">
+              <a:rPr lang="en-US" sz="2800" dirty="0" smtClean="0">
                 <a:solidFill>
                   <a:schemeClr val="accent6">
                     <a:lumMod val="10000"/>
@@ -5121,14 +5464,14 @@
           <p:nvPr/>
         </p:nvCxnSpPr>
         <p:spPr>
-          <a:xfrm flipV="1">
-            <a:off x="3657509" y="3176651"/>
-            <a:ext cx="0" cy="147286"/>
+          <a:xfrm flipH="1" flipV="1">
+            <a:off x="5662973" y="5212076"/>
+            <a:ext cx="429436" cy="2"/>
           </a:xfrm>
           <a:prstGeom prst="straightConnector1">
             <a:avLst/>
           </a:prstGeom>
-          <a:ln w="19050">
+          <a:ln w="57150">
             <a:solidFill>
               <a:schemeClr val="accent6">
                 <a:lumMod val="10000"/>
@@ -5159,15 +5502,15 @@
           <p:nvPr/>
         </p:nvSpPr>
         <p:spPr>
-          <a:xfrm>
-            <a:off x="5987197" y="2445131"/>
-            <a:ext cx="3447288" cy="731520"/>
+          <a:xfrm rot="16200000">
+            <a:off x="3468413" y="1106206"/>
+            <a:ext cx="3291840" cy="1097280"/>
           </a:xfrm>
           <a:prstGeom prst="rect">
             <a:avLst/>
           </a:prstGeom>
           <a:noFill/>
-          <a:ln>
+          <a:ln w="28575">
             <a:solidFill>
               <a:schemeClr val="accent6">
                 <a:lumMod val="10000"/>
@@ -5197,7 +5540,7 @@
           <a:p>
             <a:pPr algn="ctr"/>
             <a:r>
-              <a:rPr lang="en-US" dirty="0" smtClean="0">
+              <a:rPr lang="en-US" sz="2800" dirty="0" smtClean="0">
                 <a:solidFill>
                   <a:schemeClr val="accent6">
                     <a:lumMod val="10000"/>
@@ -5210,7 +5553,7 @@
           <a:p>
             <a:pPr algn="ctr"/>
             <a:r>
-              <a:rPr lang="en-US" i="1" dirty="0" smtClean="0">
+              <a:rPr lang="en-US" sz="2800" i="1" dirty="0" smtClean="0">
                 <a:solidFill>
                   <a:schemeClr val="accent6">
                     <a:lumMod val="10000"/>
@@ -5220,7 +5563,7 @@
               <a:t>500</a:t>
             </a:r>
             <a:r>
-              <a:rPr lang="en-US" dirty="0" smtClean="0">
+              <a:rPr lang="en-US" sz="2800" dirty="0" smtClean="0">
                 <a:solidFill>
                   <a:schemeClr val="accent6">
                     <a:lumMod val="10000"/>
@@ -5229,7 +5572,7 @@
               </a:rPr>
               <a:t> neurons</a:t>
             </a:r>
-            <a:endParaRPr lang="en-US" dirty="0">
+            <a:endParaRPr lang="en-US" sz="2800" dirty="0">
               <a:solidFill>
                 <a:schemeClr val="accent6">
                   <a:lumMod val="10000"/>
@@ -5246,15 +5589,15 @@
           <p:nvPr/>
         </p:nvSpPr>
         <p:spPr>
-          <a:xfrm>
-            <a:off x="3975100" y="1560734"/>
-            <a:ext cx="3446586" cy="691517"/>
+          <a:xfrm rot="16200000">
+            <a:off x="1758817" y="2878588"/>
+            <a:ext cx="3657600" cy="1097280"/>
           </a:xfrm>
           <a:prstGeom prst="rect">
             <a:avLst/>
           </a:prstGeom>
           <a:noFill/>
-          <a:ln>
+          <a:ln w="28575">
             <a:solidFill>
               <a:schemeClr val="accent6">
                 <a:lumMod val="10000"/>
@@ -5284,7 +5627,7 @@
           <a:p>
             <a:pPr algn="ctr"/>
             <a:r>
-              <a:rPr lang="en-US" dirty="0" smtClean="0">
+              <a:rPr lang="en-US" sz="2800" dirty="0" smtClean="0">
                 <a:solidFill>
                   <a:schemeClr val="accent6">
                     <a:lumMod val="10000"/>
@@ -5294,7 +5637,7 @@
               <a:t>Dense Layer (</a:t>
             </a:r>
             <a:r>
-              <a:rPr lang="en-US" i="1" dirty="0" err="1" smtClean="0">
+              <a:rPr lang="en-US" sz="2800" i="1" dirty="0" err="1" smtClean="0">
                 <a:solidFill>
                   <a:schemeClr val="accent6">
                     <a:lumMod val="10000"/>
@@ -5304,7 +5647,7 @@
               <a:t>ReLU</a:t>
             </a:r>
             <a:r>
-              <a:rPr lang="en-US" dirty="0" smtClean="0">
+              <a:rPr lang="en-US" sz="2800" dirty="0" smtClean="0">
                 <a:solidFill>
                   <a:schemeClr val="accent6">
                     <a:lumMod val="10000"/>
@@ -5317,7 +5660,7 @@
           <a:p>
             <a:pPr algn="ctr"/>
             <a:r>
-              <a:rPr lang="en-US" i="1" dirty="0">
+              <a:rPr lang="en-US" sz="2800" i="1" dirty="0">
                 <a:solidFill>
                   <a:schemeClr val="accent6">
                     <a:lumMod val="10000"/>
@@ -5327,7 +5670,7 @@
               <a:t>m+n+500</a:t>
             </a:r>
             <a:r>
-              <a:rPr lang="en-US" dirty="0">
+              <a:rPr lang="en-US" sz="2800" dirty="0">
                 <a:solidFill>
                   <a:schemeClr val="accent6">
                     <a:lumMod val="10000"/>
@@ -5346,15 +5689,15 @@
           <p:nvPr/>
         </p:nvSpPr>
         <p:spPr>
-          <a:xfrm>
-            <a:off x="3975100" y="532444"/>
-            <a:ext cx="3446584" cy="844062"/>
+          <a:xfrm rot="16200000">
+            <a:off x="232100" y="2878588"/>
+            <a:ext cx="3657600" cy="1097280"/>
           </a:xfrm>
           <a:prstGeom prst="rect">
             <a:avLst/>
           </a:prstGeom>
           <a:noFill/>
-          <a:ln>
+          <a:ln w="28575">
             <a:solidFill>
               <a:schemeClr val="accent6">
                 <a:lumMod val="10000"/>
@@ -5384,7 +5727,7 @@
           <a:p>
             <a:pPr algn="ctr"/>
             <a:r>
-              <a:rPr lang="en-US" dirty="0" smtClean="0">
+              <a:rPr lang="en-US" sz="2800" dirty="0" smtClean="0">
                 <a:solidFill>
                   <a:schemeClr val="accent6">
                     <a:lumMod val="10000"/>
@@ -5394,7 +5737,7 @@
               <a:t>Dense Layer (</a:t>
             </a:r>
             <a:r>
-              <a:rPr lang="en-US" i="1" dirty="0" err="1" smtClean="0">
+              <a:rPr lang="en-US" sz="2800" i="1" dirty="0" err="1" smtClean="0">
                 <a:solidFill>
                   <a:schemeClr val="accent6">
                     <a:lumMod val="10000"/>
@@ -5404,7 +5747,7 @@
               <a:t>Softmax</a:t>
             </a:r>
             <a:r>
-              <a:rPr lang="en-US" dirty="0" smtClean="0">
+              <a:rPr lang="en-US" sz="2800" dirty="0" smtClean="0">
                 <a:solidFill>
                   <a:schemeClr val="accent6">
                     <a:lumMod val="10000"/>
@@ -5414,7 +5757,7 @@
               <a:t>)</a:t>
             </a:r>
             <a:br>
-              <a:rPr lang="en-US" dirty="0" smtClean="0">
+              <a:rPr lang="en-US" sz="2800" dirty="0" smtClean="0">
                 <a:solidFill>
                   <a:schemeClr val="accent6">
                     <a:lumMod val="10000"/>
@@ -5423,7 +5766,7 @@
               </a:rPr>
             </a:br>
             <a:r>
-              <a:rPr lang="en-US" i="1" dirty="0" smtClean="0">
+              <a:rPr lang="en-US" sz="2800" i="1" dirty="0" smtClean="0">
                 <a:solidFill>
                   <a:schemeClr val="accent6">
                     <a:lumMod val="10000"/>
@@ -5432,7 +5775,7 @@
               </a:rPr>
               <a:t>m neurons</a:t>
             </a:r>
-            <a:endParaRPr lang="en-US" dirty="0">
+            <a:endParaRPr lang="en-US" sz="2800" dirty="0">
               <a:solidFill>
                 <a:schemeClr val="accent6">
                   <a:lumMod val="10000"/>
@@ -5449,15 +5792,15 @@
           <p:nvPr/>
         </p:nvSpPr>
         <p:spPr>
-          <a:xfrm>
-            <a:off x="5987197" y="3320113"/>
-            <a:ext cx="3447288" cy="691517"/>
+          <a:xfrm rot="16200000">
+            <a:off x="4995128" y="1106206"/>
+            <a:ext cx="3291840" cy="1097280"/>
           </a:xfrm>
           <a:prstGeom prst="rect">
             <a:avLst/>
           </a:prstGeom>
           <a:noFill/>
-          <a:ln>
+          <a:ln w="28575">
             <a:solidFill>
               <a:schemeClr val="accent6">
                 <a:lumMod val="10000"/>
@@ -5487,7 +5830,7 @@
           <a:p>
             <a:pPr algn="ctr"/>
             <a:r>
-              <a:rPr lang="en-US" dirty="0" smtClean="0">
+              <a:rPr lang="en-US" sz="2800" dirty="0" smtClean="0">
                 <a:solidFill>
                   <a:schemeClr val="accent6">
                     <a:lumMod val="10000"/>
@@ -5500,7 +5843,7 @@
           <a:p>
             <a:pPr algn="ctr"/>
             <a:r>
-              <a:rPr lang="en-US" i="1" dirty="0">
+              <a:rPr lang="en-US" sz="2800" i="1" dirty="0">
                 <a:solidFill>
                   <a:schemeClr val="accent6">
                     <a:lumMod val="10000"/>
@@ -5510,7 +5853,7 @@
               <a:t>m</a:t>
             </a:r>
             <a:r>
-              <a:rPr lang="en-US" i="1" dirty="0" smtClean="0">
+              <a:rPr lang="en-US" sz="2800" i="1" dirty="0" smtClean="0">
                 <a:solidFill>
                   <a:schemeClr val="accent6">
                     <a:lumMod val="10000"/>
@@ -5520,7 +5863,7 @@
               <a:t>-1</a:t>
             </a:r>
             <a:r>
-              <a:rPr lang="en-US" dirty="0" smtClean="0">
+              <a:rPr lang="en-US" sz="2800" dirty="0" smtClean="0">
                 <a:solidFill>
                   <a:schemeClr val="accent6">
                     <a:lumMod val="10000"/>
@@ -5542,14 +5885,14 @@
           <p:nvPr/>
         </p:nvCxnSpPr>
         <p:spPr>
-          <a:xfrm flipV="1">
-            <a:off x="7710841" y="3176651"/>
-            <a:ext cx="0" cy="143462"/>
+          <a:xfrm flipH="1">
+            <a:off x="5662973" y="1654846"/>
+            <a:ext cx="429435" cy="0"/>
           </a:xfrm>
           <a:prstGeom prst="straightConnector1">
             <a:avLst/>
           </a:prstGeom>
-          <a:ln w="19050">
+          <a:ln w="57150">
             <a:solidFill>
               <a:schemeClr val="accent6">
                 <a:lumMod val="10000"/>
@@ -5577,60 +5920,23 @@
         <p:nvCxnSpPr>
           <p:cNvPr id="60" name="Elbow Connector 59"/>
           <p:cNvCxnSpPr>
-            <a:stCxn id="55" idx="1"/>
-          </p:cNvCxnSpPr>
-          <p:nvPr/>
-        </p:nvCxnSpPr>
-        <p:spPr>
-          <a:xfrm rot="10800000">
-            <a:off x="5698393" y="2239551"/>
-            <a:ext cx="288804" cy="571340"/>
-          </a:xfrm>
-          <a:prstGeom prst="bentConnector2">
-            <a:avLst/>
-          </a:prstGeom>
-          <a:ln w="19050">
-            <a:solidFill>
-              <a:schemeClr val="accent6">
-                <a:lumMod val="10000"/>
-              </a:schemeClr>
-            </a:solidFill>
-            <a:tailEnd type="triangle"/>
-          </a:ln>
-        </p:spPr>
-        <p:style>
-          <a:lnRef idx="1">
-            <a:schemeClr val="accent1"/>
-          </a:lnRef>
-          <a:fillRef idx="0">
-            <a:schemeClr val="accent1"/>
-          </a:fillRef>
-          <a:effectRef idx="0">
-            <a:schemeClr val="accent1"/>
-          </a:effectRef>
-          <a:fontRef idx="minor">
-            <a:schemeClr val="tx1"/>
-          </a:fontRef>
-        </p:style>
-      </p:cxnSp>
-      <p:cxnSp>
-        <p:nvCxnSpPr>
-          <p:cNvPr id="61" name="Elbow Connector 60"/>
-          <p:cNvCxnSpPr>
             <a:stCxn id="48" idx="3"/>
             <a:endCxn id="56" idx="2"/>
           </p:cNvCxnSpPr>
           <p:nvPr/>
         </p:nvCxnSpPr>
         <p:spPr>
-          <a:xfrm flipV="1">
-            <a:off x="5381153" y="2252251"/>
-            <a:ext cx="317240" cy="558640"/>
-          </a:xfrm>
-          <a:prstGeom prst="bentConnector2">
-            <a:avLst/>
-          </a:prstGeom>
-          <a:ln w="19050">
+          <a:xfrm rot="16200000" flipV="1">
+            <a:off x="4555831" y="3007654"/>
+            <a:ext cx="138928" cy="978076"/>
+          </a:xfrm>
+          <a:prstGeom prst="bentConnector4">
+            <a:avLst>
+              <a:gd name="adj1" fmla="val 104371"/>
+              <a:gd name="adj2" fmla="val 76628"/>
+            </a:avLst>
+          </a:prstGeom>
+          <a:ln w="57150">
             <a:solidFill>
               <a:schemeClr val="accent6">
                 <a:lumMod val="10000"/>
@@ -5664,14 +5970,58 @@
           <p:nvPr/>
         </p:nvCxnSpPr>
         <p:spPr>
-          <a:xfrm flipH="1" flipV="1">
-            <a:off x="5698392" y="1376506"/>
-            <a:ext cx="1" cy="184228"/>
+          <a:xfrm flipH="1">
+            <a:off x="2609540" y="3427228"/>
+            <a:ext cx="429437" cy="0"/>
           </a:xfrm>
           <a:prstGeom prst="straightConnector1">
             <a:avLst/>
           </a:prstGeom>
-          <a:ln w="19050">
+          <a:ln w="57150">
+            <a:solidFill>
+              <a:schemeClr val="accent6">
+                <a:lumMod val="10000"/>
+              </a:schemeClr>
+            </a:solidFill>
+            <a:tailEnd type="triangle"/>
+          </a:ln>
+        </p:spPr>
+        <p:style>
+          <a:lnRef idx="1">
+            <a:schemeClr val="accent1"/>
+          </a:lnRef>
+          <a:fillRef idx="0">
+            <a:schemeClr val="accent1"/>
+          </a:fillRef>
+          <a:effectRef idx="0">
+            <a:schemeClr val="accent1"/>
+          </a:effectRef>
+          <a:fontRef idx="minor">
+            <a:schemeClr val="tx1"/>
+          </a:fontRef>
+        </p:style>
+      </p:cxnSp>
+      <p:cxnSp>
+        <p:nvCxnSpPr>
+          <p:cNvPr id="73" name="Elbow Connector 72"/>
+          <p:cNvCxnSpPr>
+            <a:stCxn id="55" idx="1"/>
+            <a:endCxn id="56" idx="2"/>
+          </p:cNvCxnSpPr>
+          <p:nvPr/>
+        </p:nvCxnSpPr>
+        <p:spPr>
+          <a:xfrm rot="5400000">
+            <a:off x="4562064" y="2874959"/>
+            <a:ext cx="126462" cy="978076"/>
+          </a:xfrm>
+          <a:prstGeom prst="bentConnector4">
+            <a:avLst>
+              <a:gd name="adj1" fmla="val 78294"/>
+              <a:gd name="adj2" fmla="val 745"/>
+            </a:avLst>
+          </a:prstGeom>
+          <a:ln w="57150">
             <a:solidFill>
               <a:schemeClr val="accent6">
                 <a:lumMod val="10000"/>
@@ -5739,15 +6089,15 @@
           <p:nvPr/>
         </p:nvSpPr>
         <p:spPr>
-          <a:xfrm>
-            <a:off x="1933865" y="5101215"/>
-            <a:ext cx="3447288" cy="694944"/>
+          <a:xfrm rot="16200000">
+            <a:off x="8048559" y="4663438"/>
+            <a:ext cx="3291840" cy="1097280"/>
           </a:xfrm>
           <a:prstGeom prst="rect">
             <a:avLst/>
           </a:prstGeom>
           <a:noFill/>
-          <a:ln>
+          <a:ln w="28575">
             <a:solidFill>
               <a:schemeClr val="accent6">
                 <a:lumMod val="10000"/>
@@ -5777,7 +6127,7 @@
           <a:p>
             <a:pPr algn="ctr"/>
             <a:r>
-              <a:rPr lang="en-US" dirty="0" smtClean="0">
+              <a:rPr lang="en-US" sz="2800" dirty="0" smtClean="0">
                 <a:solidFill>
                   <a:schemeClr val="accent6">
                     <a:lumMod val="10000"/>
@@ -5790,7 +6140,7 @@
           <a:p>
             <a:pPr algn="ctr"/>
             <a:r>
-              <a:rPr lang="en-US" i="1" dirty="0" err="1" smtClean="0">
+              <a:rPr lang="en-US" sz="2800" i="1" dirty="0" err="1" smtClean="0">
                 <a:solidFill>
                   <a:schemeClr val="accent6">
                     <a:lumMod val="10000"/>
@@ -5800,7 +6150,7 @@
               <a:t>m+n</a:t>
             </a:r>
             <a:r>
-              <a:rPr lang="en-US" dirty="0" smtClean="0">
+              <a:rPr lang="en-US" sz="2800" dirty="0" smtClean="0">
                 <a:solidFill>
                   <a:schemeClr val="accent6">
                     <a:lumMod val="10000"/>
@@ -5810,7 +6160,7 @@
               <a:t> </a:t>
             </a:r>
             <a:r>
-              <a:rPr lang="en-US" dirty="0">
+              <a:rPr lang="en-US" sz="2800" dirty="0">
                 <a:solidFill>
                   <a:schemeClr val="accent6">
                     <a:lumMod val="10000"/>
@@ -5820,7 +6170,7 @@
               <a:t>n</a:t>
             </a:r>
             <a:r>
-              <a:rPr lang="en-US" dirty="0" smtClean="0">
+              <a:rPr lang="en-US" sz="2800" dirty="0" smtClean="0">
                 <a:solidFill>
                   <a:schemeClr val="accent6">
                     <a:lumMod val="10000"/>
@@ -5829,7 +6179,7 @@
               </a:rPr>
               <a:t>eurons</a:t>
             </a:r>
-            <a:endParaRPr lang="en-US" dirty="0">
+            <a:endParaRPr lang="en-US" sz="2800" dirty="0">
               <a:solidFill>
                 <a:schemeClr val="accent6">
                   <a:lumMod val="10000"/>
@@ -5846,15 +6196,15 @@
           <p:nvPr/>
         </p:nvSpPr>
         <p:spPr>
-          <a:xfrm>
-            <a:off x="1933865" y="3323937"/>
-            <a:ext cx="3447288" cy="694944"/>
+          <a:xfrm rot="16200000">
+            <a:off x="4995129" y="4663438"/>
+            <a:ext cx="3291840" cy="1097280"/>
           </a:xfrm>
           <a:prstGeom prst="rect">
             <a:avLst/>
           </a:prstGeom>
           <a:noFill/>
-          <a:ln>
+          <a:ln w="28575">
             <a:solidFill>
               <a:schemeClr val="accent6">
                 <a:lumMod val="10000"/>
@@ -5884,7 +6234,7 @@
           <a:p>
             <a:pPr algn="ctr"/>
             <a:r>
-              <a:rPr lang="en-US" dirty="0" smtClean="0">
+              <a:rPr lang="en-US" sz="2800" dirty="0" smtClean="0">
                 <a:solidFill>
                   <a:schemeClr val="accent6">
                     <a:lumMod val="10000"/>
@@ -5897,7 +6247,7 @@
           <a:p>
             <a:pPr algn="ctr"/>
             <a:r>
-              <a:rPr lang="en-US" i="1" dirty="0" err="1" smtClean="0">
+              <a:rPr lang="en-US" sz="2800" i="1" dirty="0" err="1" smtClean="0">
                 <a:solidFill>
                   <a:schemeClr val="accent6">
                     <a:lumMod val="10000"/>
@@ -5907,7 +6257,7 @@
               <a:t>m+n</a:t>
             </a:r>
             <a:r>
-              <a:rPr lang="en-US" dirty="0" smtClean="0">
+              <a:rPr lang="en-US" sz="2800" dirty="0" smtClean="0">
                 <a:solidFill>
                   <a:schemeClr val="accent6">
                     <a:lumMod val="10000"/>
@@ -5917,7 +6267,7 @@
               <a:t> </a:t>
             </a:r>
             <a:r>
-              <a:rPr lang="en-US" dirty="0">
+              <a:rPr lang="en-US" sz="2800" dirty="0">
                 <a:solidFill>
                   <a:schemeClr val="accent6">
                     <a:lumMod val="10000"/>
@@ -5927,7 +6277,7 @@
               <a:t>n</a:t>
             </a:r>
             <a:r>
-              <a:rPr lang="en-US" dirty="0" smtClean="0">
+              <a:rPr lang="en-US" sz="2800" dirty="0" smtClean="0">
                 <a:solidFill>
                   <a:schemeClr val="accent6">
                     <a:lumMod val="10000"/>
@@ -5936,7 +6286,7 @@
               </a:rPr>
               <a:t>eurons</a:t>
             </a:r>
-            <a:endParaRPr lang="en-US" dirty="0">
+            <a:endParaRPr lang="en-US" sz="2800" dirty="0">
               <a:solidFill>
                 <a:schemeClr val="accent6">
                   <a:lumMod val="10000"/>
@@ -5953,15 +6303,15 @@
           <p:nvPr/>
         </p:nvSpPr>
         <p:spPr>
-          <a:xfrm>
-            <a:off x="1933865" y="2438551"/>
-            <a:ext cx="3447288" cy="731520"/>
+          <a:xfrm rot="16200000">
+            <a:off x="3468413" y="4663436"/>
+            <a:ext cx="3291840" cy="1097280"/>
           </a:xfrm>
           <a:prstGeom prst="rect">
             <a:avLst/>
           </a:prstGeom>
           <a:noFill/>
-          <a:ln>
+          <a:ln w="28575">
             <a:solidFill>
               <a:schemeClr val="accent6">
                 <a:lumMod val="10000"/>
@@ -5991,7 +6341,7 @@
           <a:p>
             <a:pPr algn="ctr"/>
             <a:r>
-              <a:rPr lang="en-US" dirty="0" smtClean="0">
+              <a:rPr lang="en-US" sz="2800" dirty="0" smtClean="0">
                 <a:solidFill>
                   <a:schemeClr val="accent6">
                     <a:lumMod val="10000"/>
@@ -6010,15 +6360,15 @@
           <p:nvPr/>
         </p:nvSpPr>
         <p:spPr>
-          <a:xfrm>
-            <a:off x="1933865" y="5989854"/>
-            <a:ext cx="3447288" cy="694944"/>
+          <a:xfrm rot="16200000">
+            <a:off x="9575274" y="4663435"/>
+            <a:ext cx="3291840" cy="1097280"/>
           </a:xfrm>
           <a:prstGeom prst="rect">
             <a:avLst/>
           </a:prstGeom>
           <a:noFill/>
-          <a:ln>
+          <a:ln w="28575">
             <a:solidFill>
               <a:schemeClr val="accent6">
                 <a:lumMod val="10000"/>
@@ -6048,20 +6398,20 @@
           <a:p>
             <a:pPr algn="ctr"/>
             <a:r>
-              <a:rPr lang="en-US" dirty="0" smtClean="0">
-                <a:solidFill>
-                  <a:schemeClr val="accent6">
-                    <a:lumMod val="10000"/>
-                  </a:schemeClr>
-                </a:solidFill>
-              </a:rPr>
-              <a:t>Sequence + Data Input Layer</a:t>
+              <a:rPr lang="en-US" sz="2800" dirty="0" smtClean="0">
+                <a:solidFill>
+                  <a:schemeClr val="accent6">
+                    <a:lumMod val="10000"/>
+                  </a:schemeClr>
+                </a:solidFill>
+              </a:rPr>
+              <a:t>Sequence Input Layer</a:t>
             </a:r>
           </a:p>
           <a:p>
             <a:pPr algn="ctr"/>
             <a:r>
-              <a:rPr lang="en-US" i="1" dirty="0" smtClean="0">
+              <a:rPr lang="en-US" sz="2800" i="1" dirty="0" smtClean="0">
                 <a:solidFill>
                   <a:schemeClr val="accent6">
                     <a:lumMod val="10000"/>
@@ -6071,7 +6421,7 @@
               <a:t>n</a:t>
             </a:r>
             <a:r>
-              <a:rPr lang="en-US" dirty="0" smtClean="0">
+              <a:rPr lang="en-US" sz="2800" dirty="0" smtClean="0">
                 <a:solidFill>
                   <a:schemeClr val="accent6">
                     <a:lumMod val="10000"/>
@@ -6093,14 +6443,14 @@
           <p:nvPr/>
         </p:nvCxnSpPr>
         <p:spPr>
-          <a:xfrm flipV="1">
-            <a:off x="3657509" y="5796159"/>
-            <a:ext cx="0" cy="193695"/>
+          <a:xfrm flipH="1">
+            <a:off x="10243119" y="5212075"/>
+            <a:ext cx="429435" cy="3"/>
           </a:xfrm>
           <a:prstGeom prst="straightConnector1">
             <a:avLst/>
           </a:prstGeom>
-          <a:ln w="19050">
+          <a:ln w="57150">
             <a:solidFill>
               <a:schemeClr val="accent6">
                 <a:lumMod val="10000"/>
@@ -6134,14 +6484,14 @@
           <p:nvPr/>
         </p:nvCxnSpPr>
         <p:spPr>
-          <a:xfrm flipV="1">
-            <a:off x="3657509" y="4907520"/>
-            <a:ext cx="0" cy="193695"/>
+          <a:xfrm flipH="1">
+            <a:off x="8716404" y="5212078"/>
+            <a:ext cx="429435" cy="0"/>
           </a:xfrm>
           <a:prstGeom prst="straightConnector1">
             <a:avLst/>
           </a:prstGeom>
-          <a:ln w="19050">
+          <a:ln w="57150">
             <a:solidFill>
               <a:schemeClr val="accent6">
                 <a:lumMod val="10000"/>
@@ -6175,14 +6525,14 @@
           <p:nvPr/>
         </p:nvCxnSpPr>
         <p:spPr>
-          <a:xfrm flipV="1">
-            <a:off x="3657509" y="4018881"/>
-            <a:ext cx="0" cy="193695"/>
+          <a:xfrm flipH="1">
+            <a:off x="7189689" y="5212078"/>
+            <a:ext cx="429435" cy="0"/>
           </a:xfrm>
           <a:prstGeom prst="straightConnector1">
             <a:avLst/>
           </a:prstGeom>
-          <a:ln w="19050">
+          <a:ln w="57150">
             <a:solidFill>
               <a:schemeClr val="accent6">
                 <a:lumMod val="10000"/>
@@ -6213,15 +6563,15 @@
           <p:nvPr/>
         </p:nvSpPr>
         <p:spPr>
-          <a:xfrm>
-            <a:off x="1933865" y="4212576"/>
-            <a:ext cx="3447288" cy="694944"/>
+          <a:xfrm rot="16200000">
+            <a:off x="6521844" y="4663438"/>
+            <a:ext cx="3291840" cy="1097280"/>
           </a:xfrm>
           <a:prstGeom prst="rect">
             <a:avLst/>
           </a:prstGeom>
           <a:noFill/>
-          <a:ln>
+          <a:ln w="28575">
             <a:solidFill>
               <a:schemeClr val="accent6">
                 <a:lumMod val="10000"/>
@@ -6251,7 +6601,7 @@
           <a:p>
             <a:pPr algn="ctr"/>
             <a:r>
-              <a:rPr lang="en-US" dirty="0" smtClean="0">
+              <a:rPr lang="en-US" sz="2800" dirty="0" smtClean="0">
                 <a:solidFill>
                   <a:schemeClr val="accent6">
                     <a:lumMod val="10000"/>
@@ -6273,14 +6623,14 @@
           <p:nvPr/>
         </p:nvCxnSpPr>
         <p:spPr>
-          <a:xfrm flipV="1">
-            <a:off x="3657509" y="3170071"/>
-            <a:ext cx="0" cy="153866"/>
+          <a:xfrm flipH="1" flipV="1">
+            <a:off x="5662973" y="5212076"/>
+            <a:ext cx="429436" cy="2"/>
           </a:xfrm>
           <a:prstGeom prst="straightConnector1">
             <a:avLst/>
           </a:prstGeom>
-          <a:ln w="19050">
+          <a:ln w="57150">
             <a:solidFill>
               <a:schemeClr val="accent6">
                 <a:lumMod val="10000"/>
@@ -6311,15 +6661,15 @@
           <p:nvPr/>
         </p:nvSpPr>
         <p:spPr>
-          <a:xfrm>
-            <a:off x="5987197" y="2438551"/>
-            <a:ext cx="3447288" cy="731520"/>
+          <a:xfrm rot="16200000">
+            <a:off x="3468413" y="1106206"/>
+            <a:ext cx="3291840" cy="1097280"/>
           </a:xfrm>
           <a:prstGeom prst="rect">
             <a:avLst/>
           </a:prstGeom>
           <a:noFill/>
-          <a:ln>
+          <a:ln w="28575">
             <a:solidFill>
               <a:schemeClr val="accent6">
                 <a:lumMod val="10000"/>
@@ -6349,7 +6699,7 @@
           <a:p>
             <a:pPr algn="ctr"/>
             <a:r>
-              <a:rPr lang="en-US" dirty="0" smtClean="0">
+              <a:rPr lang="en-US" sz="2800" dirty="0" smtClean="0">
                 <a:solidFill>
                   <a:schemeClr val="accent6">
                     <a:lumMod val="10000"/>
@@ -6362,7 +6712,7 @@
           <a:p>
             <a:pPr algn="ctr"/>
             <a:r>
-              <a:rPr lang="en-US" i="1" dirty="0" smtClean="0">
+              <a:rPr lang="en-US" sz="2800" i="1" dirty="0" smtClean="0">
                 <a:solidFill>
                   <a:schemeClr val="accent6">
                     <a:lumMod val="10000"/>
@@ -6372,7 +6722,7 @@
               <a:t>500</a:t>
             </a:r>
             <a:r>
-              <a:rPr lang="en-US" dirty="0" smtClean="0">
+              <a:rPr lang="en-US" sz="2800" dirty="0" smtClean="0">
                 <a:solidFill>
                   <a:schemeClr val="accent6">
                     <a:lumMod val="10000"/>
@@ -6381,7 +6731,7 @@
               </a:rPr>
               <a:t> neurons</a:t>
             </a:r>
-            <a:endParaRPr lang="en-US" dirty="0">
+            <a:endParaRPr lang="en-US" sz="2800" dirty="0">
               <a:solidFill>
                 <a:schemeClr val="accent6">
                   <a:lumMod val="10000"/>
@@ -6398,15 +6748,15 @@
           <p:nvPr/>
         </p:nvSpPr>
         <p:spPr>
-          <a:xfrm>
-            <a:off x="3975100" y="1560734"/>
-            <a:ext cx="3446586" cy="691517"/>
+          <a:xfrm rot="16200000">
+            <a:off x="1758817" y="2878588"/>
+            <a:ext cx="3657600" cy="1097280"/>
           </a:xfrm>
           <a:prstGeom prst="rect">
             <a:avLst/>
           </a:prstGeom>
           <a:noFill/>
-          <a:ln>
+          <a:ln w="28575">
             <a:solidFill>
               <a:schemeClr val="accent6">
                 <a:lumMod val="10000"/>
@@ -6436,7 +6786,7 @@
           <a:p>
             <a:pPr algn="ctr"/>
             <a:r>
-              <a:rPr lang="en-US" dirty="0" smtClean="0">
+              <a:rPr lang="en-US" sz="2800" dirty="0" smtClean="0">
                 <a:solidFill>
                   <a:schemeClr val="accent6">
                     <a:lumMod val="10000"/>
@@ -6446,7 +6796,7 @@
               <a:t>Dense Layer (</a:t>
             </a:r>
             <a:r>
-              <a:rPr lang="en-US" i="1" dirty="0" err="1" smtClean="0">
+              <a:rPr lang="en-US" sz="2800" i="1" dirty="0" err="1" smtClean="0">
                 <a:solidFill>
                   <a:schemeClr val="accent6">
                     <a:lumMod val="10000"/>
@@ -6456,7 +6806,7 @@
               <a:t>ReLU</a:t>
             </a:r>
             <a:r>
-              <a:rPr lang="en-US" dirty="0" smtClean="0">
+              <a:rPr lang="en-US" sz="2800" dirty="0" smtClean="0">
                 <a:solidFill>
                   <a:schemeClr val="accent6">
                     <a:lumMod val="10000"/>
@@ -6469,7 +6819,7 @@
           <a:p>
             <a:pPr algn="ctr"/>
             <a:r>
-              <a:rPr lang="en-US" i="1" dirty="0">
+              <a:rPr lang="en-US" sz="2800" i="1" dirty="0">
                 <a:solidFill>
                   <a:schemeClr val="accent6">
                     <a:lumMod val="10000"/>
@@ -6479,7 +6829,7 @@
               <a:t>m+n+500</a:t>
             </a:r>
             <a:r>
-              <a:rPr lang="en-US" dirty="0">
+              <a:rPr lang="en-US" sz="2800" dirty="0">
                 <a:solidFill>
                   <a:schemeClr val="accent6">
                     <a:lumMod val="10000"/>
@@ -6498,15 +6848,15 @@
           <p:nvPr/>
         </p:nvSpPr>
         <p:spPr>
-          <a:xfrm>
-            <a:off x="3975100" y="532444"/>
-            <a:ext cx="3446584" cy="844062"/>
+          <a:xfrm rot="16200000">
+            <a:off x="232100" y="2878588"/>
+            <a:ext cx="3657600" cy="1097280"/>
           </a:xfrm>
           <a:prstGeom prst="rect">
             <a:avLst/>
           </a:prstGeom>
           <a:noFill/>
-          <a:ln>
+          <a:ln w="28575">
             <a:solidFill>
               <a:schemeClr val="accent6">
                 <a:lumMod val="10000"/>
@@ -6536,7 +6886,7 @@
           <a:p>
             <a:pPr algn="ctr"/>
             <a:r>
-              <a:rPr lang="en-US" dirty="0" smtClean="0">
+              <a:rPr lang="en-US" sz="2800" dirty="0" smtClean="0">
                 <a:solidFill>
                   <a:schemeClr val="accent6">
                     <a:lumMod val="10000"/>
@@ -6546,7 +6896,7 @@
               <a:t>Dense Layer (</a:t>
             </a:r>
             <a:r>
-              <a:rPr lang="en-US" i="1" dirty="0" err="1" smtClean="0">
+              <a:rPr lang="en-US" sz="2800" i="1" dirty="0" err="1" smtClean="0">
                 <a:solidFill>
                   <a:schemeClr val="accent6">
                     <a:lumMod val="10000"/>
@@ -6556,7 +6906,7 @@
               <a:t>Softmax</a:t>
             </a:r>
             <a:r>
-              <a:rPr lang="en-US" dirty="0" smtClean="0">
+              <a:rPr lang="en-US" sz="2800" dirty="0" smtClean="0">
                 <a:solidFill>
                   <a:schemeClr val="accent6">
                     <a:lumMod val="10000"/>
@@ -6566,7 +6916,7 @@
               <a:t>)</a:t>
             </a:r>
             <a:br>
-              <a:rPr lang="en-US" dirty="0" smtClean="0">
+              <a:rPr lang="en-US" sz="2800" dirty="0" smtClean="0">
                 <a:solidFill>
                   <a:schemeClr val="accent6">
                     <a:lumMod val="10000"/>
@@ -6575,7 +6925,7 @@
               </a:rPr>
             </a:br>
             <a:r>
-              <a:rPr lang="en-US" i="1" dirty="0" smtClean="0">
+              <a:rPr lang="en-US" sz="2800" i="1" dirty="0" smtClean="0">
                 <a:solidFill>
                   <a:schemeClr val="accent6">
                     <a:lumMod val="10000"/>
@@ -6584,7 +6934,7 @@
               </a:rPr>
               <a:t>m neurons</a:t>
             </a:r>
-            <a:endParaRPr lang="en-US" dirty="0">
+            <a:endParaRPr lang="en-US" sz="2800" dirty="0">
               <a:solidFill>
                 <a:schemeClr val="accent6">
                   <a:lumMod val="10000"/>
@@ -6601,15 +6951,15 @@
           <p:nvPr/>
         </p:nvSpPr>
         <p:spPr>
-          <a:xfrm>
-            <a:off x="5987197" y="3320113"/>
-            <a:ext cx="3447288" cy="691517"/>
+          <a:xfrm rot="16200000">
+            <a:off x="4995128" y="1106206"/>
+            <a:ext cx="3291840" cy="1097280"/>
           </a:xfrm>
           <a:prstGeom prst="rect">
             <a:avLst/>
           </a:prstGeom>
           <a:noFill/>
-          <a:ln>
+          <a:ln w="28575">
             <a:solidFill>
               <a:schemeClr val="accent6">
                 <a:lumMod val="10000"/>
@@ -6639,7 +6989,7 @@
           <a:p>
             <a:pPr algn="ctr"/>
             <a:r>
-              <a:rPr lang="en-US" dirty="0" smtClean="0">
+              <a:rPr lang="en-US" sz="2800" dirty="0" smtClean="0">
                 <a:solidFill>
                   <a:schemeClr val="accent6">
                     <a:lumMod val="10000"/>
@@ -6652,7 +7002,7 @@
           <a:p>
             <a:pPr algn="ctr"/>
             <a:r>
-              <a:rPr lang="en-US" i="1" dirty="0">
+              <a:rPr lang="en-US" sz="2800" i="1" smtClean="0">
                 <a:solidFill>
                   <a:schemeClr val="accent6">
                     <a:lumMod val="10000"/>
@@ -6662,14 +7012,24 @@
               <a:t>l</a:t>
             </a:r>
             <a:r>
-              <a:rPr lang="en-US" dirty="0" smtClean="0">
-                <a:solidFill>
-                  <a:schemeClr val="accent6">
-                    <a:lumMod val="10000"/>
-                  </a:schemeClr>
-                </a:solidFill>
-              </a:rPr>
-              <a:t> neurons</a:t>
+              <a:rPr lang="en-US" sz="2800" smtClean="0">
+                <a:solidFill>
+                  <a:schemeClr val="accent6">
+                    <a:lumMod val="10000"/>
+                  </a:schemeClr>
+                </a:solidFill>
+              </a:rPr>
+              <a:t> </a:t>
+            </a:r>
+            <a:r>
+              <a:rPr lang="en-US" sz="2800" dirty="0" smtClean="0">
+                <a:solidFill>
+                  <a:schemeClr val="accent6">
+                    <a:lumMod val="10000"/>
+                  </a:schemeClr>
+                </a:solidFill>
+              </a:rPr>
+              <a:t>neurons</a:t>
             </a:r>
           </a:p>
         </p:txBody>
@@ -6684,14 +7044,14 @@
           <p:nvPr/>
         </p:nvCxnSpPr>
         <p:spPr>
-          <a:xfrm flipV="1">
-            <a:off x="7710841" y="3170071"/>
-            <a:ext cx="0" cy="150042"/>
+          <a:xfrm flipH="1">
+            <a:off x="5662973" y="1654846"/>
+            <a:ext cx="429435" cy="0"/>
           </a:xfrm>
           <a:prstGeom prst="straightConnector1">
             <a:avLst/>
           </a:prstGeom>
-          <a:ln w="19050">
+          <a:ln w="57150">
             <a:solidFill>
               <a:schemeClr val="accent6">
                 <a:lumMod val="10000"/>
@@ -6719,60 +7079,23 @@
         <p:nvCxnSpPr>
           <p:cNvPr id="60" name="Elbow Connector 59"/>
           <p:cNvCxnSpPr>
-            <a:stCxn id="55" idx="1"/>
-          </p:cNvCxnSpPr>
-          <p:nvPr/>
-        </p:nvCxnSpPr>
-        <p:spPr>
-          <a:xfrm rot="10800000">
-            <a:off x="5698393" y="2234297"/>
-            <a:ext cx="288804" cy="570014"/>
-          </a:xfrm>
-          <a:prstGeom prst="bentConnector2">
-            <a:avLst/>
-          </a:prstGeom>
-          <a:ln w="19050">
-            <a:solidFill>
-              <a:schemeClr val="accent6">
-                <a:lumMod val="10000"/>
-              </a:schemeClr>
-            </a:solidFill>
-            <a:tailEnd type="triangle"/>
-          </a:ln>
-        </p:spPr>
-        <p:style>
-          <a:lnRef idx="1">
-            <a:schemeClr val="accent1"/>
-          </a:lnRef>
-          <a:fillRef idx="0">
-            <a:schemeClr val="accent1"/>
-          </a:fillRef>
-          <a:effectRef idx="0">
-            <a:schemeClr val="accent1"/>
-          </a:effectRef>
-          <a:fontRef idx="minor">
-            <a:schemeClr val="tx1"/>
-          </a:fontRef>
-        </p:style>
-      </p:cxnSp>
-      <p:cxnSp>
-        <p:nvCxnSpPr>
-          <p:cNvPr id="61" name="Elbow Connector 60"/>
-          <p:cNvCxnSpPr>
             <a:stCxn id="48" idx="3"/>
             <a:endCxn id="56" idx="2"/>
           </p:cNvCxnSpPr>
           <p:nvPr/>
         </p:nvCxnSpPr>
         <p:spPr>
-          <a:xfrm flipV="1">
-            <a:off x="5381153" y="2252251"/>
-            <a:ext cx="317240" cy="552060"/>
-          </a:xfrm>
-          <a:prstGeom prst="bentConnector2">
-            <a:avLst/>
-          </a:prstGeom>
-          <a:ln w="19050">
+          <a:xfrm rot="16200000" flipV="1">
+            <a:off x="4555831" y="3007654"/>
+            <a:ext cx="138928" cy="978076"/>
+          </a:xfrm>
+          <a:prstGeom prst="bentConnector4">
+            <a:avLst>
+              <a:gd name="adj1" fmla="val 104371"/>
+              <a:gd name="adj2" fmla="val 76628"/>
+            </a:avLst>
+          </a:prstGeom>
+          <a:ln w="57150">
             <a:solidFill>
               <a:schemeClr val="accent6">
                 <a:lumMod val="10000"/>
@@ -6806,14 +7129,58 @@
           <p:nvPr/>
         </p:nvCxnSpPr>
         <p:spPr>
-          <a:xfrm flipH="1" flipV="1">
-            <a:off x="5698392" y="1376506"/>
-            <a:ext cx="1" cy="184228"/>
+          <a:xfrm flipH="1">
+            <a:off x="2609540" y="3427228"/>
+            <a:ext cx="429437" cy="0"/>
           </a:xfrm>
           <a:prstGeom prst="straightConnector1">
             <a:avLst/>
           </a:prstGeom>
-          <a:ln w="19050">
+          <a:ln w="57150">
+            <a:solidFill>
+              <a:schemeClr val="accent6">
+                <a:lumMod val="10000"/>
+              </a:schemeClr>
+            </a:solidFill>
+            <a:tailEnd type="triangle"/>
+          </a:ln>
+        </p:spPr>
+        <p:style>
+          <a:lnRef idx="1">
+            <a:schemeClr val="accent1"/>
+          </a:lnRef>
+          <a:fillRef idx="0">
+            <a:schemeClr val="accent1"/>
+          </a:fillRef>
+          <a:effectRef idx="0">
+            <a:schemeClr val="accent1"/>
+          </a:effectRef>
+          <a:fontRef idx="minor">
+            <a:schemeClr val="tx1"/>
+          </a:fontRef>
+        </p:style>
+      </p:cxnSp>
+      <p:cxnSp>
+        <p:nvCxnSpPr>
+          <p:cNvPr id="73" name="Elbow Connector 72"/>
+          <p:cNvCxnSpPr>
+            <a:stCxn id="55" idx="1"/>
+            <a:endCxn id="56" idx="2"/>
+          </p:cNvCxnSpPr>
+          <p:nvPr/>
+        </p:nvCxnSpPr>
+        <p:spPr>
+          <a:xfrm rot="5400000">
+            <a:off x="4562064" y="2874959"/>
+            <a:ext cx="126462" cy="978076"/>
+          </a:xfrm>
+          <a:prstGeom prst="bentConnector4">
+            <a:avLst>
+              <a:gd name="adj1" fmla="val 78294"/>
+              <a:gd name="adj2" fmla="val 745"/>
+            </a:avLst>
+          </a:prstGeom>
+          <a:ln w="57150">
             <a:solidFill>
               <a:schemeClr val="accent6">
                 <a:lumMod val="10000"/>
@@ -6840,7 +7207,7 @@
     </p:spTree>
     <p:extLst>
       <p:ext uri="{BB962C8B-B14F-4D97-AF65-F5344CB8AC3E}">
-        <p14:creationId xmlns:p14="http://schemas.microsoft.com/office/powerpoint/2010/main" val="2695448670"/>
+        <p14:creationId xmlns:p14="http://schemas.microsoft.com/office/powerpoint/2010/main" val="3160853166"/>
       </p:ext>
     </p:extLst>
   </p:cSld>
@@ -6882,8 +7249,8 @@
         </p:nvSpPr>
         <p:spPr>
           <a:xfrm>
-            <a:off x="3048001" y="1843088"/>
-            <a:ext cx="444500" cy="444500"/>
+            <a:off x="215901" y="2168307"/>
+            <a:ext cx="1666988" cy="1666988"/>
           </a:xfrm>
           <a:prstGeom prst="rect">
             <a:avLst/>
@@ -6920,7 +7287,7 @@
               <a:defRPr/>
             </a:pPr>
             <a:r>
-              <a:rPr kumimoji="0" lang="en-US" sz="1800" b="0" i="0" u="none" strike="noStrike" kern="0" cap="none" spc="0" normalizeH="0" baseline="0" noProof="0" dirty="0" smtClean="0">
+              <a:rPr kumimoji="0" lang="en-US" sz="5400" b="0" i="0" u="none" strike="noStrike" kern="0" cap="none" spc="0" normalizeH="0" baseline="0" noProof="0" dirty="0" smtClean="0">
                 <a:ln>
                   <a:noFill/>
                 </a:ln>
@@ -6930,7 +7297,6 @@
                 <a:effectLst/>
                 <a:uLnTx/>
                 <a:uFillTx/>
-                <a:latin typeface="Calibri" panose="020F0502020204030204"/>
                 <a:ea typeface="+mn-ea"/>
                 <a:cs typeface="+mn-cs"/>
               </a:rPr>
@@ -6947,8 +7313,8 @@
         </p:nvSpPr>
         <p:spPr>
           <a:xfrm>
-            <a:off x="3683001" y="1843088"/>
-            <a:ext cx="444500" cy="444500"/>
+            <a:off x="2597313" y="2168307"/>
+            <a:ext cx="1666988" cy="1666988"/>
           </a:xfrm>
           <a:prstGeom prst="rect">
             <a:avLst/>
@@ -6985,7 +7351,7 @@
               <a:defRPr/>
             </a:pPr>
             <a:r>
-              <a:rPr kumimoji="0" lang="en-US" sz="1800" b="0" i="0" u="none" strike="noStrike" kern="0" cap="none" spc="0" normalizeH="0" baseline="0" noProof="0" dirty="0" smtClean="0">
+              <a:rPr kumimoji="0" lang="en-US" sz="5400" b="0" i="0" u="none" strike="noStrike" kern="0" cap="none" spc="0" normalizeH="0" baseline="0" noProof="0" dirty="0" smtClean="0">
                 <a:ln>
                   <a:noFill/>
                 </a:ln>
@@ -6995,7 +7361,6 @@
                 <a:effectLst/>
                 <a:uLnTx/>
                 <a:uFillTx/>
-                <a:latin typeface="Calibri" panose="020F0502020204030204"/>
                 <a:ea typeface="+mn-ea"/>
                 <a:cs typeface="+mn-cs"/>
               </a:rPr>
@@ -7012,8 +7377,8 @@
         </p:nvSpPr>
         <p:spPr>
           <a:xfrm>
-            <a:off x="4318001" y="1843088"/>
-            <a:ext cx="444500" cy="444500"/>
+            <a:off x="4978725" y="2168307"/>
+            <a:ext cx="1666988" cy="1666988"/>
           </a:xfrm>
           <a:prstGeom prst="rect">
             <a:avLst/>
@@ -7050,7 +7415,7 @@
               <a:defRPr/>
             </a:pPr>
             <a:r>
-              <a:rPr kumimoji="0" lang="en-US" sz="1800" b="0" i="0" u="none" strike="noStrike" kern="0" cap="none" spc="0" normalizeH="0" baseline="0" noProof="0" dirty="0" smtClean="0">
+              <a:rPr kumimoji="0" lang="en-US" sz="5400" b="0" i="0" u="none" strike="noStrike" kern="0" cap="none" spc="0" normalizeH="0" baseline="0" noProof="0" dirty="0" smtClean="0">
                 <a:ln>
                   <a:noFill/>
                 </a:ln>
@@ -7060,7 +7425,6 @@
                 <a:effectLst/>
                 <a:uLnTx/>
                 <a:uFillTx/>
-                <a:latin typeface="Calibri" panose="020F0502020204030204"/>
                 <a:ea typeface="+mn-ea"/>
                 <a:cs typeface="+mn-cs"/>
               </a:rPr>
@@ -7077,8 +7441,8 @@
         </p:nvSpPr>
         <p:spPr>
           <a:xfrm>
-            <a:off x="4953001" y="1843088"/>
-            <a:ext cx="444500" cy="444500"/>
+            <a:off x="7360137" y="2168307"/>
+            <a:ext cx="1666988" cy="1666988"/>
           </a:xfrm>
           <a:prstGeom prst="rect">
             <a:avLst/>
@@ -7115,7 +7479,7 @@
               <a:defRPr/>
             </a:pPr>
             <a:r>
-              <a:rPr kumimoji="0" lang="en-US" sz="1800" b="0" i="0" u="none" strike="noStrike" kern="0" cap="none" spc="0" normalizeH="0" baseline="0" noProof="0" dirty="0" smtClean="0">
+              <a:rPr kumimoji="0" lang="en-US" sz="5400" b="0" i="0" u="none" strike="noStrike" kern="0" cap="none" spc="0" normalizeH="0" baseline="0" noProof="0" dirty="0" smtClean="0">
                 <a:ln>
                   <a:noFill/>
                 </a:ln>
@@ -7125,7 +7489,6 @@
                 <a:effectLst/>
                 <a:uLnTx/>
                 <a:uFillTx/>
-                <a:latin typeface="Calibri" panose="020F0502020204030204"/>
                 <a:ea typeface="+mn-ea"/>
                 <a:cs typeface="+mn-cs"/>
               </a:rPr>
@@ -7142,8 +7505,8 @@
         </p:nvSpPr>
         <p:spPr>
           <a:xfrm>
-            <a:off x="5588001" y="1843088"/>
-            <a:ext cx="444500" cy="444500"/>
+            <a:off x="9741548" y="2168307"/>
+            <a:ext cx="1666988" cy="1666988"/>
           </a:xfrm>
           <a:prstGeom prst="rect">
             <a:avLst/>
@@ -7180,15 +7543,14 @@
               <a:defRPr/>
             </a:pPr>
             <a:r>
-              <a:rPr lang="en-US" kern="0" dirty="0">
+              <a:rPr lang="en-US" sz="5400" kern="0" dirty="0">
                 <a:solidFill>
                   <a:schemeClr val="bg2"/>
                 </a:solidFill>
-                <a:latin typeface="Calibri" panose="020F0502020204030204"/>
               </a:rPr>
               <a:t>?</a:t>
             </a:r>
-            <a:endParaRPr kumimoji="0" lang="en-US" sz="1800" b="0" i="0" u="none" strike="noStrike" kern="0" cap="none" spc="0" normalizeH="0" baseline="0" noProof="0" dirty="0" smtClean="0">
+            <a:endParaRPr kumimoji="0" lang="en-US" sz="5400" b="0" i="0" u="none" strike="noStrike" kern="0" cap="none" spc="0" normalizeH="0" baseline="0" noProof="0" dirty="0" smtClean="0">
               <a:ln>
                 <a:noFill/>
               </a:ln>
@@ -7198,9 +7560,6 @@
               <a:effectLst/>
               <a:uLnTx/>
               <a:uFillTx/>
-              <a:latin typeface="Calibri" panose="020F0502020204030204"/>
-              <a:ea typeface="+mn-ea"/>
-              <a:cs typeface="+mn-cs"/>
             </a:endParaRPr>
           </a:p>
         </p:txBody>
@@ -7213,12 +7572,13 @@
         </p:nvSpPr>
         <p:spPr>
           <a:xfrm rot="5400000">
-            <a:off x="4128294" y="1245397"/>
-            <a:ext cx="188914" cy="2349500"/>
+            <a:off x="4267275" y="-73187"/>
+            <a:ext cx="708475" cy="8811224"/>
           </a:xfrm>
           <a:prstGeom prst="rightBrace">
             <a:avLst/>
           </a:prstGeom>
+          <a:ln w="38100"/>
         </p:spPr>
         <p:style>
           <a:lnRef idx="1">
@@ -7239,7 +7599,7 @@
           <a:lstStyle/>
           <a:p>
             <a:pPr algn="ctr"/>
-            <a:endParaRPr lang="en-US"/>
+            <a:endParaRPr lang="en-US" sz="5400"/>
           </a:p>
         </p:txBody>
       </p:sp>
@@ -7251,8 +7611,8 @@
         </p:nvSpPr>
         <p:spPr>
           <a:xfrm>
-            <a:off x="3448052" y="2552706"/>
-            <a:ext cx="1600199" cy="369332"/>
+            <a:off x="3251070" y="4829556"/>
+            <a:ext cx="2740886" cy="923330"/>
           </a:xfrm>
           <a:prstGeom prst="rect">
             <a:avLst/>
@@ -7267,10 +7627,10 @@
           <a:p>
             <a:pPr algn="ctr"/>
             <a:r>
-              <a:rPr lang="en-US" dirty="0" smtClean="0"/>
+              <a:rPr lang="en-US" sz="5400" dirty="0" smtClean="0"/>
               <a:t>trace</a:t>
             </a:r>
-            <a:endParaRPr lang="en-US" dirty="0"/>
+            <a:endParaRPr lang="en-US" sz="5400" dirty="0"/>
           </a:p>
         </p:txBody>
       </p:sp>
@@ -7285,13 +7645,13 @@
         </p:nvCxnSpPr>
         <p:spPr>
           <a:xfrm flipV="1">
-            <a:off x="5810251" y="2287588"/>
-            <a:ext cx="0" cy="227016"/>
+            <a:off x="10575041" y="3835295"/>
+            <a:ext cx="1" cy="994261"/>
           </a:xfrm>
           <a:prstGeom prst="straightConnector1">
             <a:avLst/>
           </a:prstGeom>
-          <a:ln>
+          <a:ln w="38100">
             <a:tailEnd type="triangle"/>
           </a:ln>
         </p:spPr>
@@ -7318,8 +7678,8 @@
         </p:nvSpPr>
         <p:spPr>
           <a:xfrm>
-            <a:off x="5010151" y="2514604"/>
-            <a:ext cx="1600199" cy="553998"/>
+            <a:off x="9055819" y="4829556"/>
+            <a:ext cx="3038444" cy="1661993"/>
           </a:xfrm>
           <a:prstGeom prst="rect">
             <a:avLst/>
@@ -7334,10 +7694,10 @@
           <a:p>
             <a:pPr algn="ctr"/>
             <a:r>
-              <a:rPr lang="en-US" dirty="0" smtClean="0"/>
+              <a:rPr lang="en-US" sz="5400" dirty="0" smtClean="0"/>
               <a:t>prediction target</a:t>
             </a:r>
-            <a:endParaRPr lang="en-US" dirty="0"/>
+            <a:endParaRPr lang="en-US" sz="5400" dirty="0"/>
           </a:p>
         </p:txBody>
       </p:sp>
@@ -7349,8 +7709,8 @@
         </p:nvSpPr>
         <p:spPr>
           <a:xfrm>
-            <a:off x="4222751" y="1310027"/>
-            <a:ext cx="1911349" cy="276999"/>
+            <a:off x="4609608" y="863601"/>
+            <a:ext cx="7168046" cy="830997"/>
           </a:xfrm>
           <a:prstGeom prst="rect">
             <a:avLst/>
@@ -7365,10 +7725,10 @@
           <a:p>
             <a:pPr algn="ctr"/>
             <a:r>
-              <a:rPr lang="en-US" dirty="0" smtClean="0"/>
+              <a:rPr lang="en-US" sz="5400" dirty="0" smtClean="0"/>
               <a:t>elapsed activity</a:t>
             </a:r>
-            <a:endParaRPr lang="en-US" dirty="0"/>
+            <a:endParaRPr lang="en-US" sz="5400" dirty="0"/>
           </a:p>
         </p:txBody>
       </p:sp>
@@ -7382,14 +7742,14 @@
           <p:nvPr/>
         </p:nvCxnSpPr>
         <p:spPr>
-          <a:xfrm flipH="1">
-            <a:off x="5175251" y="1587026"/>
-            <a:ext cx="3175" cy="256062"/>
+          <a:xfrm>
+            <a:off x="8193631" y="1694598"/>
+            <a:ext cx="0" cy="473709"/>
           </a:xfrm>
           <a:prstGeom prst="straightConnector1">
             <a:avLst/>
           </a:prstGeom>
-          <a:ln>
+          <a:ln w="38100">
             <a:tailEnd type="triangle"/>
           </a:ln>
         </p:spPr>
@@ -9266,4 +9626,265 @@
     </a:ext>
   </a:extLst>
 </a:theme>
+</file>
+
+<file path=ppt/theme/theme2.xml><?xml version="1.0" encoding="utf-8"?>
+<a:theme xmlns:a="http://schemas.openxmlformats.org/drawingml/2006/main" name="Office Theme">
+  <a:themeElements>
+    <a:clrScheme name="Office">
+      <a:dk1>
+        <a:sysClr val="windowText" lastClr="000000"/>
+      </a:dk1>
+      <a:lt1>
+        <a:sysClr val="window" lastClr="FFFFFF"/>
+      </a:lt1>
+      <a:dk2>
+        <a:srgbClr val="44546A"/>
+      </a:dk2>
+      <a:lt2>
+        <a:srgbClr val="E7E6E6"/>
+      </a:lt2>
+      <a:accent1>
+        <a:srgbClr val="5B9BD5"/>
+      </a:accent1>
+      <a:accent2>
+        <a:srgbClr val="ED7D31"/>
+      </a:accent2>
+      <a:accent3>
+        <a:srgbClr val="A5A5A5"/>
+      </a:accent3>
+      <a:accent4>
+        <a:srgbClr val="FFC000"/>
+      </a:accent4>
+      <a:accent5>
+        <a:srgbClr val="4472C4"/>
+      </a:accent5>
+      <a:accent6>
+        <a:srgbClr val="70AD47"/>
+      </a:accent6>
+      <a:hlink>
+        <a:srgbClr val="0563C1"/>
+      </a:hlink>
+      <a:folHlink>
+        <a:srgbClr val="954F72"/>
+      </a:folHlink>
+    </a:clrScheme>
+    <a:fontScheme name="Office">
+      <a:majorFont>
+        <a:latin typeface="Calibri Light" panose="020F0302020204030204"/>
+        <a:ea typeface=""/>
+        <a:cs typeface=""/>
+        <a:font script="Jpan" typeface="游ゴシック Light"/>
+        <a:font script="Hang" typeface="맑은 고딕"/>
+        <a:font script="Hans" typeface="等线 Light"/>
+        <a:font script="Hant" typeface="新細明體"/>
+        <a:font script="Arab" typeface="Times New Roman"/>
+        <a:font script="Hebr" typeface="Times New Roman"/>
+        <a:font script="Thai" typeface="Angsana New"/>
+        <a:font script="Ethi" typeface="Nyala"/>
+        <a:font script="Beng" typeface="Vrinda"/>
+        <a:font script="Gujr" typeface="Shruti"/>
+        <a:font script="Khmr" typeface="MoolBoran"/>
+        <a:font script="Knda" typeface="Tunga"/>
+        <a:font script="Guru" typeface="Raavi"/>
+        <a:font script="Cans" typeface="Euphemia"/>
+        <a:font script="Cher" typeface="Plantagenet Cherokee"/>
+        <a:font script="Yiii" typeface="Microsoft Yi Baiti"/>
+        <a:font script="Tibt" typeface="Microsoft Himalaya"/>
+        <a:font script="Thaa" typeface="MV Boli"/>
+        <a:font script="Deva" typeface="Mangal"/>
+        <a:font script="Telu" typeface="Gautami"/>
+        <a:font script="Taml" typeface="Latha"/>
+        <a:font script="Syrc" typeface="Estrangelo Edessa"/>
+        <a:font script="Orya" typeface="Kalinga"/>
+        <a:font script="Mlym" typeface="Kartika"/>
+        <a:font script="Laoo" typeface="DokChampa"/>
+        <a:font script="Sinh" typeface="Iskoola Pota"/>
+        <a:font script="Mong" typeface="Mongolian Baiti"/>
+        <a:font script="Viet" typeface="Times New Roman"/>
+        <a:font script="Uigh" typeface="Microsoft Uighur"/>
+        <a:font script="Geor" typeface="Sylfaen"/>
+      </a:majorFont>
+      <a:minorFont>
+        <a:latin typeface="Calibri" panose="020F0502020204030204"/>
+        <a:ea typeface=""/>
+        <a:cs typeface=""/>
+        <a:font script="Jpan" typeface="游ゴシック"/>
+        <a:font script="Hang" typeface="맑은 고딕"/>
+        <a:font script="Hans" typeface="等线"/>
+        <a:font script="Hant" typeface="新細明體"/>
+        <a:font script="Arab" typeface="Arial"/>
+        <a:font script="Hebr" typeface="Arial"/>
+        <a:font script="Thai" typeface="Cordia New"/>
+        <a:font script="Ethi" typeface="Nyala"/>
+        <a:font script="Beng" typeface="Vrinda"/>
+        <a:font script="Gujr" typeface="Shruti"/>
+        <a:font script="Khmr" typeface="DaunPenh"/>
+        <a:font script="Knda" typeface="Tunga"/>
+        <a:font script="Guru" typeface="Raavi"/>
+        <a:font script="Cans" typeface="Euphemia"/>
+        <a:font script="Cher" typeface="Plantagenet Cherokee"/>
+        <a:font script="Yiii" typeface="Microsoft Yi Baiti"/>
+        <a:font script="Tibt" typeface="Microsoft Himalaya"/>
+        <a:font script="Thaa" typeface="MV Boli"/>
+        <a:font script="Deva" typeface="Mangal"/>
+        <a:font script="Telu" typeface="Gautami"/>
+        <a:font script="Taml" typeface="Latha"/>
+        <a:font script="Syrc" typeface="Estrangelo Edessa"/>
+        <a:font script="Orya" typeface="Kalinga"/>
+        <a:font script="Mlym" typeface="Kartika"/>
+        <a:font script="Laoo" typeface="DokChampa"/>
+        <a:font script="Sinh" typeface="Iskoola Pota"/>
+        <a:font script="Mong" typeface="Mongolian Baiti"/>
+        <a:font script="Viet" typeface="Arial"/>
+        <a:font script="Uigh" typeface="Microsoft Uighur"/>
+        <a:font script="Geor" typeface="Sylfaen"/>
+      </a:minorFont>
+    </a:fontScheme>
+    <a:fmtScheme name="Office">
+      <a:fillStyleLst>
+        <a:solidFill>
+          <a:schemeClr val="phClr"/>
+        </a:solidFill>
+        <a:gradFill rotWithShape="1">
+          <a:gsLst>
+            <a:gs pos="0">
+              <a:schemeClr val="phClr">
+                <a:lumMod val="110000"/>
+                <a:satMod val="105000"/>
+                <a:tint val="67000"/>
+              </a:schemeClr>
+            </a:gs>
+            <a:gs pos="50000">
+              <a:schemeClr val="phClr">
+                <a:lumMod val="105000"/>
+                <a:satMod val="103000"/>
+                <a:tint val="73000"/>
+              </a:schemeClr>
+            </a:gs>
+            <a:gs pos="100000">
+              <a:schemeClr val="phClr">
+                <a:lumMod val="105000"/>
+                <a:satMod val="109000"/>
+                <a:tint val="81000"/>
+              </a:schemeClr>
+            </a:gs>
+          </a:gsLst>
+          <a:lin ang="5400000" scaled="0"/>
+        </a:gradFill>
+        <a:gradFill rotWithShape="1">
+          <a:gsLst>
+            <a:gs pos="0">
+              <a:schemeClr val="phClr">
+                <a:satMod val="103000"/>
+                <a:lumMod val="102000"/>
+                <a:tint val="94000"/>
+              </a:schemeClr>
+            </a:gs>
+            <a:gs pos="50000">
+              <a:schemeClr val="phClr">
+                <a:satMod val="110000"/>
+                <a:lumMod val="100000"/>
+                <a:shade val="100000"/>
+              </a:schemeClr>
+            </a:gs>
+            <a:gs pos="100000">
+              <a:schemeClr val="phClr">
+                <a:lumMod val="99000"/>
+                <a:satMod val="120000"/>
+                <a:shade val="78000"/>
+              </a:schemeClr>
+            </a:gs>
+          </a:gsLst>
+          <a:lin ang="5400000" scaled="0"/>
+        </a:gradFill>
+      </a:fillStyleLst>
+      <a:lnStyleLst>
+        <a:ln w="6350" cap="flat" cmpd="sng" algn="ctr">
+          <a:solidFill>
+            <a:schemeClr val="phClr"/>
+          </a:solidFill>
+          <a:prstDash val="solid"/>
+          <a:miter lim="800000"/>
+        </a:ln>
+        <a:ln w="12700" cap="flat" cmpd="sng" algn="ctr">
+          <a:solidFill>
+            <a:schemeClr val="phClr"/>
+          </a:solidFill>
+          <a:prstDash val="solid"/>
+          <a:miter lim="800000"/>
+        </a:ln>
+        <a:ln w="19050" cap="flat" cmpd="sng" algn="ctr">
+          <a:solidFill>
+            <a:schemeClr val="phClr"/>
+          </a:solidFill>
+          <a:prstDash val="solid"/>
+          <a:miter lim="800000"/>
+        </a:ln>
+      </a:lnStyleLst>
+      <a:effectStyleLst>
+        <a:effectStyle>
+          <a:effectLst/>
+        </a:effectStyle>
+        <a:effectStyle>
+          <a:effectLst/>
+        </a:effectStyle>
+        <a:effectStyle>
+          <a:effectLst>
+            <a:outerShdw blurRad="57150" dist="19050" dir="5400000" algn="ctr" rotWithShape="0">
+              <a:srgbClr val="000000">
+                <a:alpha val="63000"/>
+              </a:srgbClr>
+            </a:outerShdw>
+          </a:effectLst>
+        </a:effectStyle>
+      </a:effectStyleLst>
+      <a:bgFillStyleLst>
+        <a:solidFill>
+          <a:schemeClr val="phClr"/>
+        </a:solidFill>
+        <a:solidFill>
+          <a:schemeClr val="phClr">
+            <a:tint val="95000"/>
+            <a:satMod val="170000"/>
+          </a:schemeClr>
+        </a:solidFill>
+        <a:gradFill rotWithShape="1">
+          <a:gsLst>
+            <a:gs pos="0">
+              <a:schemeClr val="phClr">
+                <a:tint val="93000"/>
+                <a:satMod val="150000"/>
+                <a:shade val="98000"/>
+                <a:lumMod val="102000"/>
+              </a:schemeClr>
+            </a:gs>
+            <a:gs pos="50000">
+              <a:schemeClr val="phClr">
+                <a:tint val="98000"/>
+                <a:satMod val="130000"/>
+                <a:shade val="90000"/>
+                <a:lumMod val="103000"/>
+              </a:schemeClr>
+            </a:gs>
+            <a:gs pos="100000">
+              <a:schemeClr val="phClr">
+                <a:shade val="63000"/>
+                <a:satMod val="120000"/>
+              </a:schemeClr>
+            </a:gs>
+          </a:gsLst>
+          <a:lin ang="5400000" scaled="0"/>
+        </a:gradFill>
+      </a:bgFillStyleLst>
+    </a:fmtScheme>
+  </a:themeElements>
+  <a:objectDefaults/>
+  <a:extraClrSchemeLst/>
+  <a:extLst>
+    <a:ext uri="{05A4C25C-085E-4340-85A3-A5531E510DB2}">
+      <thm15:themeFamily xmlns:thm15="http://schemas.microsoft.com/office/thememl/2012/main" name="Office Theme" id="{62F939B6-93AF-4DB8-9C6B-D6C7DFDC589F}" vid="{4A3C46E8-61CC-4603-A589-7422A47A8E4A}"/>
+    </a:ext>
+  </a:extLst>
+</a:theme>
 </file>
</xml_diff>

<commit_message>
New graphs, text corrections
</commit_message>
<xml_diff>
--- a/gfx/Thesis figures.pptx
+++ b/gfx/Thesis figures.pptx
@@ -5,7 +5,7 @@
     <p:sldMasterId id="2147483648" r:id="rId1"/>
   </p:sldMasterIdLst>
   <p:notesMasterIdLst>
-    <p:notesMasterId r:id="rId8"/>
+    <p:notesMasterId r:id="rId10"/>
   </p:notesMasterIdLst>
   <p:sldIdLst>
     <p:sldId id="256" r:id="rId2"/>
@@ -14,6 +14,8 @@
     <p:sldId id="266" r:id="rId5"/>
     <p:sldId id="261" r:id="rId6"/>
     <p:sldId id="262" r:id="rId7"/>
+    <p:sldId id="267" r:id="rId8"/>
+    <p:sldId id="269" r:id="rId9"/>
   </p:sldIdLst>
   <p:sldSz cx="12192000" cy="6858000"/>
   <p:notesSz cx="7315200" cy="12344400"/>
@@ -145,6 +147,16 @@
             <p14:sldId id="262"/>
           </p14:sldIdLst>
         </p14:section>
+        <p14:section name="Activity sequence" id="{BD3B5E26-76BC-44B7-BFCF-F18535FF25FB}">
+          <p14:sldIdLst>
+            <p14:sldId id="267"/>
+          </p14:sldIdLst>
+        </p14:section>
+        <p14:section name="Shibata architecture" id="{CA9453C0-85D9-4490-B067-DBECC5368AF4}">
+          <p14:sldIdLst>
+            <p14:sldId id="269"/>
+          </p14:sldIdLst>
+        </p14:section>
       </p14:sectionLst>
     </p:ext>
     <p:ext uri="{EFAFB233-063F-42B5-8137-9DF3F51BA10A}">
@@ -188,18 +200,18 @@
         </p:nvSpPr>
         <p:spPr>
           <a:xfrm>
-            <a:off x="2" y="2"/>
-            <a:ext cx="3170239" cy="618445"/>
+            <a:off x="4" y="2"/>
+            <a:ext cx="3170238" cy="618445"/>
           </a:xfrm>
           <a:prstGeom prst="rect">
             <a:avLst/>
           </a:prstGeom>
         </p:spPr>
         <p:txBody>
-          <a:bodyPr vert="horz" lIns="123434" tIns="61716" rIns="123434" bIns="61716" rtlCol="0"/>
+          <a:bodyPr vert="horz" lIns="123420" tIns="61708" rIns="123420" bIns="61708" rtlCol="0"/>
           <a:lstStyle>
             <a:lvl1pPr algn="l">
-              <a:defRPr sz="1600"/>
+              <a:defRPr sz="1700"/>
             </a:lvl1pPr>
           </a:lstStyle>
           <a:p>
@@ -219,24 +231,24 @@
         </p:nvSpPr>
         <p:spPr>
           <a:xfrm>
-            <a:off x="4143375" y="2"/>
-            <a:ext cx="3170239" cy="618445"/>
+            <a:off x="4143377" y="2"/>
+            <a:ext cx="3170238" cy="618445"/>
           </a:xfrm>
           <a:prstGeom prst="rect">
             <a:avLst/>
           </a:prstGeom>
         </p:spPr>
         <p:txBody>
-          <a:bodyPr vert="horz" lIns="123434" tIns="61716" rIns="123434" bIns="61716" rtlCol="0"/>
+          <a:bodyPr vert="horz" lIns="123420" tIns="61708" rIns="123420" bIns="61708" rtlCol="0"/>
           <a:lstStyle>
             <a:lvl1pPr algn="r">
-              <a:defRPr sz="1600"/>
+              <a:defRPr sz="1700"/>
             </a:lvl1pPr>
           </a:lstStyle>
           <a:p>
             <a:fld id="{0F0D45A1-12FA-4DDB-9899-05481FB1D8F3}" type="datetimeFigureOut">
               <a:rPr lang="en-US" smtClean="0"/>
-              <a:t>1/16/2019</a:t>
+              <a:t>1/17/2019</a:t>
             </a:fld>
             <a:endParaRPr lang="en-US"/>
           </a:p>
@@ -254,8 +266,8 @@
         </p:nvSpPr>
         <p:spPr>
           <a:xfrm>
-            <a:off x="-49213" y="1539875"/>
-            <a:ext cx="7413626" cy="4170363"/>
+            <a:off x="-50800" y="1539875"/>
+            <a:ext cx="7416800" cy="4171950"/>
           </a:xfrm>
           <a:prstGeom prst="rect">
             <a:avLst/>
@@ -268,7 +280,7 @@
           </a:ln>
         </p:spPr>
         <p:txBody>
-          <a:bodyPr vert="horz" lIns="123434" tIns="61716" rIns="123434" bIns="61716" rtlCol="0" anchor="ctr"/>
+          <a:bodyPr vert="horz" lIns="123420" tIns="61708" rIns="123420" bIns="61708" rtlCol="0" anchor="ctr"/>
           <a:lstStyle/>
           <a:p>
             <a:endParaRPr lang="en-US"/>
@@ -287,7 +299,7 @@
         </p:nvSpPr>
         <p:spPr>
           <a:xfrm>
-            <a:off x="731845" y="5941563"/>
+            <a:off x="731845" y="5941564"/>
             <a:ext cx="5851526" cy="4859791"/>
           </a:xfrm>
           <a:prstGeom prst="rect">
@@ -295,7 +307,7 @@
           </a:prstGeom>
         </p:spPr>
         <p:txBody>
-          <a:bodyPr vert="horz" lIns="123434" tIns="61716" rIns="123434" bIns="61716" rtlCol="0"/>
+          <a:bodyPr vert="horz" lIns="123420" tIns="61708" rIns="123420" bIns="61708" rtlCol="0"/>
           <a:lstStyle/>
           <a:p>
             <a:pPr lvl="0"/>
@@ -347,18 +359,18 @@
         </p:nvSpPr>
         <p:spPr>
           <a:xfrm>
-            <a:off x="2" y="11725957"/>
-            <a:ext cx="3170239" cy="618445"/>
+            <a:off x="4" y="11725958"/>
+            <a:ext cx="3170238" cy="618445"/>
           </a:xfrm>
           <a:prstGeom prst="rect">
             <a:avLst/>
           </a:prstGeom>
         </p:spPr>
         <p:txBody>
-          <a:bodyPr vert="horz" lIns="123434" tIns="61716" rIns="123434" bIns="61716" rtlCol="0" anchor="b"/>
+          <a:bodyPr vert="horz" lIns="123420" tIns="61708" rIns="123420" bIns="61708" rtlCol="0" anchor="b"/>
           <a:lstStyle>
             <a:lvl1pPr algn="l">
-              <a:defRPr sz="1600"/>
+              <a:defRPr sz="1700"/>
             </a:lvl1pPr>
           </a:lstStyle>
           <a:p>
@@ -378,18 +390,18 @@
         </p:nvSpPr>
         <p:spPr>
           <a:xfrm>
-            <a:off x="4143375" y="11725957"/>
-            <a:ext cx="3170239" cy="618445"/>
+            <a:off x="4143377" y="11725958"/>
+            <a:ext cx="3170238" cy="618445"/>
           </a:xfrm>
           <a:prstGeom prst="rect">
             <a:avLst/>
           </a:prstGeom>
         </p:spPr>
         <p:txBody>
-          <a:bodyPr vert="horz" lIns="123434" tIns="61716" rIns="123434" bIns="61716" rtlCol="0" anchor="b"/>
+          <a:bodyPr vert="horz" lIns="123420" tIns="61708" rIns="123420" bIns="61708" rtlCol="0" anchor="b"/>
           <a:lstStyle>
             <a:lvl1pPr algn="r">
-              <a:defRPr sz="1600"/>
+              <a:defRPr sz="1700"/>
             </a:lvl1pPr>
           </a:lstStyle>
           <a:p>
@@ -635,7 +647,7 @@
           <a:p>
             <a:fld id="{3971B8E7-E4D3-4F8A-8C05-81E1A0A9E2AB}" type="datetimeFigureOut">
               <a:rPr lang="en-US" smtClean="0"/>
-              <a:t>1/16/2019</a:t>
+              <a:t>1/17/2019</a:t>
             </a:fld>
             <a:endParaRPr lang="en-US"/>
           </a:p>
@@ -805,7 +817,7 @@
           <a:p>
             <a:fld id="{3971B8E7-E4D3-4F8A-8C05-81E1A0A9E2AB}" type="datetimeFigureOut">
               <a:rPr lang="en-US" smtClean="0"/>
-              <a:t>1/16/2019</a:t>
+              <a:t>1/17/2019</a:t>
             </a:fld>
             <a:endParaRPr lang="en-US"/>
           </a:p>
@@ -985,7 +997,7 @@
           <a:p>
             <a:fld id="{3971B8E7-E4D3-4F8A-8C05-81E1A0A9E2AB}" type="datetimeFigureOut">
               <a:rPr lang="en-US" smtClean="0"/>
-              <a:t>1/16/2019</a:t>
+              <a:t>1/17/2019</a:t>
             </a:fld>
             <a:endParaRPr lang="en-US"/>
           </a:p>
@@ -1155,7 +1167,7 @@
           <a:p>
             <a:fld id="{3971B8E7-E4D3-4F8A-8C05-81E1A0A9E2AB}" type="datetimeFigureOut">
               <a:rPr lang="en-US" smtClean="0"/>
-              <a:t>1/16/2019</a:t>
+              <a:t>1/17/2019</a:t>
             </a:fld>
             <a:endParaRPr lang="en-US"/>
           </a:p>
@@ -1401,7 +1413,7 @@
           <a:p>
             <a:fld id="{3971B8E7-E4D3-4F8A-8C05-81E1A0A9E2AB}" type="datetimeFigureOut">
               <a:rPr lang="en-US" smtClean="0"/>
-              <a:t>1/16/2019</a:t>
+              <a:t>1/17/2019</a:t>
             </a:fld>
             <a:endParaRPr lang="en-US"/>
           </a:p>
@@ -1633,7 +1645,7 @@
           <a:p>
             <a:fld id="{3971B8E7-E4D3-4F8A-8C05-81E1A0A9E2AB}" type="datetimeFigureOut">
               <a:rPr lang="en-US" smtClean="0"/>
-              <a:t>1/16/2019</a:t>
+              <a:t>1/17/2019</a:t>
             </a:fld>
             <a:endParaRPr lang="en-US"/>
           </a:p>
@@ -2000,7 +2012,7 @@
           <a:p>
             <a:fld id="{3971B8E7-E4D3-4F8A-8C05-81E1A0A9E2AB}" type="datetimeFigureOut">
               <a:rPr lang="en-US" smtClean="0"/>
-              <a:t>1/16/2019</a:t>
+              <a:t>1/17/2019</a:t>
             </a:fld>
             <a:endParaRPr lang="en-US"/>
           </a:p>
@@ -2118,7 +2130,7 @@
           <a:p>
             <a:fld id="{3971B8E7-E4D3-4F8A-8C05-81E1A0A9E2AB}" type="datetimeFigureOut">
               <a:rPr lang="en-US" smtClean="0"/>
-              <a:t>1/16/2019</a:t>
+              <a:t>1/17/2019</a:t>
             </a:fld>
             <a:endParaRPr lang="en-US"/>
           </a:p>
@@ -2213,7 +2225,7 @@
           <a:p>
             <a:fld id="{3971B8E7-E4D3-4F8A-8C05-81E1A0A9E2AB}" type="datetimeFigureOut">
               <a:rPr lang="en-US" smtClean="0"/>
-              <a:t>1/16/2019</a:t>
+              <a:t>1/17/2019</a:t>
             </a:fld>
             <a:endParaRPr lang="en-US"/>
           </a:p>
@@ -2490,7 +2502,7 @@
           <a:p>
             <a:fld id="{3971B8E7-E4D3-4F8A-8C05-81E1A0A9E2AB}" type="datetimeFigureOut">
               <a:rPr lang="en-US" smtClean="0"/>
-              <a:t>1/16/2019</a:t>
+              <a:t>1/17/2019</a:t>
             </a:fld>
             <a:endParaRPr lang="en-US"/>
           </a:p>
@@ -2743,7 +2755,7 @@
           <a:p>
             <a:fld id="{3971B8E7-E4D3-4F8A-8C05-81E1A0A9E2AB}" type="datetimeFigureOut">
               <a:rPr lang="en-US" smtClean="0"/>
-              <a:t>1/16/2019</a:t>
+              <a:t>1/17/2019</a:t>
             </a:fld>
             <a:endParaRPr lang="en-US"/>
           </a:p>
@@ -2956,7 +2968,7 @@
           <a:p>
             <a:fld id="{3971B8E7-E4D3-4F8A-8C05-81E1A0A9E2AB}" type="datetimeFigureOut">
               <a:rPr lang="en-US" smtClean="0"/>
-              <a:t>1/16/2019</a:t>
+              <a:t>1/17/2019</a:t>
             </a:fld>
             <a:endParaRPr lang="en-US"/>
           </a:p>
@@ -3674,17 +3686,27 @@
                   </a:schemeClr>
                 </a:solidFill>
               </a:rPr>
-              <a:t>Output Layer (</a:t>
-            </a:r>
-            <a:r>
-              <a:rPr lang="en-US" sz="4400" dirty="0" err="1" smtClean="0">
-                <a:solidFill>
-                  <a:schemeClr val="accent6">
-                    <a:lumMod val="10000"/>
-                  </a:schemeClr>
-                </a:solidFill>
-              </a:rPr>
-              <a:t>softmax</a:t>
+              <a:t>Output Layer </a:t>
+            </a:r>
+            <a:r>
+              <a:rPr lang="en-US" sz="4400" dirty="0" smtClean="0">
+                <a:solidFill>
+                  <a:schemeClr val="accent6">
+                    <a:lumMod val="10000"/>
+                  </a:schemeClr>
+                </a:solidFill>
+              </a:rPr>
+              <a:t>(</a:t>
+            </a:r>
+            <a:r>
+              <a:rPr lang="en-US" sz="4400" i="1" dirty="0" err="1" smtClean="0">
+                <a:solidFill>
+                  <a:schemeClr val="accent6">
+                    <a:lumMod val="10000"/>
+                  </a:schemeClr>
+                </a:solidFill>
+              </a:rPr>
+              <a:t>Softmax</a:t>
             </a:r>
             <a:r>
               <a:rPr lang="en-US" sz="4400" dirty="0" smtClean="0">
@@ -4726,8 +4748,45 @@
                   </a:schemeClr>
                 </a:solidFill>
               </a:rPr>
-              <a:t>Output Layer</a:t>
-            </a:r>
+              <a:t>Output </a:t>
+            </a:r>
+            <a:r>
+              <a:rPr lang="en-US" sz="4400" dirty="0" smtClean="0">
+                <a:solidFill>
+                  <a:schemeClr val="accent6">
+                    <a:lumMod val="10000"/>
+                  </a:schemeClr>
+                </a:solidFill>
+              </a:rPr>
+              <a:t>Layer (</a:t>
+            </a:r>
+            <a:r>
+              <a:rPr lang="en-US" sz="4400" i="1" dirty="0" err="1" smtClean="0">
+                <a:solidFill>
+                  <a:schemeClr val="accent6">
+                    <a:lumMod val="10000"/>
+                  </a:schemeClr>
+                </a:solidFill>
+              </a:rPr>
+              <a:t>Softmax</a:t>
+            </a:r>
+            <a:r>
+              <a:rPr lang="en-US" sz="4400" dirty="0" smtClean="0">
+                <a:solidFill>
+                  <a:schemeClr val="accent6">
+                    <a:lumMod val="10000"/>
+                  </a:schemeClr>
+                </a:solidFill>
+              </a:rPr>
+              <a:t>)</a:t>
+            </a:r>
+            <a:endParaRPr lang="en-US" sz="4400" dirty="0" smtClean="0">
+              <a:solidFill>
+                <a:schemeClr val="accent6">
+                  <a:lumMod val="10000"/>
+                </a:schemeClr>
+              </a:solidFill>
+            </a:endParaRPr>
           </a:p>
           <a:p>
             <a:pPr algn="ctr"/>
@@ -9364,6 +9423,1432 @@
   <p:clrMapOvr>
     <a:masterClrMapping/>
   </p:clrMapOvr>
+</p:sld>
+</file>
+
+<file path=ppt/slides/slide7.xml><?xml version="1.0" encoding="utf-8"?>
+<p:sld xmlns:a="http://schemas.openxmlformats.org/drawingml/2006/main" xmlns:r="http://schemas.openxmlformats.org/officeDocument/2006/relationships" xmlns:p="http://schemas.openxmlformats.org/presentationml/2006/main">
+  <p:cSld>
+    <p:spTree>
+      <p:nvGrpSpPr>
+        <p:cNvPr id="1" name=""/>
+        <p:cNvGrpSpPr/>
+        <p:nvPr/>
+      </p:nvGrpSpPr>
+      <p:grpSpPr>
+        <a:xfrm>
+          <a:off x="0" y="0"/>
+          <a:ext cx="0" cy="0"/>
+          <a:chOff x="0" y="0"/>
+          <a:chExt cx="0" cy="0"/>
+        </a:xfrm>
+      </p:grpSpPr>
+      <p:sp>
+        <p:nvSpPr>
+          <p:cNvPr id="2" name="Rounded Rectangle 1"/>
+          <p:cNvSpPr/>
+          <p:nvPr/>
+        </p:nvSpPr>
+        <p:spPr>
+          <a:xfrm>
+            <a:off x="38100" y="2483003"/>
+            <a:ext cx="3657600" cy="2129883"/>
+          </a:xfrm>
+          <a:prstGeom prst="roundRect">
+            <a:avLst/>
+          </a:prstGeom>
+          <a:noFill/>
+          <a:ln w="38100">
+            <a:solidFill>
+              <a:schemeClr val="tx1"/>
+            </a:solidFill>
+          </a:ln>
+        </p:spPr>
+        <p:style>
+          <a:lnRef idx="2">
+            <a:schemeClr val="accent1">
+              <a:shade val="50000"/>
+            </a:schemeClr>
+          </a:lnRef>
+          <a:fillRef idx="1">
+            <a:schemeClr val="accent1"/>
+          </a:fillRef>
+          <a:effectRef idx="0">
+            <a:schemeClr val="accent1"/>
+          </a:effectRef>
+          <a:fontRef idx="minor">
+            <a:schemeClr val="lt1"/>
+          </a:fontRef>
+        </p:style>
+        <p:txBody>
+          <a:bodyPr rtlCol="0" anchor="ctr"/>
+          <a:lstStyle/>
+          <a:p>
+            <a:pPr algn="ctr"/>
+            <a:r>
+              <a:rPr lang="en-US" sz="4400" dirty="0" smtClean="0">
+                <a:solidFill>
+                  <a:schemeClr val="tx1"/>
+                </a:solidFill>
+              </a:rPr>
+              <a:t>Write thesis</a:t>
+            </a:r>
+            <a:endParaRPr lang="en-US" sz="4400" dirty="0">
+              <a:solidFill>
+                <a:schemeClr val="tx1"/>
+              </a:solidFill>
+            </a:endParaRPr>
+          </a:p>
+        </p:txBody>
+      </p:sp>
+      <p:sp>
+        <p:nvSpPr>
+          <p:cNvPr id="3" name="Rounded Rectangle 2"/>
+          <p:cNvSpPr/>
+          <p:nvPr/>
+        </p:nvSpPr>
+        <p:spPr>
+          <a:xfrm>
+            <a:off x="4267200" y="2483004"/>
+            <a:ext cx="3657600" cy="2129883"/>
+          </a:xfrm>
+          <a:prstGeom prst="roundRect">
+            <a:avLst/>
+          </a:prstGeom>
+          <a:noFill/>
+          <a:ln w="38100">
+            <a:solidFill>
+              <a:schemeClr val="tx1"/>
+            </a:solidFill>
+          </a:ln>
+        </p:spPr>
+        <p:style>
+          <a:lnRef idx="2">
+            <a:schemeClr val="accent1">
+              <a:shade val="50000"/>
+            </a:schemeClr>
+          </a:lnRef>
+          <a:fillRef idx="1">
+            <a:schemeClr val="accent1"/>
+          </a:fillRef>
+          <a:effectRef idx="0">
+            <a:schemeClr val="accent1"/>
+          </a:effectRef>
+          <a:fontRef idx="minor">
+            <a:schemeClr val="lt1"/>
+          </a:fontRef>
+        </p:style>
+        <p:txBody>
+          <a:bodyPr rtlCol="0" anchor="ctr"/>
+          <a:lstStyle/>
+          <a:p>
+            <a:pPr algn="ctr"/>
+            <a:r>
+              <a:rPr lang="en-US" sz="4400" dirty="0" smtClean="0">
+                <a:solidFill>
+                  <a:schemeClr val="tx1"/>
+                </a:solidFill>
+              </a:rPr>
+              <a:t>Submit thesis</a:t>
+            </a:r>
+            <a:endParaRPr lang="en-US" sz="4400" dirty="0">
+              <a:solidFill>
+                <a:schemeClr val="tx1"/>
+              </a:solidFill>
+            </a:endParaRPr>
+          </a:p>
+        </p:txBody>
+      </p:sp>
+      <p:sp>
+        <p:nvSpPr>
+          <p:cNvPr id="4" name="Rounded Rectangle 3"/>
+          <p:cNvSpPr/>
+          <p:nvPr/>
+        </p:nvSpPr>
+        <p:spPr>
+          <a:xfrm>
+            <a:off x="8496300" y="2483003"/>
+            <a:ext cx="3657600" cy="2129883"/>
+          </a:xfrm>
+          <a:prstGeom prst="roundRect">
+            <a:avLst/>
+          </a:prstGeom>
+          <a:noFill/>
+          <a:ln w="38100">
+            <a:solidFill>
+              <a:schemeClr val="tx1"/>
+            </a:solidFill>
+          </a:ln>
+        </p:spPr>
+        <p:style>
+          <a:lnRef idx="2">
+            <a:schemeClr val="accent1">
+              <a:shade val="50000"/>
+            </a:schemeClr>
+          </a:lnRef>
+          <a:fillRef idx="1">
+            <a:schemeClr val="accent1"/>
+          </a:fillRef>
+          <a:effectRef idx="0">
+            <a:schemeClr val="accent1"/>
+          </a:effectRef>
+          <a:fontRef idx="minor">
+            <a:schemeClr val="lt1"/>
+          </a:fontRef>
+        </p:style>
+        <p:txBody>
+          <a:bodyPr rtlCol="0" anchor="ctr"/>
+          <a:lstStyle/>
+          <a:p>
+            <a:pPr algn="ctr"/>
+            <a:r>
+              <a:rPr lang="en-US" sz="4400" dirty="0" smtClean="0">
+                <a:solidFill>
+                  <a:schemeClr val="tx1"/>
+                </a:solidFill>
+              </a:rPr>
+              <a:t>Defend thesis</a:t>
+            </a:r>
+            <a:endParaRPr lang="en-US" sz="4400" dirty="0">
+              <a:solidFill>
+                <a:schemeClr val="tx1"/>
+              </a:solidFill>
+            </a:endParaRPr>
+          </a:p>
+        </p:txBody>
+      </p:sp>
+      <p:cxnSp>
+        <p:nvCxnSpPr>
+          <p:cNvPr id="6" name="Straight Arrow Connector 5"/>
+          <p:cNvCxnSpPr>
+            <a:stCxn id="2" idx="3"/>
+            <a:endCxn id="3" idx="1"/>
+          </p:cNvCxnSpPr>
+          <p:nvPr/>
+        </p:nvCxnSpPr>
+        <p:spPr>
+          <a:xfrm>
+            <a:off x="3695700" y="3547945"/>
+            <a:ext cx="571500" cy="1"/>
+          </a:xfrm>
+          <a:prstGeom prst="straightConnector1">
+            <a:avLst/>
+          </a:prstGeom>
+          <a:ln w="57150">
+            <a:solidFill>
+              <a:schemeClr val="tx1"/>
+            </a:solidFill>
+            <a:tailEnd type="triangle"/>
+          </a:ln>
+        </p:spPr>
+        <p:style>
+          <a:lnRef idx="1">
+            <a:schemeClr val="accent1"/>
+          </a:lnRef>
+          <a:fillRef idx="0">
+            <a:schemeClr val="accent1"/>
+          </a:fillRef>
+          <a:effectRef idx="0">
+            <a:schemeClr val="accent1"/>
+          </a:effectRef>
+          <a:fontRef idx="minor">
+            <a:schemeClr val="tx1"/>
+          </a:fontRef>
+        </p:style>
+      </p:cxnSp>
+      <p:cxnSp>
+        <p:nvCxnSpPr>
+          <p:cNvPr id="7" name="Straight Arrow Connector 6"/>
+          <p:cNvCxnSpPr>
+            <a:stCxn id="3" idx="3"/>
+            <a:endCxn id="4" idx="1"/>
+          </p:cNvCxnSpPr>
+          <p:nvPr/>
+        </p:nvCxnSpPr>
+        <p:spPr>
+          <a:xfrm flipV="1">
+            <a:off x="7924800" y="3547945"/>
+            <a:ext cx="571500" cy="1"/>
+          </a:xfrm>
+          <a:prstGeom prst="straightConnector1">
+            <a:avLst/>
+          </a:prstGeom>
+          <a:ln w="57150">
+            <a:solidFill>
+              <a:schemeClr val="tx1"/>
+            </a:solidFill>
+            <a:tailEnd type="triangle"/>
+          </a:ln>
+        </p:spPr>
+        <p:style>
+          <a:lnRef idx="1">
+            <a:schemeClr val="accent1"/>
+          </a:lnRef>
+          <a:fillRef idx="0">
+            <a:schemeClr val="accent1"/>
+          </a:fillRef>
+          <a:effectRef idx="0">
+            <a:schemeClr val="accent1"/>
+          </a:effectRef>
+          <a:fontRef idx="minor">
+            <a:schemeClr val="tx1"/>
+          </a:fontRef>
+        </p:style>
+      </p:cxnSp>
+    </p:spTree>
+    <p:extLst>
+      <p:ext uri="{BB962C8B-B14F-4D97-AF65-F5344CB8AC3E}">
+        <p14:creationId xmlns:p14="http://schemas.microsoft.com/office/powerpoint/2010/main" val="404662391"/>
+      </p:ext>
+    </p:extLst>
+  </p:cSld>
+  <p:clrMapOvr>
+    <a:masterClrMapping/>
+  </p:clrMapOvr>
+</p:sld>
+</file>
+
+<file path=ppt/slides/slide8.xml><?xml version="1.0" encoding="utf-8"?>
+<p:sld xmlns:a="http://schemas.openxmlformats.org/drawingml/2006/main" xmlns:r="http://schemas.openxmlformats.org/officeDocument/2006/relationships" xmlns:p="http://schemas.openxmlformats.org/presentationml/2006/main">
+  <p:cSld>
+    <p:spTree>
+      <p:nvGrpSpPr>
+        <p:cNvPr id="1" name=""/>
+        <p:cNvGrpSpPr/>
+        <p:nvPr/>
+      </p:nvGrpSpPr>
+      <p:grpSpPr>
+        <a:xfrm>
+          <a:off x="0" y="0"/>
+          <a:ext cx="0" cy="0"/>
+          <a:chOff x="0" y="0"/>
+          <a:chExt cx="0" cy="0"/>
+        </a:xfrm>
+      </p:grpSpPr>
+      <p:sp>
+        <p:nvSpPr>
+          <p:cNvPr id="46" name="Rectangle 45"/>
+          <p:cNvSpPr/>
+          <p:nvPr/>
+        </p:nvSpPr>
+        <p:spPr>
+          <a:xfrm rot="16200000">
+            <a:off x="6829359" y="4663438"/>
+            <a:ext cx="3291840" cy="1097280"/>
+          </a:xfrm>
+          <a:prstGeom prst="rect">
+            <a:avLst/>
+          </a:prstGeom>
+          <a:noFill/>
+          <a:ln w="28575">
+            <a:solidFill>
+              <a:schemeClr val="accent6">
+                <a:lumMod val="10000"/>
+              </a:schemeClr>
+            </a:solidFill>
+          </a:ln>
+        </p:spPr>
+        <p:style>
+          <a:lnRef idx="2">
+            <a:schemeClr val="accent1">
+              <a:shade val="50000"/>
+            </a:schemeClr>
+          </a:lnRef>
+          <a:fillRef idx="1">
+            <a:schemeClr val="accent1"/>
+          </a:fillRef>
+          <a:effectRef idx="0">
+            <a:schemeClr val="accent1"/>
+          </a:effectRef>
+          <a:fontRef idx="minor">
+            <a:schemeClr val="lt1"/>
+          </a:fontRef>
+        </p:style>
+        <p:txBody>
+          <a:bodyPr rtlCol="0" anchor="ctr"/>
+          <a:lstStyle/>
+          <a:p>
+            <a:pPr algn="ctr"/>
+            <a:r>
+              <a:rPr lang="en-US" sz="3200" dirty="0" smtClean="0">
+                <a:solidFill>
+                  <a:schemeClr val="accent6">
+                    <a:lumMod val="10000"/>
+                  </a:schemeClr>
+                </a:solidFill>
+              </a:rPr>
+              <a:t>LSTM </a:t>
+            </a:r>
+            <a:r>
+              <a:rPr lang="en-US" sz="3200" dirty="0" smtClean="0">
+                <a:solidFill>
+                  <a:schemeClr val="accent6">
+                    <a:lumMod val="10000"/>
+                  </a:schemeClr>
+                </a:solidFill>
+              </a:rPr>
+              <a:t>Layer</a:t>
+            </a:r>
+            <a:endParaRPr lang="en-US" sz="3200" dirty="0" smtClean="0">
+              <a:solidFill>
+                <a:schemeClr val="accent6">
+                  <a:lumMod val="10000"/>
+                </a:schemeClr>
+              </a:solidFill>
+            </a:endParaRPr>
+          </a:p>
+        </p:txBody>
+      </p:sp>
+      <p:sp>
+        <p:nvSpPr>
+          <p:cNvPr id="47" name="Rectangle 46"/>
+          <p:cNvSpPr/>
+          <p:nvPr/>
+        </p:nvSpPr>
+        <p:spPr>
+          <a:xfrm rot="16200000">
+            <a:off x="3775929" y="4663440"/>
+            <a:ext cx="3291840" cy="1097280"/>
+          </a:xfrm>
+          <a:prstGeom prst="rect">
+            <a:avLst/>
+          </a:prstGeom>
+          <a:noFill/>
+          <a:ln w="28575">
+            <a:solidFill>
+              <a:schemeClr val="accent6">
+                <a:lumMod val="10000"/>
+              </a:schemeClr>
+            </a:solidFill>
+          </a:ln>
+        </p:spPr>
+        <p:style>
+          <a:lnRef idx="2">
+            <a:schemeClr val="accent1">
+              <a:shade val="50000"/>
+            </a:schemeClr>
+          </a:lnRef>
+          <a:fillRef idx="1">
+            <a:schemeClr val="accent1"/>
+          </a:fillRef>
+          <a:effectRef idx="0">
+            <a:schemeClr val="accent1"/>
+          </a:effectRef>
+          <a:fontRef idx="minor">
+            <a:schemeClr val="lt1"/>
+          </a:fontRef>
+        </p:style>
+        <p:txBody>
+          <a:bodyPr rtlCol="0" anchor="ctr"/>
+          <a:lstStyle/>
+          <a:p>
+            <a:pPr algn="ctr"/>
+            <a:r>
+              <a:rPr lang="en-US" sz="3200" dirty="0" smtClean="0">
+                <a:solidFill>
+                  <a:schemeClr val="accent6">
+                    <a:lumMod val="10000"/>
+                  </a:schemeClr>
+                </a:solidFill>
+              </a:rPr>
+              <a:t>LSTM </a:t>
+            </a:r>
+            <a:r>
+              <a:rPr lang="en-US" sz="3200" dirty="0" smtClean="0">
+                <a:solidFill>
+                  <a:schemeClr val="accent6">
+                    <a:lumMod val="10000"/>
+                  </a:schemeClr>
+                </a:solidFill>
+              </a:rPr>
+              <a:t>Layer</a:t>
+            </a:r>
+            <a:endParaRPr lang="en-US" sz="3200" dirty="0" smtClean="0">
+              <a:solidFill>
+                <a:schemeClr val="accent6">
+                  <a:lumMod val="10000"/>
+                </a:schemeClr>
+              </a:solidFill>
+            </a:endParaRPr>
+          </a:p>
+        </p:txBody>
+      </p:sp>
+      <p:sp>
+        <p:nvSpPr>
+          <p:cNvPr id="48" name="Rectangle 47"/>
+          <p:cNvSpPr/>
+          <p:nvPr/>
+        </p:nvSpPr>
+        <p:spPr>
+          <a:xfrm rot="16200000">
+            <a:off x="2249213" y="4663436"/>
+            <a:ext cx="3291840" cy="1097280"/>
+          </a:xfrm>
+          <a:prstGeom prst="rect">
+            <a:avLst/>
+          </a:prstGeom>
+          <a:noFill/>
+          <a:ln w="28575">
+            <a:solidFill>
+              <a:schemeClr val="accent6">
+                <a:lumMod val="10000"/>
+              </a:schemeClr>
+            </a:solidFill>
+          </a:ln>
+        </p:spPr>
+        <p:style>
+          <a:lnRef idx="2">
+            <a:schemeClr val="accent1">
+              <a:shade val="50000"/>
+            </a:schemeClr>
+          </a:lnRef>
+          <a:fillRef idx="1">
+            <a:schemeClr val="accent1"/>
+          </a:fillRef>
+          <a:effectRef idx="0">
+            <a:schemeClr val="accent1"/>
+          </a:effectRef>
+          <a:fontRef idx="minor">
+            <a:schemeClr val="lt1"/>
+          </a:fontRef>
+        </p:style>
+        <p:txBody>
+          <a:bodyPr rtlCol="0" anchor="ctr"/>
+          <a:lstStyle/>
+          <a:p>
+            <a:pPr algn="ctr"/>
+            <a:r>
+              <a:rPr lang="en-US" sz="3200" dirty="0" smtClean="0">
+                <a:solidFill>
+                  <a:schemeClr val="accent6">
+                    <a:lumMod val="10000"/>
+                  </a:schemeClr>
+                </a:solidFill>
+              </a:rPr>
+              <a:t>Dropout </a:t>
+            </a:r>
+            <a:r>
+              <a:rPr lang="en-US" sz="3200" dirty="0" smtClean="0">
+                <a:solidFill>
+                  <a:schemeClr val="accent6">
+                    <a:lumMod val="10000"/>
+                  </a:schemeClr>
+                </a:solidFill>
+              </a:rPr>
+              <a:t>50</a:t>
+            </a:r>
+            <a:r>
+              <a:rPr lang="en-US" sz="3200" dirty="0" smtClean="0">
+                <a:solidFill>
+                  <a:schemeClr val="accent6">
+                    <a:lumMod val="10000"/>
+                  </a:schemeClr>
+                </a:solidFill>
+              </a:rPr>
+              <a:t>%</a:t>
+            </a:r>
+          </a:p>
+        </p:txBody>
+      </p:sp>
+      <p:sp>
+        <p:nvSpPr>
+          <p:cNvPr id="49" name="Rectangle 48"/>
+          <p:cNvSpPr/>
+          <p:nvPr/>
+        </p:nvSpPr>
+        <p:spPr>
+          <a:xfrm rot="16200000">
+            <a:off x="9900043" y="4663435"/>
+            <a:ext cx="3291840" cy="1097280"/>
+          </a:xfrm>
+          <a:prstGeom prst="rect">
+            <a:avLst/>
+          </a:prstGeom>
+          <a:noFill/>
+          <a:ln w="28575">
+            <a:solidFill>
+              <a:schemeClr val="accent6">
+                <a:lumMod val="10000"/>
+              </a:schemeClr>
+            </a:solidFill>
+          </a:ln>
+        </p:spPr>
+        <p:style>
+          <a:lnRef idx="2">
+            <a:schemeClr val="accent1">
+              <a:shade val="50000"/>
+            </a:schemeClr>
+          </a:lnRef>
+          <a:fillRef idx="1">
+            <a:schemeClr val="accent1"/>
+          </a:fillRef>
+          <a:effectRef idx="0">
+            <a:schemeClr val="accent1"/>
+          </a:effectRef>
+          <a:fontRef idx="minor">
+            <a:schemeClr val="lt1"/>
+          </a:fontRef>
+        </p:style>
+        <p:txBody>
+          <a:bodyPr rtlCol="0" anchor="ctr"/>
+          <a:lstStyle/>
+          <a:p>
+            <a:pPr algn="ctr"/>
+            <a:r>
+              <a:rPr lang="en-US" sz="3200" dirty="0" smtClean="0">
+                <a:solidFill>
+                  <a:schemeClr val="accent6">
+                    <a:lumMod val="10000"/>
+                  </a:schemeClr>
+                </a:solidFill>
+              </a:rPr>
+              <a:t>Word </a:t>
+            </a:r>
+            <a:r>
+              <a:rPr lang="en-US" sz="3200" dirty="0" smtClean="0">
+                <a:solidFill>
+                  <a:schemeClr val="accent6">
+                    <a:lumMod val="10000"/>
+                  </a:schemeClr>
+                </a:solidFill>
+              </a:rPr>
+              <a:t>Input </a:t>
+            </a:r>
+            <a:r>
+              <a:rPr lang="en-US" sz="3200" dirty="0" smtClean="0">
+                <a:solidFill>
+                  <a:schemeClr val="accent6">
+                    <a:lumMod val="10000"/>
+                  </a:schemeClr>
+                </a:solidFill>
+              </a:rPr>
+              <a:t>Layer</a:t>
+            </a:r>
+            <a:endParaRPr lang="en-US" sz="3200" dirty="0" smtClean="0">
+              <a:solidFill>
+                <a:schemeClr val="accent6">
+                  <a:lumMod val="10000"/>
+                </a:schemeClr>
+              </a:solidFill>
+            </a:endParaRPr>
+          </a:p>
+        </p:txBody>
+      </p:sp>
+      <p:cxnSp>
+        <p:nvCxnSpPr>
+          <p:cNvPr id="50" name="Straight Arrow Connector 49"/>
+          <p:cNvCxnSpPr/>
+          <p:nvPr/>
+        </p:nvCxnSpPr>
+        <p:spPr>
+          <a:xfrm flipH="1">
+            <a:off x="10550634" y="5212075"/>
+            <a:ext cx="429435" cy="3"/>
+          </a:xfrm>
+          <a:prstGeom prst="straightConnector1">
+            <a:avLst/>
+          </a:prstGeom>
+          <a:ln w="57150">
+            <a:solidFill>
+              <a:schemeClr val="accent6">
+                <a:lumMod val="10000"/>
+              </a:schemeClr>
+            </a:solidFill>
+            <a:tailEnd type="triangle"/>
+          </a:ln>
+        </p:spPr>
+        <p:style>
+          <a:lnRef idx="1">
+            <a:schemeClr val="accent1"/>
+          </a:lnRef>
+          <a:fillRef idx="0">
+            <a:schemeClr val="accent1"/>
+          </a:fillRef>
+          <a:effectRef idx="0">
+            <a:schemeClr val="accent1"/>
+          </a:effectRef>
+          <a:fontRef idx="minor">
+            <a:schemeClr val="tx1"/>
+          </a:fontRef>
+        </p:style>
+      </p:cxnSp>
+      <p:cxnSp>
+        <p:nvCxnSpPr>
+          <p:cNvPr id="51" name="Straight Arrow Connector 50"/>
+          <p:cNvCxnSpPr>
+            <a:stCxn id="46" idx="0"/>
+            <a:endCxn id="53" idx="2"/>
+          </p:cNvCxnSpPr>
+          <p:nvPr/>
+        </p:nvCxnSpPr>
+        <p:spPr>
+          <a:xfrm flipH="1">
+            <a:off x="7497204" y="5212078"/>
+            <a:ext cx="429435" cy="0"/>
+          </a:xfrm>
+          <a:prstGeom prst="straightConnector1">
+            <a:avLst/>
+          </a:prstGeom>
+          <a:ln w="57150">
+            <a:solidFill>
+              <a:schemeClr val="accent6">
+                <a:lumMod val="10000"/>
+              </a:schemeClr>
+            </a:solidFill>
+            <a:tailEnd type="triangle"/>
+          </a:ln>
+        </p:spPr>
+        <p:style>
+          <a:lnRef idx="1">
+            <a:schemeClr val="accent1"/>
+          </a:lnRef>
+          <a:fillRef idx="0">
+            <a:schemeClr val="accent1"/>
+          </a:fillRef>
+          <a:effectRef idx="0">
+            <a:schemeClr val="accent1"/>
+          </a:effectRef>
+          <a:fontRef idx="minor">
+            <a:schemeClr val="tx1"/>
+          </a:fontRef>
+        </p:style>
+      </p:cxnSp>
+      <p:cxnSp>
+        <p:nvCxnSpPr>
+          <p:cNvPr id="52" name="Straight Arrow Connector 51"/>
+          <p:cNvCxnSpPr>
+            <a:stCxn id="53" idx="0"/>
+            <a:endCxn id="47" idx="2"/>
+          </p:cNvCxnSpPr>
+          <p:nvPr/>
+        </p:nvCxnSpPr>
+        <p:spPr>
+          <a:xfrm flipH="1">
+            <a:off x="5970489" y="5212078"/>
+            <a:ext cx="429435" cy="0"/>
+          </a:xfrm>
+          <a:prstGeom prst="straightConnector1">
+            <a:avLst/>
+          </a:prstGeom>
+          <a:ln w="57150">
+            <a:solidFill>
+              <a:schemeClr val="accent6">
+                <a:lumMod val="10000"/>
+              </a:schemeClr>
+            </a:solidFill>
+            <a:tailEnd type="triangle"/>
+          </a:ln>
+        </p:spPr>
+        <p:style>
+          <a:lnRef idx="1">
+            <a:schemeClr val="accent1"/>
+          </a:lnRef>
+          <a:fillRef idx="0">
+            <a:schemeClr val="accent1"/>
+          </a:fillRef>
+          <a:effectRef idx="0">
+            <a:schemeClr val="accent1"/>
+          </a:effectRef>
+          <a:fontRef idx="minor">
+            <a:schemeClr val="tx1"/>
+          </a:fontRef>
+        </p:style>
+      </p:cxnSp>
+      <p:sp>
+        <p:nvSpPr>
+          <p:cNvPr id="53" name="Rectangle 52"/>
+          <p:cNvSpPr/>
+          <p:nvPr/>
+        </p:nvSpPr>
+        <p:spPr>
+          <a:xfrm rot="16200000">
+            <a:off x="5302644" y="4663438"/>
+            <a:ext cx="3291840" cy="1097280"/>
+          </a:xfrm>
+          <a:prstGeom prst="rect">
+            <a:avLst/>
+          </a:prstGeom>
+          <a:noFill/>
+          <a:ln w="28575">
+            <a:solidFill>
+              <a:schemeClr val="accent6">
+                <a:lumMod val="10000"/>
+              </a:schemeClr>
+            </a:solidFill>
+          </a:ln>
+        </p:spPr>
+        <p:style>
+          <a:lnRef idx="2">
+            <a:schemeClr val="accent1">
+              <a:shade val="50000"/>
+            </a:schemeClr>
+          </a:lnRef>
+          <a:fillRef idx="1">
+            <a:schemeClr val="accent1"/>
+          </a:fillRef>
+          <a:effectRef idx="0">
+            <a:schemeClr val="accent1"/>
+          </a:effectRef>
+          <a:fontRef idx="minor">
+            <a:schemeClr val="lt1"/>
+          </a:fontRef>
+        </p:style>
+        <p:txBody>
+          <a:bodyPr rtlCol="0" anchor="ctr"/>
+          <a:lstStyle/>
+          <a:p>
+            <a:pPr algn="ctr"/>
+            <a:r>
+              <a:rPr lang="en-US" sz="3200" dirty="0" smtClean="0">
+                <a:solidFill>
+                  <a:schemeClr val="accent6">
+                    <a:lumMod val="10000"/>
+                  </a:schemeClr>
+                </a:solidFill>
+              </a:rPr>
+              <a:t>Dropout </a:t>
+            </a:r>
+            <a:r>
+              <a:rPr lang="en-US" sz="3200" dirty="0" smtClean="0">
+                <a:solidFill>
+                  <a:schemeClr val="accent6">
+                    <a:lumMod val="10000"/>
+                  </a:schemeClr>
+                </a:solidFill>
+              </a:rPr>
+              <a:t>50</a:t>
+            </a:r>
+            <a:r>
+              <a:rPr lang="en-US" sz="3200" dirty="0" smtClean="0">
+                <a:solidFill>
+                  <a:schemeClr val="accent6">
+                    <a:lumMod val="10000"/>
+                  </a:schemeClr>
+                </a:solidFill>
+              </a:rPr>
+              <a:t>%</a:t>
+            </a:r>
+          </a:p>
+        </p:txBody>
+      </p:sp>
+      <p:cxnSp>
+        <p:nvCxnSpPr>
+          <p:cNvPr id="54" name="Straight Arrow Connector 53"/>
+          <p:cNvCxnSpPr>
+            <a:stCxn id="47" idx="0"/>
+            <a:endCxn id="48" idx="2"/>
+          </p:cNvCxnSpPr>
+          <p:nvPr/>
+        </p:nvCxnSpPr>
+        <p:spPr>
+          <a:xfrm flipH="1" flipV="1">
+            <a:off x="4443773" y="5212076"/>
+            <a:ext cx="429436" cy="2"/>
+          </a:xfrm>
+          <a:prstGeom prst="straightConnector1">
+            <a:avLst/>
+          </a:prstGeom>
+          <a:ln w="57150">
+            <a:solidFill>
+              <a:schemeClr val="accent6">
+                <a:lumMod val="10000"/>
+              </a:schemeClr>
+            </a:solidFill>
+            <a:tailEnd type="triangle"/>
+          </a:ln>
+        </p:spPr>
+        <p:style>
+          <a:lnRef idx="1">
+            <a:schemeClr val="accent1"/>
+          </a:lnRef>
+          <a:fillRef idx="0">
+            <a:schemeClr val="accent1"/>
+          </a:fillRef>
+          <a:effectRef idx="0">
+            <a:schemeClr val="accent1"/>
+          </a:effectRef>
+          <a:fontRef idx="minor">
+            <a:schemeClr val="tx1"/>
+          </a:fontRef>
+        </p:style>
+      </p:cxnSp>
+      <p:sp>
+        <p:nvSpPr>
+          <p:cNvPr id="55" name="Rectangle 54"/>
+          <p:cNvSpPr/>
+          <p:nvPr/>
+        </p:nvSpPr>
+        <p:spPr>
+          <a:xfrm rot="16200000">
+            <a:off x="2687358" y="668060"/>
+            <a:ext cx="3000977" cy="1682707"/>
+          </a:xfrm>
+          <a:prstGeom prst="rect">
+            <a:avLst/>
+          </a:prstGeom>
+          <a:noFill/>
+          <a:ln w="28575">
+            <a:solidFill>
+              <a:schemeClr val="accent6">
+                <a:lumMod val="10000"/>
+              </a:schemeClr>
+            </a:solidFill>
+          </a:ln>
+        </p:spPr>
+        <p:style>
+          <a:lnRef idx="2">
+            <a:schemeClr val="accent1">
+              <a:shade val="50000"/>
+            </a:schemeClr>
+          </a:lnRef>
+          <a:fillRef idx="1">
+            <a:schemeClr val="accent1"/>
+          </a:fillRef>
+          <a:effectRef idx="0">
+            <a:schemeClr val="accent1"/>
+          </a:effectRef>
+          <a:fontRef idx="minor">
+            <a:schemeClr val="lt1"/>
+          </a:fontRef>
+        </p:style>
+        <p:txBody>
+          <a:bodyPr rtlCol="0" anchor="ctr"/>
+          <a:lstStyle/>
+          <a:p>
+            <a:pPr algn="ctr"/>
+            <a:r>
+              <a:rPr lang="en-US" sz="3200" dirty="0" smtClean="0">
+                <a:solidFill>
+                  <a:schemeClr val="accent6">
+                    <a:lumMod val="10000"/>
+                  </a:schemeClr>
+                </a:solidFill>
+              </a:rPr>
+              <a:t>Embedding Layer (</a:t>
+            </a:r>
+            <a:r>
+              <a:rPr lang="en-US" sz="3200" i="1" dirty="0" err="1" smtClean="0">
+                <a:solidFill>
+                  <a:schemeClr val="accent6">
+                    <a:lumMod val="10000"/>
+                  </a:schemeClr>
+                </a:solidFill>
+              </a:rPr>
+              <a:t>ReLU</a:t>
+            </a:r>
+            <a:r>
+              <a:rPr lang="en-US" sz="3200" dirty="0" smtClean="0">
+                <a:solidFill>
+                  <a:schemeClr val="accent6">
+                    <a:lumMod val="10000"/>
+                  </a:schemeClr>
+                </a:solidFill>
+              </a:rPr>
+              <a:t>)</a:t>
+            </a:r>
+            <a:endParaRPr lang="en-US" sz="3200" dirty="0" smtClean="0">
+              <a:solidFill>
+                <a:schemeClr val="accent6">
+                  <a:lumMod val="10000"/>
+                </a:schemeClr>
+              </a:solidFill>
+            </a:endParaRPr>
+          </a:p>
+        </p:txBody>
+      </p:sp>
+      <p:sp>
+        <p:nvSpPr>
+          <p:cNvPr id="56" name="Rectangle 55"/>
+          <p:cNvSpPr/>
+          <p:nvPr/>
+        </p:nvSpPr>
+        <p:spPr>
+          <a:xfrm rot="16200000">
+            <a:off x="539617" y="2865888"/>
+            <a:ext cx="3657600" cy="1097280"/>
+          </a:xfrm>
+          <a:prstGeom prst="rect">
+            <a:avLst/>
+          </a:prstGeom>
+          <a:noFill/>
+          <a:ln w="28575">
+            <a:solidFill>
+              <a:schemeClr val="accent6">
+                <a:lumMod val="10000"/>
+              </a:schemeClr>
+            </a:solidFill>
+          </a:ln>
+        </p:spPr>
+        <p:style>
+          <a:lnRef idx="2">
+            <a:schemeClr val="accent1">
+              <a:shade val="50000"/>
+            </a:schemeClr>
+          </a:lnRef>
+          <a:fillRef idx="1">
+            <a:schemeClr val="accent1"/>
+          </a:fillRef>
+          <a:effectRef idx="0">
+            <a:schemeClr val="accent1"/>
+          </a:effectRef>
+          <a:fontRef idx="minor">
+            <a:schemeClr val="lt1"/>
+          </a:fontRef>
+        </p:style>
+        <p:txBody>
+          <a:bodyPr rtlCol="0" anchor="ctr"/>
+          <a:lstStyle/>
+          <a:p>
+            <a:pPr algn="ctr"/>
+            <a:r>
+              <a:rPr lang="en-US" sz="3200" dirty="0" smtClean="0">
+                <a:solidFill>
+                  <a:schemeClr val="accent6">
+                    <a:lumMod val="10000"/>
+                  </a:schemeClr>
+                </a:solidFill>
+              </a:rPr>
+              <a:t>Dense Layer (</a:t>
+            </a:r>
+            <a:r>
+              <a:rPr lang="en-US" sz="3200" i="1" dirty="0" err="1" smtClean="0">
+                <a:solidFill>
+                  <a:schemeClr val="accent6">
+                    <a:lumMod val="10000"/>
+                  </a:schemeClr>
+                </a:solidFill>
+              </a:rPr>
+              <a:t>ReLU</a:t>
+            </a:r>
+            <a:r>
+              <a:rPr lang="en-US" sz="3200" dirty="0" smtClean="0">
+                <a:solidFill>
+                  <a:schemeClr val="accent6">
+                    <a:lumMod val="10000"/>
+                  </a:schemeClr>
+                </a:solidFill>
+              </a:rPr>
+              <a:t>)</a:t>
+            </a:r>
+            <a:endParaRPr lang="en-US" sz="3200" dirty="0" smtClean="0">
+              <a:solidFill>
+                <a:schemeClr val="accent6">
+                  <a:lumMod val="10000"/>
+                </a:schemeClr>
+              </a:solidFill>
+            </a:endParaRPr>
+          </a:p>
+        </p:txBody>
+      </p:sp>
+      <p:sp>
+        <p:nvSpPr>
+          <p:cNvPr id="57" name="Rectangle 56"/>
+          <p:cNvSpPr/>
+          <p:nvPr/>
+        </p:nvSpPr>
+        <p:spPr>
+          <a:xfrm rot="16200000">
+            <a:off x="-987100" y="2878588"/>
+            <a:ext cx="3657600" cy="1097280"/>
+          </a:xfrm>
+          <a:prstGeom prst="rect">
+            <a:avLst/>
+          </a:prstGeom>
+          <a:noFill/>
+          <a:ln w="28575">
+            <a:solidFill>
+              <a:schemeClr val="accent6">
+                <a:lumMod val="10000"/>
+              </a:schemeClr>
+            </a:solidFill>
+          </a:ln>
+        </p:spPr>
+        <p:style>
+          <a:lnRef idx="2">
+            <a:schemeClr val="accent1">
+              <a:shade val="50000"/>
+            </a:schemeClr>
+          </a:lnRef>
+          <a:fillRef idx="1">
+            <a:schemeClr val="accent1"/>
+          </a:fillRef>
+          <a:effectRef idx="0">
+            <a:schemeClr val="accent1"/>
+          </a:effectRef>
+          <a:fontRef idx="minor">
+            <a:schemeClr val="lt1"/>
+          </a:fontRef>
+        </p:style>
+        <p:txBody>
+          <a:bodyPr rtlCol="0" anchor="ctr"/>
+          <a:lstStyle/>
+          <a:p>
+            <a:pPr algn="ctr"/>
+            <a:r>
+              <a:rPr lang="en-US" sz="3200" dirty="0" smtClean="0">
+                <a:solidFill>
+                  <a:schemeClr val="accent6">
+                    <a:lumMod val="10000"/>
+                  </a:schemeClr>
+                </a:solidFill>
+              </a:rPr>
+              <a:t>Dense Layer (</a:t>
+            </a:r>
+            <a:r>
+              <a:rPr lang="en-US" sz="3200" i="1" dirty="0" err="1" smtClean="0">
+                <a:solidFill>
+                  <a:schemeClr val="accent6">
+                    <a:lumMod val="10000"/>
+                  </a:schemeClr>
+                </a:solidFill>
+              </a:rPr>
+              <a:t>Softmax</a:t>
+            </a:r>
+            <a:r>
+              <a:rPr lang="en-US" sz="3200" dirty="0" smtClean="0">
+                <a:solidFill>
+                  <a:schemeClr val="accent6">
+                    <a:lumMod val="10000"/>
+                  </a:schemeClr>
+                </a:solidFill>
+              </a:rPr>
+              <a:t>)</a:t>
+            </a:r>
+            <a:endParaRPr lang="en-US" sz="3200" dirty="0">
+              <a:solidFill>
+                <a:schemeClr val="accent6">
+                  <a:lumMod val="10000"/>
+                </a:schemeClr>
+              </a:solidFill>
+            </a:endParaRPr>
+          </a:p>
+        </p:txBody>
+      </p:sp>
+      <p:sp>
+        <p:nvSpPr>
+          <p:cNvPr id="58" name="Rectangle 57"/>
+          <p:cNvSpPr/>
+          <p:nvPr/>
+        </p:nvSpPr>
+        <p:spPr>
+          <a:xfrm rot="16200000">
+            <a:off x="4454935" y="960774"/>
+            <a:ext cx="3000976" cy="1097280"/>
+          </a:xfrm>
+          <a:prstGeom prst="rect">
+            <a:avLst/>
+          </a:prstGeom>
+          <a:noFill/>
+          <a:ln w="28575">
+            <a:solidFill>
+              <a:schemeClr val="accent6">
+                <a:lumMod val="10000"/>
+              </a:schemeClr>
+            </a:solidFill>
+          </a:ln>
+        </p:spPr>
+        <p:style>
+          <a:lnRef idx="2">
+            <a:schemeClr val="accent1">
+              <a:shade val="50000"/>
+            </a:schemeClr>
+          </a:lnRef>
+          <a:fillRef idx="1">
+            <a:schemeClr val="accent1"/>
+          </a:fillRef>
+          <a:effectRef idx="0">
+            <a:schemeClr val="accent1"/>
+          </a:effectRef>
+          <a:fontRef idx="minor">
+            <a:schemeClr val="lt1"/>
+          </a:fontRef>
+        </p:style>
+        <p:txBody>
+          <a:bodyPr rtlCol="0" anchor="ctr"/>
+          <a:lstStyle/>
+          <a:p>
+            <a:pPr algn="ctr"/>
+            <a:r>
+              <a:rPr lang="en-US" sz="3200" dirty="0" smtClean="0">
+                <a:solidFill>
+                  <a:schemeClr val="accent6">
+                    <a:lumMod val="10000"/>
+                  </a:schemeClr>
+                </a:solidFill>
+              </a:rPr>
+              <a:t>SP-2 Input </a:t>
+            </a:r>
+            <a:r>
+              <a:rPr lang="en-US" sz="3200" dirty="0" smtClean="0">
+                <a:solidFill>
+                  <a:schemeClr val="accent6">
+                    <a:lumMod val="10000"/>
+                  </a:schemeClr>
+                </a:solidFill>
+              </a:rPr>
+              <a:t>Layer</a:t>
+            </a:r>
+            <a:endParaRPr lang="en-US" sz="3200" dirty="0" smtClean="0">
+              <a:solidFill>
+                <a:schemeClr val="accent6">
+                  <a:lumMod val="10000"/>
+                </a:schemeClr>
+              </a:solidFill>
+            </a:endParaRPr>
+          </a:p>
+        </p:txBody>
+      </p:sp>
+      <p:cxnSp>
+        <p:nvCxnSpPr>
+          <p:cNvPr id="59" name="Straight Arrow Connector 58"/>
+          <p:cNvCxnSpPr>
+            <a:stCxn id="58" idx="0"/>
+            <a:endCxn id="55" idx="2"/>
+          </p:cNvCxnSpPr>
+          <p:nvPr/>
+        </p:nvCxnSpPr>
+        <p:spPr>
+          <a:xfrm flipH="1" flipV="1">
+            <a:off x="5029200" y="1509413"/>
+            <a:ext cx="377583" cy="1"/>
+          </a:xfrm>
+          <a:prstGeom prst="straightConnector1">
+            <a:avLst/>
+          </a:prstGeom>
+          <a:ln w="57150">
+            <a:solidFill>
+              <a:schemeClr val="accent6">
+                <a:lumMod val="10000"/>
+              </a:schemeClr>
+            </a:solidFill>
+            <a:tailEnd type="triangle"/>
+          </a:ln>
+        </p:spPr>
+        <p:style>
+          <a:lnRef idx="1">
+            <a:schemeClr val="accent1"/>
+          </a:lnRef>
+          <a:fillRef idx="0">
+            <a:schemeClr val="accent1"/>
+          </a:fillRef>
+          <a:effectRef idx="0">
+            <a:schemeClr val="accent1"/>
+          </a:effectRef>
+          <a:fontRef idx="minor">
+            <a:schemeClr val="tx1"/>
+          </a:fontRef>
+        </p:style>
+      </p:cxnSp>
+      <p:cxnSp>
+        <p:nvCxnSpPr>
+          <p:cNvPr id="60" name="Elbow Connector 59"/>
+          <p:cNvCxnSpPr>
+            <a:stCxn id="48" idx="3"/>
+            <a:endCxn id="56" idx="2"/>
+          </p:cNvCxnSpPr>
+          <p:nvPr/>
+        </p:nvCxnSpPr>
+        <p:spPr>
+          <a:xfrm rot="16200000" flipV="1">
+            <a:off x="3336631" y="3007654"/>
+            <a:ext cx="138928" cy="978076"/>
+          </a:xfrm>
+          <a:prstGeom prst="bentConnector4">
+            <a:avLst>
+              <a:gd name="adj1" fmla="val 104371"/>
+              <a:gd name="adj2" fmla="val 76628"/>
+            </a:avLst>
+          </a:prstGeom>
+          <a:ln w="57150">
+            <a:solidFill>
+              <a:schemeClr val="accent6">
+                <a:lumMod val="10000"/>
+              </a:schemeClr>
+            </a:solidFill>
+            <a:tailEnd type="triangle"/>
+          </a:ln>
+        </p:spPr>
+        <p:style>
+          <a:lnRef idx="1">
+            <a:schemeClr val="accent1"/>
+          </a:lnRef>
+          <a:fillRef idx="0">
+            <a:schemeClr val="accent1"/>
+          </a:fillRef>
+          <a:effectRef idx="0">
+            <a:schemeClr val="accent1"/>
+          </a:effectRef>
+          <a:fontRef idx="minor">
+            <a:schemeClr val="tx1"/>
+          </a:fontRef>
+        </p:style>
+      </p:cxnSp>
+      <p:cxnSp>
+        <p:nvCxnSpPr>
+          <p:cNvPr id="62" name="Straight Arrow Connector 61"/>
+          <p:cNvCxnSpPr>
+            <a:stCxn id="56" idx="0"/>
+            <a:endCxn id="57" idx="2"/>
+          </p:cNvCxnSpPr>
+          <p:nvPr/>
+        </p:nvCxnSpPr>
+        <p:spPr>
+          <a:xfrm flipH="1">
+            <a:off x="1390340" y="3427228"/>
+            <a:ext cx="429437" cy="0"/>
+          </a:xfrm>
+          <a:prstGeom prst="straightConnector1">
+            <a:avLst/>
+          </a:prstGeom>
+          <a:ln w="57150">
+            <a:solidFill>
+              <a:schemeClr val="accent6">
+                <a:lumMod val="10000"/>
+              </a:schemeClr>
+            </a:solidFill>
+            <a:tailEnd type="triangle"/>
+          </a:ln>
+        </p:spPr>
+        <p:style>
+          <a:lnRef idx="1">
+            <a:schemeClr val="accent1"/>
+          </a:lnRef>
+          <a:fillRef idx="0">
+            <a:schemeClr val="accent1"/>
+          </a:fillRef>
+          <a:effectRef idx="0">
+            <a:schemeClr val="accent1"/>
+          </a:effectRef>
+          <a:fontRef idx="minor">
+            <a:schemeClr val="tx1"/>
+          </a:fontRef>
+        </p:style>
+      </p:cxnSp>
+      <p:cxnSp>
+        <p:nvCxnSpPr>
+          <p:cNvPr id="73" name="Elbow Connector 72"/>
+          <p:cNvCxnSpPr>
+            <a:stCxn id="55" idx="1"/>
+            <a:endCxn id="56" idx="2"/>
+          </p:cNvCxnSpPr>
+          <p:nvPr/>
+        </p:nvCxnSpPr>
+        <p:spPr>
+          <a:xfrm rot="5400000">
+            <a:off x="3350139" y="2576820"/>
+            <a:ext cx="404626" cy="1270790"/>
+          </a:xfrm>
+          <a:prstGeom prst="bentConnector4">
+            <a:avLst>
+              <a:gd name="adj1" fmla="val 63654"/>
+              <a:gd name="adj2" fmla="val -149"/>
+            </a:avLst>
+          </a:prstGeom>
+          <a:ln w="57150">
+            <a:solidFill>
+              <a:schemeClr val="accent6">
+                <a:lumMod val="10000"/>
+              </a:schemeClr>
+            </a:solidFill>
+            <a:tailEnd type="triangle"/>
+          </a:ln>
+        </p:spPr>
+        <p:style>
+          <a:lnRef idx="1">
+            <a:schemeClr val="accent1"/>
+          </a:lnRef>
+          <a:fillRef idx="0">
+            <a:schemeClr val="accent1"/>
+          </a:fillRef>
+          <a:effectRef idx="0">
+            <a:schemeClr val="accent1"/>
+          </a:effectRef>
+          <a:fontRef idx="minor">
+            <a:schemeClr val="tx1"/>
+          </a:fontRef>
+        </p:style>
+      </p:cxnSp>
+      <p:sp>
+        <p:nvSpPr>
+          <p:cNvPr id="21" name="Rectangle 20"/>
+          <p:cNvSpPr/>
+          <p:nvPr/>
+        </p:nvSpPr>
+        <p:spPr>
+          <a:xfrm rot="16200000">
+            <a:off x="8356074" y="4663440"/>
+            <a:ext cx="3291840" cy="1097280"/>
+          </a:xfrm>
+          <a:prstGeom prst="rect">
+            <a:avLst/>
+          </a:prstGeom>
+          <a:noFill/>
+          <a:ln w="28575">
+            <a:solidFill>
+              <a:schemeClr val="accent6">
+                <a:lumMod val="10000"/>
+              </a:schemeClr>
+            </a:solidFill>
+          </a:ln>
+        </p:spPr>
+        <p:style>
+          <a:lnRef idx="2">
+            <a:schemeClr val="accent1">
+              <a:shade val="50000"/>
+            </a:schemeClr>
+          </a:lnRef>
+          <a:fillRef idx="1">
+            <a:schemeClr val="accent1"/>
+          </a:fillRef>
+          <a:effectRef idx="0">
+            <a:schemeClr val="accent1"/>
+          </a:effectRef>
+          <a:fontRef idx="minor">
+            <a:schemeClr val="lt1"/>
+          </a:fontRef>
+        </p:style>
+        <p:txBody>
+          <a:bodyPr rtlCol="0" anchor="ctr"/>
+          <a:lstStyle/>
+          <a:p>
+            <a:pPr algn="ctr"/>
+            <a:r>
+              <a:rPr lang="en-US" sz="3200" dirty="0" smtClean="0">
+                <a:solidFill>
+                  <a:schemeClr val="accent6">
+                    <a:lumMod val="10000"/>
+                  </a:schemeClr>
+                </a:solidFill>
+              </a:rPr>
+              <a:t>Embedding Layer</a:t>
+            </a:r>
+            <a:endParaRPr lang="en-US" sz="3200" dirty="0" smtClean="0">
+              <a:solidFill>
+                <a:schemeClr val="accent6">
+                  <a:lumMod val="10000"/>
+                </a:schemeClr>
+              </a:solidFill>
+            </a:endParaRPr>
+          </a:p>
+        </p:txBody>
+      </p:sp>
+    </p:spTree>
+    <p:extLst>
+      <p:ext uri="{BB962C8B-B14F-4D97-AF65-F5344CB8AC3E}">
+        <p14:creationId xmlns:p14="http://schemas.microsoft.com/office/powerpoint/2010/main" val="1802643058"/>
+      </p:ext>
+    </p:extLst>
+  </p:cSld>
+  <p:clrMapOvr>
+    <a:masterClrMapping/>
+  </p:clrMapOvr>
+  <p:timing>
+    <p:tnLst>
+      <p:par>
+        <p:cTn id="1" dur="indefinite" restart="never" nodeType="tmRoot"/>
+      </p:par>
+    </p:tnLst>
+  </p:timing>
 </p:sld>
 </file>
 

</xml_diff>

<commit_message>
HelpDesk illustrations, Abstract and update to background
</commit_message>
<xml_diff>
--- a/gfx/Thesis figures.pptx
+++ b/gfx/Thesis figures.pptx
@@ -248,7 +248,7 @@
           <a:p>
             <a:fld id="{0F0D45A1-12FA-4DDB-9899-05481FB1D8F3}" type="datetimeFigureOut">
               <a:rPr lang="en-US" smtClean="0"/>
-              <a:t>1/17/2019</a:t>
+              <a:t>1/18/2019</a:t>
             </a:fld>
             <a:endParaRPr lang="en-US"/>
           </a:p>
@@ -647,7 +647,7 @@
           <a:p>
             <a:fld id="{3971B8E7-E4D3-4F8A-8C05-81E1A0A9E2AB}" type="datetimeFigureOut">
               <a:rPr lang="en-US" smtClean="0"/>
-              <a:t>1/17/2019</a:t>
+              <a:t>1/18/2019</a:t>
             </a:fld>
             <a:endParaRPr lang="en-US"/>
           </a:p>
@@ -817,7 +817,7 @@
           <a:p>
             <a:fld id="{3971B8E7-E4D3-4F8A-8C05-81E1A0A9E2AB}" type="datetimeFigureOut">
               <a:rPr lang="en-US" smtClean="0"/>
-              <a:t>1/17/2019</a:t>
+              <a:t>1/18/2019</a:t>
             </a:fld>
             <a:endParaRPr lang="en-US"/>
           </a:p>
@@ -997,7 +997,7 @@
           <a:p>
             <a:fld id="{3971B8E7-E4D3-4F8A-8C05-81E1A0A9E2AB}" type="datetimeFigureOut">
               <a:rPr lang="en-US" smtClean="0"/>
-              <a:t>1/17/2019</a:t>
+              <a:t>1/18/2019</a:t>
             </a:fld>
             <a:endParaRPr lang="en-US"/>
           </a:p>
@@ -1167,7 +1167,7 @@
           <a:p>
             <a:fld id="{3971B8E7-E4D3-4F8A-8C05-81E1A0A9E2AB}" type="datetimeFigureOut">
               <a:rPr lang="en-US" smtClean="0"/>
-              <a:t>1/17/2019</a:t>
+              <a:t>1/18/2019</a:t>
             </a:fld>
             <a:endParaRPr lang="en-US"/>
           </a:p>
@@ -1413,7 +1413,7 @@
           <a:p>
             <a:fld id="{3971B8E7-E4D3-4F8A-8C05-81E1A0A9E2AB}" type="datetimeFigureOut">
               <a:rPr lang="en-US" smtClean="0"/>
-              <a:t>1/17/2019</a:t>
+              <a:t>1/18/2019</a:t>
             </a:fld>
             <a:endParaRPr lang="en-US"/>
           </a:p>
@@ -1645,7 +1645,7 @@
           <a:p>
             <a:fld id="{3971B8E7-E4D3-4F8A-8C05-81E1A0A9E2AB}" type="datetimeFigureOut">
               <a:rPr lang="en-US" smtClean="0"/>
-              <a:t>1/17/2019</a:t>
+              <a:t>1/18/2019</a:t>
             </a:fld>
             <a:endParaRPr lang="en-US"/>
           </a:p>
@@ -2012,7 +2012,7 @@
           <a:p>
             <a:fld id="{3971B8E7-E4D3-4F8A-8C05-81E1A0A9E2AB}" type="datetimeFigureOut">
               <a:rPr lang="en-US" smtClean="0"/>
-              <a:t>1/17/2019</a:t>
+              <a:t>1/18/2019</a:t>
             </a:fld>
             <a:endParaRPr lang="en-US"/>
           </a:p>
@@ -2130,7 +2130,7 @@
           <a:p>
             <a:fld id="{3971B8E7-E4D3-4F8A-8C05-81E1A0A9E2AB}" type="datetimeFigureOut">
               <a:rPr lang="en-US" smtClean="0"/>
-              <a:t>1/17/2019</a:t>
+              <a:t>1/18/2019</a:t>
             </a:fld>
             <a:endParaRPr lang="en-US"/>
           </a:p>
@@ -2225,7 +2225,7 @@
           <a:p>
             <a:fld id="{3971B8E7-E4D3-4F8A-8C05-81E1A0A9E2AB}" type="datetimeFigureOut">
               <a:rPr lang="en-US" smtClean="0"/>
-              <a:t>1/17/2019</a:t>
+              <a:t>1/18/2019</a:t>
             </a:fld>
             <a:endParaRPr lang="en-US"/>
           </a:p>
@@ -2502,7 +2502,7 @@
           <a:p>
             <a:fld id="{3971B8E7-E4D3-4F8A-8C05-81E1A0A9E2AB}" type="datetimeFigureOut">
               <a:rPr lang="en-US" smtClean="0"/>
-              <a:t>1/17/2019</a:t>
+              <a:t>1/18/2019</a:t>
             </a:fld>
             <a:endParaRPr lang="en-US"/>
           </a:p>
@@ -2755,7 +2755,7 @@
           <a:p>
             <a:fld id="{3971B8E7-E4D3-4F8A-8C05-81E1A0A9E2AB}" type="datetimeFigureOut">
               <a:rPr lang="en-US" smtClean="0"/>
-              <a:t>1/17/2019</a:t>
+              <a:t>1/18/2019</a:t>
             </a:fld>
             <a:endParaRPr lang="en-US"/>
           </a:p>
@@ -2968,7 +2968,7 @@
           <a:p>
             <a:fld id="{3971B8E7-E4D3-4F8A-8C05-81E1A0A9E2AB}" type="datetimeFigureOut">
               <a:rPr lang="en-US" smtClean="0"/>
-              <a:t>1/17/2019</a:t>
+              <a:t>1/18/2019</a:t>
             </a:fld>
             <a:endParaRPr lang="en-US"/>
           </a:p>
@@ -3686,17 +3686,7 @@
                   </a:schemeClr>
                 </a:solidFill>
               </a:rPr>
-              <a:t>Output Layer </a:t>
-            </a:r>
-            <a:r>
-              <a:rPr lang="en-US" sz="4400" dirty="0" smtClean="0">
-                <a:solidFill>
-                  <a:schemeClr val="accent6">
-                    <a:lumMod val="10000"/>
-                  </a:schemeClr>
-                </a:solidFill>
-              </a:rPr>
-              <a:t>(</a:t>
+              <a:t>Output Layer (</a:t>
             </a:r>
             <a:r>
               <a:rPr lang="en-US" sz="4400" i="1" dirty="0" err="1" smtClean="0">
@@ -4748,7 +4738,17 @@
                   </a:schemeClr>
                 </a:solidFill>
               </a:rPr>
-              <a:t>Output </a:t>
+              <a:t>Output Layer (</a:t>
+            </a:r>
+            <a:r>
+              <a:rPr lang="en-US" sz="4400" i="1" dirty="0" err="1" smtClean="0">
+                <a:solidFill>
+                  <a:schemeClr val="accent6">
+                    <a:lumMod val="10000"/>
+                  </a:schemeClr>
+                </a:solidFill>
+              </a:rPr>
+              <a:t>Softmax</a:t>
             </a:r>
             <a:r>
               <a:rPr lang="en-US" sz="4400" dirty="0" smtClean="0">
@@ -4758,35 +4758,8 @@
                   </a:schemeClr>
                 </a:solidFill>
               </a:rPr>
-              <a:t>Layer (</a:t>
-            </a:r>
-            <a:r>
-              <a:rPr lang="en-US" sz="4400" i="1" dirty="0" err="1" smtClean="0">
-                <a:solidFill>
-                  <a:schemeClr val="accent6">
-                    <a:lumMod val="10000"/>
-                  </a:schemeClr>
-                </a:solidFill>
-              </a:rPr>
-              <a:t>Softmax</a:t>
-            </a:r>
-            <a:r>
-              <a:rPr lang="en-US" sz="4400" dirty="0" smtClean="0">
-                <a:solidFill>
-                  <a:schemeClr val="accent6">
-                    <a:lumMod val="10000"/>
-                  </a:schemeClr>
-                </a:solidFill>
-              </a:rPr>
               <a:t>)</a:t>
             </a:r>
-            <a:endParaRPr lang="en-US" sz="4400" dirty="0" smtClean="0">
-              <a:solidFill>
-                <a:schemeClr val="accent6">
-                  <a:lumMod val="10000"/>
-                </a:schemeClr>
-              </a:solidFill>
-            </a:endParaRPr>
           </a:p>
           <a:p>
             <a:pPr algn="ctr"/>
@@ -9733,7 +9706,7 @@
         </p:nvSpPr>
         <p:spPr>
           <a:xfrm rot="16200000">
-            <a:off x="6829359" y="4663438"/>
+            <a:off x="5436079" y="4663438"/>
             <a:ext cx="3291840" cy="1097280"/>
           </a:xfrm>
           <a:prstGeom prst="rect">
@@ -9777,25 +9750,8 @@
                   </a:schemeClr>
                 </a:solidFill>
               </a:rPr>
-              <a:t>LSTM </a:t>
-            </a:r>
-            <a:r>
-              <a:rPr lang="en-US" sz="3200" dirty="0" smtClean="0">
-                <a:solidFill>
-                  <a:schemeClr val="accent6">
-                    <a:lumMod val="10000"/>
-                  </a:schemeClr>
-                </a:solidFill>
-              </a:rPr>
-              <a:t>Layer</a:t>
-            </a:r>
-            <a:endParaRPr lang="en-US" sz="3200" dirty="0" smtClean="0">
-              <a:solidFill>
-                <a:schemeClr val="accent6">
-                  <a:lumMod val="10000"/>
-                </a:schemeClr>
-              </a:solidFill>
-            </a:endParaRPr>
+              <a:t>LSTM Layer</a:t>
+            </a:r>
           </a:p>
         </p:txBody>
       </p:sp>
@@ -9807,7 +9763,7 @@
         </p:nvSpPr>
         <p:spPr>
           <a:xfrm rot="16200000">
-            <a:off x="3775929" y="4663440"/>
+            <a:off x="3912960" y="4663440"/>
             <a:ext cx="3291840" cy="1097280"/>
           </a:xfrm>
           <a:prstGeom prst="rect">
@@ -9851,37 +9807,20 @@
                   </a:schemeClr>
                 </a:solidFill>
               </a:rPr>
-              <a:t>LSTM </a:t>
-            </a:r>
-            <a:r>
-              <a:rPr lang="en-US" sz="3200" dirty="0" smtClean="0">
-                <a:solidFill>
-                  <a:schemeClr val="accent6">
-                    <a:lumMod val="10000"/>
-                  </a:schemeClr>
-                </a:solidFill>
-              </a:rPr>
-              <a:t>Layer</a:t>
-            </a:r>
-            <a:endParaRPr lang="en-US" sz="3200" dirty="0" smtClean="0">
-              <a:solidFill>
-                <a:schemeClr val="accent6">
-                  <a:lumMod val="10000"/>
-                </a:schemeClr>
-              </a:solidFill>
-            </a:endParaRPr>
-          </a:p>
-        </p:txBody>
-      </p:sp>
-      <p:sp>
-        <p:nvSpPr>
-          <p:cNvPr id="48" name="Rectangle 47"/>
+              <a:t>LSTM Layer</a:t>
+            </a:r>
+          </a:p>
+        </p:txBody>
+      </p:sp>
+      <p:sp>
+        <p:nvSpPr>
+          <p:cNvPr id="49" name="Rectangle 48"/>
           <p:cNvSpPr/>
           <p:nvPr/>
         </p:nvSpPr>
         <p:spPr>
           <a:xfrm rot="16200000">
-            <a:off x="2249213" y="4663436"/>
+            <a:off x="8506763" y="4663435"/>
             <a:ext cx="3291840" cy="1097280"/>
           </a:xfrm>
           <a:prstGeom prst="rect">
@@ -9925,112 +9864,8 @@
                   </a:schemeClr>
                 </a:solidFill>
               </a:rPr>
-              <a:t>Dropout </a:t>
-            </a:r>
-            <a:r>
-              <a:rPr lang="en-US" sz="3200" dirty="0" smtClean="0">
-                <a:solidFill>
-                  <a:schemeClr val="accent6">
-                    <a:lumMod val="10000"/>
-                  </a:schemeClr>
-                </a:solidFill>
-              </a:rPr>
-              <a:t>50</a:t>
-            </a:r>
-            <a:r>
-              <a:rPr lang="en-US" sz="3200" dirty="0" smtClean="0">
-                <a:solidFill>
-                  <a:schemeClr val="accent6">
-                    <a:lumMod val="10000"/>
-                  </a:schemeClr>
-                </a:solidFill>
-              </a:rPr>
-              <a:t>%</a:t>
-            </a:r>
-          </a:p>
-        </p:txBody>
-      </p:sp>
-      <p:sp>
-        <p:nvSpPr>
-          <p:cNvPr id="49" name="Rectangle 48"/>
-          <p:cNvSpPr/>
-          <p:nvPr/>
-        </p:nvSpPr>
-        <p:spPr>
-          <a:xfrm rot="16200000">
-            <a:off x="9900043" y="4663435"/>
-            <a:ext cx="3291840" cy="1097280"/>
-          </a:xfrm>
-          <a:prstGeom prst="rect">
-            <a:avLst/>
-          </a:prstGeom>
-          <a:noFill/>
-          <a:ln w="28575">
-            <a:solidFill>
-              <a:schemeClr val="accent6">
-                <a:lumMod val="10000"/>
-              </a:schemeClr>
-            </a:solidFill>
-          </a:ln>
-        </p:spPr>
-        <p:style>
-          <a:lnRef idx="2">
-            <a:schemeClr val="accent1">
-              <a:shade val="50000"/>
-            </a:schemeClr>
-          </a:lnRef>
-          <a:fillRef idx="1">
-            <a:schemeClr val="accent1"/>
-          </a:fillRef>
-          <a:effectRef idx="0">
-            <a:schemeClr val="accent1"/>
-          </a:effectRef>
-          <a:fontRef idx="minor">
-            <a:schemeClr val="lt1"/>
-          </a:fontRef>
-        </p:style>
-        <p:txBody>
-          <a:bodyPr rtlCol="0" anchor="ctr"/>
-          <a:lstStyle/>
-          <a:p>
-            <a:pPr algn="ctr"/>
-            <a:r>
-              <a:rPr lang="en-US" sz="3200" dirty="0" smtClean="0">
-                <a:solidFill>
-                  <a:schemeClr val="accent6">
-                    <a:lumMod val="10000"/>
-                  </a:schemeClr>
-                </a:solidFill>
-              </a:rPr>
-              <a:t>Word </a:t>
-            </a:r>
-            <a:r>
-              <a:rPr lang="en-US" sz="3200" dirty="0" smtClean="0">
-                <a:solidFill>
-                  <a:schemeClr val="accent6">
-                    <a:lumMod val="10000"/>
-                  </a:schemeClr>
-                </a:solidFill>
-              </a:rPr>
-              <a:t>Input </a:t>
-            </a:r>
-            <a:r>
-              <a:rPr lang="en-US" sz="3200" dirty="0" smtClean="0">
-                <a:solidFill>
-                  <a:schemeClr val="accent6">
-                    <a:lumMod val="10000"/>
-                  </a:schemeClr>
-                </a:solidFill>
-              </a:rPr>
-              <a:t>Layer</a:t>
-            </a:r>
-            <a:endParaRPr lang="en-US" sz="3200" dirty="0" smtClean="0">
-              <a:solidFill>
-                <a:schemeClr val="accent6">
-                  <a:lumMod val="10000"/>
-                </a:schemeClr>
-              </a:solidFill>
-            </a:endParaRPr>
+              <a:t>Word Input Layer</a:t>
+            </a:r>
           </a:p>
         </p:txBody>
       </p:sp>
@@ -10042,7 +9877,7 @@
         </p:nvCxnSpPr>
         <p:spPr>
           <a:xfrm flipH="1">
-            <a:off x="10550634" y="5212075"/>
+            <a:off x="9157354" y="5212075"/>
             <a:ext cx="429435" cy="3"/>
           </a:xfrm>
           <a:prstGeom prst="straightConnector1">
@@ -10077,13 +9912,12 @@
           <p:cNvPr id="51" name="Straight Arrow Connector 50"/>
           <p:cNvCxnSpPr>
             <a:stCxn id="46" idx="0"/>
-            <a:endCxn id="53" idx="2"/>
           </p:cNvCxnSpPr>
           <p:nvPr/>
         </p:nvCxnSpPr>
         <p:spPr>
           <a:xfrm flipH="1">
-            <a:off x="7497204" y="5212078"/>
+            <a:off x="6103924" y="5212078"/>
             <a:ext cx="429435" cy="0"/>
           </a:xfrm>
           <a:prstGeom prst="straightConnector1">
@@ -10113,57 +9947,16 @@
           </a:fontRef>
         </p:style>
       </p:cxnSp>
-      <p:cxnSp>
-        <p:nvCxnSpPr>
-          <p:cNvPr id="52" name="Straight Arrow Connector 51"/>
-          <p:cNvCxnSpPr>
-            <a:stCxn id="53" idx="0"/>
-            <a:endCxn id="47" idx="2"/>
-          </p:cNvCxnSpPr>
-          <p:nvPr/>
-        </p:nvCxnSpPr>
-        <p:spPr>
-          <a:xfrm flipH="1">
-            <a:off x="5970489" y="5212078"/>
-            <a:ext cx="429435" cy="0"/>
-          </a:xfrm>
-          <a:prstGeom prst="straightConnector1">
-            <a:avLst/>
-          </a:prstGeom>
-          <a:ln w="57150">
-            <a:solidFill>
-              <a:schemeClr val="accent6">
-                <a:lumMod val="10000"/>
-              </a:schemeClr>
-            </a:solidFill>
-            <a:tailEnd type="triangle"/>
-          </a:ln>
-        </p:spPr>
-        <p:style>
-          <a:lnRef idx="1">
-            <a:schemeClr val="accent1"/>
-          </a:lnRef>
-          <a:fillRef idx="0">
-            <a:schemeClr val="accent1"/>
-          </a:fillRef>
-          <a:effectRef idx="0">
-            <a:schemeClr val="accent1"/>
-          </a:effectRef>
-          <a:fontRef idx="minor">
-            <a:schemeClr val="tx1"/>
-          </a:fontRef>
-        </p:style>
-      </p:cxnSp>
-      <p:sp>
-        <p:nvSpPr>
-          <p:cNvPr id="53" name="Rectangle 52"/>
+      <p:sp>
+        <p:nvSpPr>
+          <p:cNvPr id="55" name="Rectangle 54"/>
           <p:cNvSpPr/>
           <p:nvPr/>
         </p:nvSpPr>
         <p:spPr>
           <a:xfrm rot="16200000">
-            <a:off x="5302644" y="4663438"/>
-            <a:ext cx="3291840" cy="1097280"/>
+            <a:off x="4058961" y="668060"/>
+            <a:ext cx="3000977" cy="1682707"/>
           </a:xfrm>
           <a:prstGeom prst="rect">
             <a:avLst/>
@@ -10206,7 +9999,17 @@
                   </a:schemeClr>
                 </a:solidFill>
               </a:rPr>
-              <a:t>Dropout </a:t>
+              <a:t>Embedding Layer (</a:t>
+            </a:r>
+            <a:r>
+              <a:rPr lang="en-US" sz="3200" i="1" dirty="0" err="1" smtClean="0">
+                <a:solidFill>
+                  <a:schemeClr val="accent6">
+                    <a:lumMod val="10000"/>
+                  </a:schemeClr>
+                </a:solidFill>
+              </a:rPr>
+              <a:t>ReLU</a:t>
             </a:r>
             <a:r>
               <a:rPr lang="en-US" sz="3200" dirty="0" smtClean="0">
@@ -10216,72 +10019,21 @@
                   </a:schemeClr>
                 </a:solidFill>
               </a:rPr>
-              <a:t>50</a:t>
-            </a:r>
-            <a:r>
-              <a:rPr lang="en-US" sz="3200" dirty="0" smtClean="0">
-                <a:solidFill>
-                  <a:schemeClr val="accent6">
-                    <a:lumMod val="10000"/>
-                  </a:schemeClr>
-                </a:solidFill>
-              </a:rPr>
-              <a:t>%</a:t>
-            </a:r>
-          </a:p>
-        </p:txBody>
-      </p:sp>
-      <p:cxnSp>
-        <p:nvCxnSpPr>
-          <p:cNvPr id="54" name="Straight Arrow Connector 53"/>
-          <p:cNvCxnSpPr>
-            <a:stCxn id="47" idx="0"/>
-            <a:endCxn id="48" idx="2"/>
-          </p:cNvCxnSpPr>
-          <p:nvPr/>
-        </p:nvCxnSpPr>
-        <p:spPr>
-          <a:xfrm flipH="1" flipV="1">
-            <a:off x="4443773" y="5212076"/>
-            <a:ext cx="429436" cy="2"/>
-          </a:xfrm>
-          <a:prstGeom prst="straightConnector1">
-            <a:avLst/>
-          </a:prstGeom>
-          <a:ln w="57150">
-            <a:solidFill>
-              <a:schemeClr val="accent6">
-                <a:lumMod val="10000"/>
-              </a:schemeClr>
-            </a:solidFill>
-            <a:tailEnd type="triangle"/>
-          </a:ln>
-        </p:spPr>
-        <p:style>
-          <a:lnRef idx="1">
-            <a:schemeClr val="accent1"/>
-          </a:lnRef>
-          <a:fillRef idx="0">
-            <a:schemeClr val="accent1"/>
-          </a:fillRef>
-          <a:effectRef idx="0">
-            <a:schemeClr val="accent1"/>
-          </a:effectRef>
-          <a:fontRef idx="minor">
-            <a:schemeClr val="tx1"/>
-          </a:fontRef>
-        </p:style>
-      </p:cxnSp>
-      <p:sp>
-        <p:nvSpPr>
-          <p:cNvPr id="55" name="Rectangle 54"/>
+              <a:t>)</a:t>
+            </a:r>
+          </a:p>
+        </p:txBody>
+      </p:sp>
+      <p:sp>
+        <p:nvSpPr>
+          <p:cNvPr id="56" name="Rectangle 55"/>
           <p:cNvSpPr/>
           <p:nvPr/>
         </p:nvSpPr>
         <p:spPr>
           <a:xfrm rot="16200000">
-            <a:off x="2687358" y="668060"/>
-            <a:ext cx="3000977" cy="1682707"/>
+            <a:off x="1962626" y="2878587"/>
+            <a:ext cx="3657600" cy="1097280"/>
           </a:xfrm>
           <a:prstGeom prst="rect">
             <a:avLst/>
@@ -10324,7 +10076,7 @@
                   </a:schemeClr>
                 </a:solidFill>
               </a:rPr>
-              <a:t>Embedding Layer (</a:t>
+              <a:t>Dense Layer (</a:t>
             </a:r>
             <a:r>
               <a:rPr lang="en-US" sz="3200" i="1" dirty="0" err="1" smtClean="0">
@@ -10346,25 +10098,18 @@
               </a:rPr>
               <a:t>)</a:t>
             </a:r>
-            <a:endParaRPr lang="en-US" sz="3200" dirty="0" smtClean="0">
-              <a:solidFill>
-                <a:schemeClr val="accent6">
-                  <a:lumMod val="10000"/>
-                </a:schemeClr>
-              </a:solidFill>
-            </a:endParaRPr>
-          </a:p>
-        </p:txBody>
-      </p:sp>
-      <p:sp>
-        <p:nvSpPr>
-          <p:cNvPr id="56" name="Rectangle 55"/>
+          </a:p>
+        </p:txBody>
+      </p:sp>
+      <p:sp>
+        <p:nvSpPr>
+          <p:cNvPr id="57" name="Rectangle 56"/>
           <p:cNvSpPr/>
           <p:nvPr/>
         </p:nvSpPr>
         <p:spPr>
           <a:xfrm rot="16200000">
-            <a:off x="539617" y="2865888"/>
+            <a:off x="-987100" y="2878588"/>
             <a:ext cx="3657600" cy="1097280"/>
           </a:xfrm>
           <a:prstGeom prst="rect">
@@ -10418,7 +10163,7 @@
                   </a:schemeClr>
                 </a:solidFill>
               </a:rPr>
-              <a:t>ReLU</a:t>
+              <a:t>Softmax</a:t>
             </a:r>
             <a:r>
               <a:rPr lang="en-US" sz="3200" dirty="0" smtClean="0">
@@ -10430,7 +10175,7 @@
               </a:rPr>
               <a:t>)</a:t>
             </a:r>
-            <a:endParaRPr lang="en-US" sz="3200" dirty="0" smtClean="0">
+            <a:endParaRPr lang="en-US" sz="3200" dirty="0">
               <a:solidFill>
                 <a:schemeClr val="accent6">
                   <a:lumMod val="10000"/>
@@ -10442,14 +10187,14 @@
       </p:sp>
       <p:sp>
         <p:nvSpPr>
-          <p:cNvPr id="57" name="Rectangle 56"/>
+          <p:cNvPr id="58" name="Rectangle 57"/>
           <p:cNvSpPr/>
           <p:nvPr/>
         </p:nvSpPr>
         <p:spPr>
           <a:xfrm rot="16200000">
-            <a:off x="-987100" y="2878588"/>
-            <a:ext cx="3657600" cy="1097280"/>
+            <a:off x="5826538" y="960774"/>
+            <a:ext cx="3000976" cy="1097280"/>
           </a:xfrm>
           <a:prstGeom prst="rect">
             <a:avLst/>
@@ -10492,109 +10237,8 @@
                   </a:schemeClr>
                 </a:solidFill>
               </a:rPr>
-              <a:t>Dense Layer (</a:t>
-            </a:r>
-            <a:r>
-              <a:rPr lang="en-US" sz="3200" i="1" dirty="0" err="1" smtClean="0">
-                <a:solidFill>
-                  <a:schemeClr val="accent6">
-                    <a:lumMod val="10000"/>
-                  </a:schemeClr>
-                </a:solidFill>
-              </a:rPr>
-              <a:t>Softmax</a:t>
-            </a:r>
-            <a:r>
-              <a:rPr lang="en-US" sz="3200" dirty="0" smtClean="0">
-                <a:solidFill>
-                  <a:schemeClr val="accent6">
-                    <a:lumMod val="10000"/>
-                  </a:schemeClr>
-                </a:solidFill>
-              </a:rPr>
-              <a:t>)</a:t>
-            </a:r>
-            <a:endParaRPr lang="en-US" sz="3200" dirty="0">
-              <a:solidFill>
-                <a:schemeClr val="accent6">
-                  <a:lumMod val="10000"/>
-                </a:schemeClr>
-              </a:solidFill>
-            </a:endParaRPr>
-          </a:p>
-        </p:txBody>
-      </p:sp>
-      <p:sp>
-        <p:nvSpPr>
-          <p:cNvPr id="58" name="Rectangle 57"/>
-          <p:cNvSpPr/>
-          <p:nvPr/>
-        </p:nvSpPr>
-        <p:spPr>
-          <a:xfrm rot="16200000">
-            <a:off x="4454935" y="960774"/>
-            <a:ext cx="3000976" cy="1097280"/>
-          </a:xfrm>
-          <a:prstGeom prst="rect">
-            <a:avLst/>
-          </a:prstGeom>
-          <a:noFill/>
-          <a:ln w="28575">
-            <a:solidFill>
-              <a:schemeClr val="accent6">
-                <a:lumMod val="10000"/>
-              </a:schemeClr>
-            </a:solidFill>
-          </a:ln>
-        </p:spPr>
-        <p:style>
-          <a:lnRef idx="2">
-            <a:schemeClr val="accent1">
-              <a:shade val="50000"/>
-            </a:schemeClr>
-          </a:lnRef>
-          <a:fillRef idx="1">
-            <a:schemeClr val="accent1"/>
-          </a:fillRef>
-          <a:effectRef idx="0">
-            <a:schemeClr val="accent1"/>
-          </a:effectRef>
-          <a:fontRef idx="minor">
-            <a:schemeClr val="lt1"/>
-          </a:fontRef>
-        </p:style>
-        <p:txBody>
-          <a:bodyPr rtlCol="0" anchor="ctr"/>
-          <a:lstStyle/>
-          <a:p>
-            <a:pPr algn="ctr"/>
-            <a:r>
-              <a:rPr lang="en-US" sz="3200" dirty="0" smtClean="0">
-                <a:solidFill>
-                  <a:schemeClr val="accent6">
-                    <a:lumMod val="10000"/>
-                  </a:schemeClr>
-                </a:solidFill>
-              </a:rPr>
-              <a:t>SP-2 Input </a:t>
-            </a:r>
-            <a:r>
-              <a:rPr lang="en-US" sz="3200" dirty="0" smtClean="0">
-                <a:solidFill>
-                  <a:schemeClr val="accent6">
-                    <a:lumMod val="10000"/>
-                  </a:schemeClr>
-                </a:solidFill>
-              </a:rPr>
-              <a:t>Layer</a:t>
-            </a:r>
-            <a:endParaRPr lang="en-US" sz="3200" dirty="0" smtClean="0">
-              <a:solidFill>
-                <a:schemeClr val="accent6">
-                  <a:lumMod val="10000"/>
-                </a:schemeClr>
-              </a:solidFill>
-            </a:endParaRPr>
+              <a:t>SP-2 Input Layer</a:t>
+            </a:r>
           </a:p>
         </p:txBody>
       </p:sp>
@@ -10609,7 +10253,7 @@
         </p:nvCxnSpPr>
         <p:spPr>
           <a:xfrm flipH="1" flipV="1">
-            <a:off x="5029200" y="1509413"/>
+            <a:off x="6400803" y="1509413"/>
             <a:ext cx="377583" cy="1"/>
           </a:xfrm>
           <a:prstGeom prst="straightConnector1">
@@ -10643,20 +10287,20 @@
         <p:nvCxnSpPr>
           <p:cNvPr id="60" name="Elbow Connector 59"/>
           <p:cNvCxnSpPr>
-            <a:stCxn id="48" idx="3"/>
+            <a:stCxn id="47" idx="3"/>
             <a:endCxn id="56" idx="2"/>
           </p:cNvCxnSpPr>
           <p:nvPr/>
         </p:nvCxnSpPr>
         <p:spPr>
           <a:xfrm rot="16200000" flipV="1">
-            <a:off x="3336631" y="3007654"/>
-            <a:ext cx="138928" cy="978076"/>
+            <a:off x="4880007" y="2887287"/>
+            <a:ext cx="138933" cy="1218814"/>
           </a:xfrm>
           <a:prstGeom prst="bentConnector4">
             <a:avLst>
-              <a:gd name="adj1" fmla="val 104371"/>
-              <a:gd name="adj2" fmla="val 76628"/>
+              <a:gd name="adj1" fmla="val 94904"/>
+              <a:gd name="adj2" fmla="val 164"/>
             </a:avLst>
           </a:prstGeom>
           <a:ln w="57150">
@@ -10687,7 +10331,7 @@
         <p:nvCxnSpPr>
           <p:cNvPr id="62" name="Straight Arrow Connector 61"/>
           <p:cNvCxnSpPr>
-            <a:stCxn id="56" idx="0"/>
+            <a:stCxn id="23" idx="0"/>
             <a:endCxn id="57" idx="2"/>
           </p:cNvCxnSpPr>
           <p:nvPr/>
@@ -10695,7 +10339,7 @@
         <p:spPr>
           <a:xfrm flipH="1">
             <a:off x="1390340" y="3427228"/>
-            <a:ext cx="429437" cy="0"/>
+            <a:ext cx="377583" cy="0"/>
           </a:xfrm>
           <a:prstGeom prst="straightConnector1">
             <a:avLst/>
@@ -10735,13 +10379,13 @@
         </p:nvCxnSpPr>
         <p:spPr>
           <a:xfrm rot="5400000">
-            <a:off x="3350139" y="2576820"/>
-            <a:ext cx="404626" cy="1270790"/>
+            <a:off x="4741096" y="2608872"/>
+            <a:ext cx="417325" cy="1219384"/>
           </a:xfrm>
           <a:prstGeom prst="bentConnector4">
             <a:avLst>
-              <a:gd name="adj1" fmla="val 63654"/>
-              <a:gd name="adj2" fmla="val -149"/>
+              <a:gd name="adj1" fmla="val 100897"/>
+              <a:gd name="adj2" fmla="val 142"/>
             </a:avLst>
           </a:prstGeom>
           <a:ln w="57150">
@@ -10776,7 +10420,7 @@
         </p:nvSpPr>
         <p:spPr>
           <a:xfrm rot="16200000">
-            <a:off x="8356074" y="4663440"/>
+            <a:off x="6962794" y="4663440"/>
             <a:ext cx="3291840" cy="1097280"/>
           </a:xfrm>
           <a:prstGeom prst="rect">
@@ -10822,6 +10466,101 @@
               </a:rPr>
               <a:t>Embedding Layer</a:t>
             </a:r>
+          </a:p>
+        </p:txBody>
+      </p:sp>
+      <p:cxnSp>
+        <p:nvCxnSpPr>
+          <p:cNvPr id="20" name="Straight Arrow Connector 19"/>
+          <p:cNvCxnSpPr/>
+          <p:nvPr/>
+        </p:nvCxnSpPr>
+        <p:spPr>
+          <a:xfrm flipH="1">
+            <a:off x="7630639" y="5212075"/>
+            <a:ext cx="429435" cy="0"/>
+          </a:xfrm>
+          <a:prstGeom prst="straightConnector1">
+            <a:avLst/>
+          </a:prstGeom>
+          <a:ln w="57150">
+            <a:solidFill>
+              <a:schemeClr val="accent6">
+                <a:lumMod val="10000"/>
+              </a:schemeClr>
+            </a:solidFill>
+            <a:tailEnd type="triangle"/>
+          </a:ln>
+        </p:spPr>
+        <p:style>
+          <a:lnRef idx="1">
+            <a:schemeClr val="accent1"/>
+          </a:lnRef>
+          <a:fillRef idx="0">
+            <a:schemeClr val="accent1"/>
+          </a:fillRef>
+          <a:effectRef idx="0">
+            <a:schemeClr val="accent1"/>
+          </a:effectRef>
+          <a:fontRef idx="minor">
+            <a:schemeClr val="tx1"/>
+          </a:fontRef>
+        </p:style>
+      </p:cxnSp>
+      <p:sp>
+        <p:nvSpPr>
+          <p:cNvPr id="23" name="Rectangle 22"/>
+          <p:cNvSpPr/>
+          <p:nvPr/>
+        </p:nvSpPr>
+        <p:spPr>
+          <a:xfrm rot="16200000">
+            <a:off x="487763" y="2878588"/>
+            <a:ext cx="3657600" cy="1097280"/>
+          </a:xfrm>
+          <a:prstGeom prst="rect">
+            <a:avLst/>
+          </a:prstGeom>
+          <a:noFill/>
+          <a:ln w="28575">
+            <a:solidFill>
+              <a:schemeClr val="accent6">
+                <a:lumMod val="10000"/>
+              </a:schemeClr>
+            </a:solidFill>
+          </a:ln>
+        </p:spPr>
+        <p:style>
+          <a:lnRef idx="2">
+            <a:schemeClr val="accent1">
+              <a:shade val="50000"/>
+            </a:schemeClr>
+          </a:lnRef>
+          <a:fillRef idx="1">
+            <a:schemeClr val="accent1"/>
+          </a:fillRef>
+          <a:effectRef idx="0">
+            <a:schemeClr val="accent1"/>
+          </a:effectRef>
+          <a:fontRef idx="minor">
+            <a:schemeClr val="lt1"/>
+          </a:fontRef>
+        </p:style>
+        <p:txBody>
+          <a:bodyPr rtlCol="0" anchor="ctr"/>
+          <a:lstStyle/>
+          <a:p>
+            <a:pPr algn="ctr"/>
+            <a:r>
+              <a:rPr lang="en-US" sz="3200" dirty="0" smtClean="0">
+                <a:solidFill>
+                  <a:schemeClr val="accent6">
+                    <a:lumMod val="10000"/>
+                  </a:schemeClr>
+                </a:solidFill>
+              </a:rPr>
+              <a:t>Dropout 50%</a:t>
+            </a:r>
             <a:endParaRPr lang="en-US" sz="3200" dirty="0" smtClean="0">
               <a:solidFill>
                 <a:schemeClr val="accent6">
@@ -10832,6 +10571,47 @@
           </a:p>
         </p:txBody>
       </p:sp>
+      <p:cxnSp>
+        <p:nvCxnSpPr>
+          <p:cNvPr id="25" name="Straight Arrow Connector 24"/>
+          <p:cNvCxnSpPr>
+            <a:stCxn id="56" idx="0"/>
+            <a:endCxn id="23" idx="2"/>
+          </p:cNvCxnSpPr>
+          <p:nvPr/>
+        </p:nvCxnSpPr>
+        <p:spPr>
+          <a:xfrm flipH="1">
+            <a:off x="2865203" y="3427227"/>
+            <a:ext cx="377583" cy="1"/>
+          </a:xfrm>
+          <a:prstGeom prst="straightConnector1">
+            <a:avLst/>
+          </a:prstGeom>
+          <a:ln w="57150">
+            <a:solidFill>
+              <a:schemeClr val="accent6">
+                <a:lumMod val="10000"/>
+              </a:schemeClr>
+            </a:solidFill>
+            <a:tailEnd type="triangle"/>
+          </a:ln>
+        </p:spPr>
+        <p:style>
+          <a:lnRef idx="1">
+            <a:schemeClr val="accent1"/>
+          </a:lnRef>
+          <a:fillRef idx="0">
+            <a:schemeClr val="accent1"/>
+          </a:fillRef>
+          <a:effectRef idx="0">
+            <a:schemeClr val="accent1"/>
+          </a:effectRef>
+          <a:fontRef idx="minor">
+            <a:schemeClr val="tx1"/>
+          </a:fontRef>
+        </p:style>
+      </p:cxnSp>
     </p:spTree>
     <p:extLst>
       <p:ext uri="{BB962C8B-B14F-4D97-AF65-F5344CB8AC3E}">

</xml_diff>

<commit_message>
More corrections and explanations
</commit_message>
<xml_diff>
--- a/gfx/Thesis figures.pptx
+++ b/gfx/Thesis figures.pptx
@@ -11,7 +11,7 @@
     <p:sldId id="256" r:id="rId2"/>
     <p:sldId id="259" r:id="rId3"/>
     <p:sldId id="258" r:id="rId4"/>
-    <p:sldId id="266" r:id="rId5"/>
+    <p:sldId id="270" r:id="rId5"/>
     <p:sldId id="261" r:id="rId6"/>
     <p:sldId id="262" r:id="rId7"/>
     <p:sldId id="267" r:id="rId8"/>
@@ -134,7 +134,7 @@
         </p14:section>
         <p14:section name="PFS architecture" id="{A91B8DB3-5341-4C8F-97A7-A06CE971D216}">
           <p14:sldIdLst>
-            <p14:sldId id="266"/>
+            <p14:sldId id="270"/>
           </p14:sldIdLst>
         </p14:section>
         <p14:section name="Next-step prediction" id="{179ACF2C-C82F-4269-8895-5271EB602782}">
@@ -5579,7 +5579,17 @@
                   </a:schemeClr>
                 </a:solidFill>
               </a:rPr>
-              <a:t>Dense Layer</a:t>
+              <a:t>Feedforward </a:t>
+            </a:r>
+            <a:r>
+              <a:rPr lang="en-US" sz="2800" dirty="0" smtClean="0">
+                <a:solidFill>
+                  <a:schemeClr val="accent6">
+                    <a:lumMod val="10000"/>
+                  </a:schemeClr>
+                </a:solidFill>
+              </a:rPr>
+              <a:t>Layer</a:t>
             </a:r>
           </a:p>
           <a:p>
@@ -5622,8 +5632,8 @@
         </p:nvSpPr>
         <p:spPr>
           <a:xfrm rot="16200000">
-            <a:off x="1758817" y="2878588"/>
-            <a:ext cx="3657600" cy="1097280"/>
+            <a:off x="1587745" y="2878588"/>
+            <a:ext cx="3999744" cy="1097280"/>
           </a:xfrm>
           <a:prstGeom prst="rect">
             <a:avLst/>
@@ -5666,7 +5676,17 @@
                   </a:schemeClr>
                 </a:solidFill>
               </a:rPr>
-              <a:t>Dense Layer (</a:t>
+              <a:t>Feedforward </a:t>
+            </a:r>
+            <a:r>
+              <a:rPr lang="en-US" sz="2800" dirty="0" smtClean="0">
+                <a:solidFill>
+                  <a:schemeClr val="accent6">
+                    <a:lumMod val="10000"/>
+                  </a:schemeClr>
+                </a:solidFill>
+              </a:rPr>
+              <a:t>Layer (</a:t>
             </a:r>
             <a:r>
               <a:rPr lang="en-US" sz="2800" i="1" dirty="0" err="1" smtClean="0">
@@ -5722,8 +5742,8 @@
         </p:nvSpPr>
         <p:spPr>
           <a:xfrm rot="16200000">
-            <a:off x="232100" y="2878588"/>
-            <a:ext cx="3657600" cy="1097280"/>
+            <a:off x="61028" y="2878588"/>
+            <a:ext cx="3999744" cy="1097280"/>
           </a:xfrm>
           <a:prstGeom prst="rect">
             <a:avLst/>
@@ -5766,7 +5786,17 @@
                   </a:schemeClr>
                 </a:solidFill>
               </a:rPr>
-              <a:t>Dense Layer (</a:t>
+              <a:t>Output </a:t>
+            </a:r>
+            <a:r>
+              <a:rPr lang="en-US" sz="2800" dirty="0" smtClean="0">
+                <a:solidFill>
+                  <a:schemeClr val="accent6">
+                    <a:lumMod val="10000"/>
+                  </a:schemeClr>
+                </a:solidFill>
+              </a:rPr>
+              <a:t>Layer (</a:t>
             </a:r>
             <a:r>
               <a:rPr lang="en-US" sz="2800" i="1" dirty="0" err="1" smtClean="0">
@@ -5964,7 +5994,7 @@
           </a:xfrm>
           <a:prstGeom prst="bentConnector4">
             <a:avLst>
-              <a:gd name="adj1" fmla="val 104371"/>
+              <a:gd name="adj1" fmla="val 94948"/>
               <a:gd name="adj2" fmla="val 76628"/>
             </a:avLst>
           </a:prstGeom>
@@ -6049,8 +6079,8 @@
           </a:xfrm>
           <a:prstGeom prst="bentConnector4">
             <a:avLst>
-              <a:gd name="adj1" fmla="val 78294"/>
-              <a:gd name="adj2" fmla="val 745"/>
+              <a:gd name="adj1" fmla="val 99380"/>
+              <a:gd name="adj2" fmla="val 2166"/>
             </a:avLst>
           </a:prstGeom>
           <a:ln w="57150">
@@ -6738,7 +6768,17 @@
                   </a:schemeClr>
                 </a:solidFill>
               </a:rPr>
-              <a:t>Dense Layer</a:t>
+              <a:t>Feedforward </a:t>
+            </a:r>
+            <a:r>
+              <a:rPr lang="en-US" sz="2800" dirty="0" smtClean="0">
+                <a:solidFill>
+                  <a:schemeClr val="accent6">
+                    <a:lumMod val="10000"/>
+                  </a:schemeClr>
+                </a:solidFill>
+              </a:rPr>
+              <a:t>Layer</a:t>
             </a:r>
           </a:p>
           <a:p>
@@ -6781,8 +6821,8 @@
         </p:nvSpPr>
         <p:spPr>
           <a:xfrm rot="16200000">
-            <a:off x="1758817" y="2878588"/>
-            <a:ext cx="3657600" cy="1097280"/>
+            <a:off x="1587745" y="2878588"/>
+            <a:ext cx="3999744" cy="1097280"/>
           </a:xfrm>
           <a:prstGeom prst="rect">
             <a:avLst/>
@@ -6825,7 +6865,17 @@
                   </a:schemeClr>
                 </a:solidFill>
               </a:rPr>
-              <a:t>Dense Layer (</a:t>
+              <a:t>Feedforward </a:t>
+            </a:r>
+            <a:r>
+              <a:rPr lang="en-US" sz="2800" dirty="0" smtClean="0">
+                <a:solidFill>
+                  <a:schemeClr val="accent6">
+                    <a:lumMod val="10000"/>
+                  </a:schemeClr>
+                </a:solidFill>
+              </a:rPr>
+              <a:t>Layer (</a:t>
             </a:r>
             <a:r>
               <a:rPr lang="en-US" sz="2800" i="1" dirty="0" err="1" smtClean="0">
@@ -6881,8 +6931,8 @@
         </p:nvSpPr>
         <p:spPr>
           <a:xfrm rot="16200000">
-            <a:off x="232100" y="2878588"/>
-            <a:ext cx="3657600" cy="1097280"/>
+            <a:off x="61028" y="2878588"/>
+            <a:ext cx="3999744" cy="1097280"/>
           </a:xfrm>
           <a:prstGeom prst="rect">
             <a:avLst/>
@@ -6925,7 +6975,17 @@
                   </a:schemeClr>
                 </a:solidFill>
               </a:rPr>
-              <a:t>Dense Layer (</a:t>
+              <a:t>Output </a:t>
+            </a:r>
+            <a:r>
+              <a:rPr lang="en-US" sz="2800" dirty="0" smtClean="0">
+                <a:solidFill>
+                  <a:schemeClr val="accent6">
+                    <a:lumMod val="10000"/>
+                  </a:schemeClr>
+                </a:solidFill>
+              </a:rPr>
+              <a:t>Layer (</a:t>
             </a:r>
             <a:r>
               <a:rPr lang="en-US" sz="2800" i="1" dirty="0" err="1" smtClean="0">
@@ -7028,13 +7088,23 @@
                   </a:schemeClr>
                 </a:solidFill>
               </a:rPr>
-              <a:t>PFS Input Layer</a:t>
+              <a:t>PFS </a:t>
+            </a:r>
+            <a:r>
+              <a:rPr lang="en-US" sz="2800" dirty="0" smtClean="0">
+                <a:solidFill>
+                  <a:schemeClr val="accent6">
+                    <a:lumMod val="10000"/>
+                  </a:schemeClr>
+                </a:solidFill>
+              </a:rPr>
+              <a:t>Input Layer</a:t>
             </a:r>
           </a:p>
           <a:p>
             <a:pPr algn="ctr"/>
             <a:r>
-              <a:rPr lang="en-US" sz="2800" i="1" smtClean="0">
+              <a:rPr lang="en-US" sz="2800" i="1" dirty="0" smtClean="0">
                 <a:solidFill>
                   <a:schemeClr val="accent6">
                     <a:lumMod val="10000"/>
@@ -7044,7 +7114,7 @@
               <a:t>l</a:t>
             </a:r>
             <a:r>
-              <a:rPr lang="en-US" sz="2800" smtClean="0">
+              <a:rPr lang="en-US" sz="2800" dirty="0" smtClean="0">
                 <a:solidFill>
                   <a:schemeClr val="accent6">
                     <a:lumMod val="10000"/>
@@ -7123,7 +7193,7 @@
           </a:xfrm>
           <a:prstGeom prst="bentConnector4">
             <a:avLst>
-              <a:gd name="adj1" fmla="val 104371"/>
+              <a:gd name="adj1" fmla="val 94948"/>
               <a:gd name="adj2" fmla="val 76628"/>
             </a:avLst>
           </a:prstGeom>
@@ -7208,8 +7278,8 @@
           </a:xfrm>
           <a:prstGeom prst="bentConnector4">
             <a:avLst>
-              <a:gd name="adj1" fmla="val 78294"/>
-              <a:gd name="adj2" fmla="val 745"/>
+              <a:gd name="adj1" fmla="val 99380"/>
+              <a:gd name="adj2" fmla="val 2166"/>
             </a:avLst>
           </a:prstGeom>
           <a:ln w="57150">
@@ -7239,7 +7309,7 @@
     </p:spTree>
     <p:extLst>
       <p:ext uri="{BB962C8B-B14F-4D97-AF65-F5344CB8AC3E}">
-        <p14:creationId xmlns:p14="http://schemas.microsoft.com/office/powerpoint/2010/main" val="3160853166"/>
+        <p14:creationId xmlns:p14="http://schemas.microsoft.com/office/powerpoint/2010/main" val="1659788449"/>
       </p:ext>
     </p:extLst>
   </p:cSld>
@@ -10561,13 +10631,6 @@
               </a:rPr>
               <a:t>Dropout 50%</a:t>
             </a:r>
-            <a:endParaRPr lang="en-US" sz="3200" dirty="0" smtClean="0">
-              <a:solidFill>
-                <a:schemeClr val="accent6">
-                  <a:lumMod val="10000"/>
-                </a:schemeClr>
-              </a:solidFill>
-            </a:endParaRPr>
           </a:p>
         </p:txBody>
       </p:sp>

</xml_diff>